<commit_message>
Atualizacao Fundamentos - Java Basico.pptx
.
</commit_message>
<xml_diff>
--- a/Fundamentos/Fundamentos - Java Basico.pptx
+++ b/Fundamentos/Fundamentos - Java Basico.pptx
@@ -5,7 +5,7 @@
     <p:sldMasterId id="2147483792" r:id="rId1"/>
   </p:sldMasterIdLst>
   <p:notesMasterIdLst>
-    <p:notesMasterId r:id="rId33"/>
+    <p:notesMasterId r:id="rId50"/>
   </p:notesMasterIdLst>
   <p:sldIdLst>
     <p:sldId id="256" r:id="rId2"/>
@@ -34,11 +34,28 @@
     <p:sldId id="287" r:id="rId25"/>
     <p:sldId id="288" r:id="rId26"/>
     <p:sldId id="286" r:id="rId27"/>
-    <p:sldId id="273" r:id="rId28"/>
-    <p:sldId id="274" r:id="rId29"/>
-    <p:sldId id="275" r:id="rId30"/>
-    <p:sldId id="276" r:id="rId31"/>
-    <p:sldId id="277" r:id="rId32"/>
+    <p:sldId id="289" r:id="rId28"/>
+    <p:sldId id="290" r:id="rId29"/>
+    <p:sldId id="293" r:id="rId30"/>
+    <p:sldId id="294" r:id="rId31"/>
+    <p:sldId id="295" r:id="rId32"/>
+    <p:sldId id="296" r:id="rId33"/>
+    <p:sldId id="297" r:id="rId34"/>
+    <p:sldId id="298" r:id="rId35"/>
+    <p:sldId id="299" r:id="rId36"/>
+    <p:sldId id="300" r:id="rId37"/>
+    <p:sldId id="301" r:id="rId38"/>
+    <p:sldId id="302" r:id="rId39"/>
+    <p:sldId id="303" r:id="rId40"/>
+    <p:sldId id="304" r:id="rId41"/>
+    <p:sldId id="305" r:id="rId42"/>
+    <p:sldId id="273" r:id="rId43"/>
+    <p:sldId id="292" r:id="rId44"/>
+    <p:sldId id="291" r:id="rId45"/>
+    <p:sldId id="274" r:id="rId46"/>
+    <p:sldId id="275" r:id="rId47"/>
+    <p:sldId id="276" r:id="rId48"/>
+    <p:sldId id="277" r:id="rId49"/>
   </p:sldIdLst>
   <p:sldSz cx="9144000" cy="6858000" type="screen4x3"/>
   <p:notesSz cx="6858000" cy="9144000"/>
@@ -223,7 +240,7 @@
             <a:fld id="{0798B77A-D2B4-472A-BFF6-BFE225C3220A}" type="datetimeFigureOut">
               <a:rPr lang="pt-BR" smtClean="0"/>
               <a:pPr/>
-              <a:t>07/03/2014</a:t>
+              <a:t>09/03/2014</a:t>
             </a:fld>
             <a:endParaRPr lang="pt-BR"/>
           </a:p>
@@ -2457,6 +2474,744 @@
 </p:notes>
 </file>
 
+<file path=ppt/notesSlides/notesSlide31.xml><?xml version="1.0" encoding="utf-8"?>
+<p:notes xmlns:a="http://schemas.openxmlformats.org/drawingml/2006/main" xmlns:r="http://schemas.openxmlformats.org/officeDocument/2006/relationships" xmlns:p="http://schemas.openxmlformats.org/presentationml/2006/main">
+  <p:cSld>
+    <p:spTree>
+      <p:nvGrpSpPr>
+        <p:cNvPr id="1" name=""/>
+        <p:cNvGrpSpPr/>
+        <p:nvPr/>
+      </p:nvGrpSpPr>
+      <p:grpSpPr>
+        <a:xfrm>
+          <a:off x="0" y="0"/>
+          <a:ext cx="0" cy="0"/>
+          <a:chOff x="0" y="0"/>
+          <a:chExt cx="0" cy="0"/>
+        </a:xfrm>
+      </p:grpSpPr>
+      <p:sp>
+        <p:nvSpPr>
+          <p:cNvPr id="2" name="Espaço Reservado para Imagem de Slide 1"/>
+          <p:cNvSpPr>
+            <a:spLocks noGrp="1" noRot="1" noChangeAspect="1"/>
+          </p:cNvSpPr>
+          <p:nvPr>
+            <p:ph type="sldImg"/>
+          </p:nvPr>
+        </p:nvSpPr>
+        <p:spPr/>
+      </p:sp>
+      <p:sp>
+        <p:nvSpPr>
+          <p:cNvPr id="3" name="Espaço Reservado para Anotações 2"/>
+          <p:cNvSpPr>
+            <a:spLocks noGrp="1"/>
+          </p:cNvSpPr>
+          <p:nvPr>
+            <p:ph type="body" idx="1"/>
+          </p:nvPr>
+        </p:nvSpPr>
+        <p:spPr/>
+        <p:txBody>
+          <a:bodyPr>
+            <a:normAutofit/>
+          </a:bodyPr>
+          <a:lstStyle/>
+          <a:p>
+            <a:endParaRPr lang="pt-BR" dirty="0" smtClean="0"/>
+          </a:p>
+        </p:txBody>
+      </p:sp>
+      <p:sp>
+        <p:nvSpPr>
+          <p:cNvPr id="4" name="Espaço Reservado para Número de Slide 3"/>
+          <p:cNvSpPr>
+            <a:spLocks noGrp="1"/>
+          </p:cNvSpPr>
+          <p:nvPr>
+            <p:ph type="sldNum" sz="quarter" idx="10"/>
+          </p:nvPr>
+        </p:nvSpPr>
+        <p:spPr/>
+        <p:txBody>
+          <a:bodyPr/>
+          <a:lstStyle/>
+          <a:p>
+            <a:fld id="{72B91EDC-0C87-4192-8AD8-36C87AC108D0}" type="slidenum">
+              <a:rPr lang="pt-BR" smtClean="0"/>
+              <a:pPr/>
+              <a:t>32</a:t>
+            </a:fld>
+            <a:endParaRPr lang="pt-BR"/>
+          </a:p>
+        </p:txBody>
+      </p:sp>
+    </p:spTree>
+  </p:cSld>
+  <p:clrMapOvr>
+    <a:masterClrMapping/>
+  </p:clrMapOvr>
+</p:notes>
+</file>
+
+<file path=ppt/notesSlides/notesSlide32.xml><?xml version="1.0" encoding="utf-8"?>
+<p:notes xmlns:a="http://schemas.openxmlformats.org/drawingml/2006/main" xmlns:r="http://schemas.openxmlformats.org/officeDocument/2006/relationships" xmlns:p="http://schemas.openxmlformats.org/presentationml/2006/main">
+  <p:cSld>
+    <p:spTree>
+      <p:nvGrpSpPr>
+        <p:cNvPr id="1" name=""/>
+        <p:cNvGrpSpPr/>
+        <p:nvPr/>
+      </p:nvGrpSpPr>
+      <p:grpSpPr>
+        <a:xfrm>
+          <a:off x="0" y="0"/>
+          <a:ext cx="0" cy="0"/>
+          <a:chOff x="0" y="0"/>
+          <a:chExt cx="0" cy="0"/>
+        </a:xfrm>
+      </p:grpSpPr>
+      <p:sp>
+        <p:nvSpPr>
+          <p:cNvPr id="2" name="Espaço Reservado para Imagem de Slide 1"/>
+          <p:cNvSpPr>
+            <a:spLocks noGrp="1" noRot="1" noChangeAspect="1"/>
+          </p:cNvSpPr>
+          <p:nvPr>
+            <p:ph type="sldImg"/>
+          </p:nvPr>
+        </p:nvSpPr>
+        <p:spPr/>
+      </p:sp>
+      <p:sp>
+        <p:nvSpPr>
+          <p:cNvPr id="3" name="Espaço Reservado para Anotações 2"/>
+          <p:cNvSpPr>
+            <a:spLocks noGrp="1"/>
+          </p:cNvSpPr>
+          <p:nvPr>
+            <p:ph type="body" idx="1"/>
+          </p:nvPr>
+        </p:nvSpPr>
+        <p:spPr/>
+        <p:txBody>
+          <a:bodyPr>
+            <a:normAutofit/>
+          </a:bodyPr>
+          <a:lstStyle/>
+          <a:p>
+            <a:endParaRPr lang="pt-BR" dirty="0" smtClean="0"/>
+          </a:p>
+        </p:txBody>
+      </p:sp>
+      <p:sp>
+        <p:nvSpPr>
+          <p:cNvPr id="4" name="Espaço Reservado para Número de Slide 3"/>
+          <p:cNvSpPr>
+            <a:spLocks noGrp="1"/>
+          </p:cNvSpPr>
+          <p:nvPr>
+            <p:ph type="sldNum" sz="quarter" idx="10"/>
+          </p:nvPr>
+        </p:nvSpPr>
+        <p:spPr/>
+        <p:txBody>
+          <a:bodyPr/>
+          <a:lstStyle/>
+          <a:p>
+            <a:fld id="{72B91EDC-0C87-4192-8AD8-36C87AC108D0}" type="slidenum">
+              <a:rPr lang="pt-BR" smtClean="0"/>
+              <a:pPr/>
+              <a:t>33</a:t>
+            </a:fld>
+            <a:endParaRPr lang="pt-BR"/>
+          </a:p>
+        </p:txBody>
+      </p:sp>
+    </p:spTree>
+  </p:cSld>
+  <p:clrMapOvr>
+    <a:masterClrMapping/>
+  </p:clrMapOvr>
+</p:notes>
+</file>
+
+<file path=ppt/notesSlides/notesSlide33.xml><?xml version="1.0" encoding="utf-8"?>
+<p:notes xmlns:a="http://schemas.openxmlformats.org/drawingml/2006/main" xmlns:r="http://schemas.openxmlformats.org/officeDocument/2006/relationships" xmlns:p="http://schemas.openxmlformats.org/presentationml/2006/main">
+  <p:cSld>
+    <p:spTree>
+      <p:nvGrpSpPr>
+        <p:cNvPr id="1" name=""/>
+        <p:cNvGrpSpPr/>
+        <p:nvPr/>
+      </p:nvGrpSpPr>
+      <p:grpSpPr>
+        <a:xfrm>
+          <a:off x="0" y="0"/>
+          <a:ext cx="0" cy="0"/>
+          <a:chOff x="0" y="0"/>
+          <a:chExt cx="0" cy="0"/>
+        </a:xfrm>
+      </p:grpSpPr>
+      <p:sp>
+        <p:nvSpPr>
+          <p:cNvPr id="2" name="Espaço Reservado para Imagem de Slide 1"/>
+          <p:cNvSpPr>
+            <a:spLocks noGrp="1" noRot="1" noChangeAspect="1"/>
+          </p:cNvSpPr>
+          <p:nvPr>
+            <p:ph type="sldImg"/>
+          </p:nvPr>
+        </p:nvSpPr>
+        <p:spPr/>
+      </p:sp>
+      <p:sp>
+        <p:nvSpPr>
+          <p:cNvPr id="3" name="Espaço Reservado para Anotações 2"/>
+          <p:cNvSpPr>
+            <a:spLocks noGrp="1"/>
+          </p:cNvSpPr>
+          <p:nvPr>
+            <p:ph type="body" idx="1"/>
+          </p:nvPr>
+        </p:nvSpPr>
+        <p:spPr/>
+        <p:txBody>
+          <a:bodyPr>
+            <a:normAutofit/>
+          </a:bodyPr>
+          <a:lstStyle/>
+          <a:p>
+            <a:endParaRPr lang="pt-BR" dirty="0" smtClean="0"/>
+          </a:p>
+        </p:txBody>
+      </p:sp>
+      <p:sp>
+        <p:nvSpPr>
+          <p:cNvPr id="4" name="Espaço Reservado para Número de Slide 3"/>
+          <p:cNvSpPr>
+            <a:spLocks noGrp="1"/>
+          </p:cNvSpPr>
+          <p:nvPr>
+            <p:ph type="sldNum" sz="quarter" idx="10"/>
+          </p:nvPr>
+        </p:nvSpPr>
+        <p:spPr/>
+        <p:txBody>
+          <a:bodyPr/>
+          <a:lstStyle/>
+          <a:p>
+            <a:fld id="{72B91EDC-0C87-4192-8AD8-36C87AC108D0}" type="slidenum">
+              <a:rPr lang="pt-BR" smtClean="0"/>
+              <a:pPr/>
+              <a:t>34</a:t>
+            </a:fld>
+            <a:endParaRPr lang="pt-BR"/>
+          </a:p>
+        </p:txBody>
+      </p:sp>
+    </p:spTree>
+  </p:cSld>
+  <p:clrMapOvr>
+    <a:masterClrMapping/>
+  </p:clrMapOvr>
+</p:notes>
+</file>
+
+<file path=ppt/notesSlides/notesSlide34.xml><?xml version="1.0" encoding="utf-8"?>
+<p:notes xmlns:a="http://schemas.openxmlformats.org/drawingml/2006/main" xmlns:r="http://schemas.openxmlformats.org/officeDocument/2006/relationships" xmlns:p="http://schemas.openxmlformats.org/presentationml/2006/main">
+  <p:cSld>
+    <p:spTree>
+      <p:nvGrpSpPr>
+        <p:cNvPr id="1" name=""/>
+        <p:cNvGrpSpPr/>
+        <p:nvPr/>
+      </p:nvGrpSpPr>
+      <p:grpSpPr>
+        <a:xfrm>
+          <a:off x="0" y="0"/>
+          <a:ext cx="0" cy="0"/>
+          <a:chOff x="0" y="0"/>
+          <a:chExt cx="0" cy="0"/>
+        </a:xfrm>
+      </p:grpSpPr>
+      <p:sp>
+        <p:nvSpPr>
+          <p:cNvPr id="2" name="Espaço Reservado para Imagem de Slide 1"/>
+          <p:cNvSpPr>
+            <a:spLocks noGrp="1" noRot="1" noChangeAspect="1"/>
+          </p:cNvSpPr>
+          <p:nvPr>
+            <p:ph type="sldImg"/>
+          </p:nvPr>
+        </p:nvSpPr>
+        <p:spPr/>
+      </p:sp>
+      <p:sp>
+        <p:nvSpPr>
+          <p:cNvPr id="3" name="Espaço Reservado para Anotações 2"/>
+          <p:cNvSpPr>
+            <a:spLocks noGrp="1"/>
+          </p:cNvSpPr>
+          <p:nvPr>
+            <p:ph type="body" idx="1"/>
+          </p:nvPr>
+        </p:nvSpPr>
+        <p:spPr/>
+        <p:txBody>
+          <a:bodyPr>
+            <a:normAutofit/>
+          </a:bodyPr>
+          <a:lstStyle/>
+          <a:p>
+            <a:endParaRPr lang="pt-BR" dirty="0" smtClean="0"/>
+          </a:p>
+        </p:txBody>
+      </p:sp>
+      <p:sp>
+        <p:nvSpPr>
+          <p:cNvPr id="4" name="Espaço Reservado para Número de Slide 3"/>
+          <p:cNvSpPr>
+            <a:spLocks noGrp="1"/>
+          </p:cNvSpPr>
+          <p:nvPr>
+            <p:ph type="sldNum" sz="quarter" idx="10"/>
+          </p:nvPr>
+        </p:nvSpPr>
+        <p:spPr/>
+        <p:txBody>
+          <a:bodyPr/>
+          <a:lstStyle/>
+          <a:p>
+            <a:fld id="{72B91EDC-0C87-4192-8AD8-36C87AC108D0}" type="slidenum">
+              <a:rPr lang="pt-BR" smtClean="0"/>
+              <a:pPr/>
+              <a:t>35</a:t>
+            </a:fld>
+            <a:endParaRPr lang="pt-BR"/>
+          </a:p>
+        </p:txBody>
+      </p:sp>
+    </p:spTree>
+  </p:cSld>
+  <p:clrMapOvr>
+    <a:masterClrMapping/>
+  </p:clrMapOvr>
+</p:notes>
+</file>
+
+<file path=ppt/notesSlides/notesSlide35.xml><?xml version="1.0" encoding="utf-8"?>
+<p:notes xmlns:a="http://schemas.openxmlformats.org/drawingml/2006/main" xmlns:r="http://schemas.openxmlformats.org/officeDocument/2006/relationships" xmlns:p="http://schemas.openxmlformats.org/presentationml/2006/main">
+  <p:cSld>
+    <p:spTree>
+      <p:nvGrpSpPr>
+        <p:cNvPr id="1" name=""/>
+        <p:cNvGrpSpPr/>
+        <p:nvPr/>
+      </p:nvGrpSpPr>
+      <p:grpSpPr>
+        <a:xfrm>
+          <a:off x="0" y="0"/>
+          <a:ext cx="0" cy="0"/>
+          <a:chOff x="0" y="0"/>
+          <a:chExt cx="0" cy="0"/>
+        </a:xfrm>
+      </p:grpSpPr>
+      <p:sp>
+        <p:nvSpPr>
+          <p:cNvPr id="2" name="Espaço Reservado para Imagem de Slide 1"/>
+          <p:cNvSpPr>
+            <a:spLocks noGrp="1" noRot="1" noChangeAspect="1"/>
+          </p:cNvSpPr>
+          <p:nvPr>
+            <p:ph type="sldImg"/>
+          </p:nvPr>
+        </p:nvSpPr>
+        <p:spPr/>
+      </p:sp>
+      <p:sp>
+        <p:nvSpPr>
+          <p:cNvPr id="3" name="Espaço Reservado para Anotações 2"/>
+          <p:cNvSpPr>
+            <a:spLocks noGrp="1"/>
+          </p:cNvSpPr>
+          <p:nvPr>
+            <p:ph type="body" idx="1"/>
+          </p:nvPr>
+        </p:nvSpPr>
+        <p:spPr/>
+        <p:txBody>
+          <a:bodyPr>
+            <a:normAutofit/>
+          </a:bodyPr>
+          <a:lstStyle/>
+          <a:p>
+            <a:endParaRPr lang="pt-BR" dirty="0" smtClean="0"/>
+          </a:p>
+        </p:txBody>
+      </p:sp>
+      <p:sp>
+        <p:nvSpPr>
+          <p:cNvPr id="4" name="Espaço Reservado para Número de Slide 3"/>
+          <p:cNvSpPr>
+            <a:spLocks noGrp="1"/>
+          </p:cNvSpPr>
+          <p:nvPr>
+            <p:ph type="sldNum" sz="quarter" idx="10"/>
+          </p:nvPr>
+        </p:nvSpPr>
+        <p:spPr/>
+        <p:txBody>
+          <a:bodyPr/>
+          <a:lstStyle/>
+          <a:p>
+            <a:fld id="{72B91EDC-0C87-4192-8AD8-36C87AC108D0}" type="slidenum">
+              <a:rPr lang="pt-BR" smtClean="0"/>
+              <a:pPr/>
+              <a:t>36</a:t>
+            </a:fld>
+            <a:endParaRPr lang="pt-BR"/>
+          </a:p>
+        </p:txBody>
+      </p:sp>
+    </p:spTree>
+  </p:cSld>
+  <p:clrMapOvr>
+    <a:masterClrMapping/>
+  </p:clrMapOvr>
+</p:notes>
+</file>
+
+<file path=ppt/notesSlides/notesSlide36.xml><?xml version="1.0" encoding="utf-8"?>
+<p:notes xmlns:a="http://schemas.openxmlformats.org/drawingml/2006/main" xmlns:r="http://schemas.openxmlformats.org/officeDocument/2006/relationships" xmlns:p="http://schemas.openxmlformats.org/presentationml/2006/main">
+  <p:cSld>
+    <p:spTree>
+      <p:nvGrpSpPr>
+        <p:cNvPr id="1" name=""/>
+        <p:cNvGrpSpPr/>
+        <p:nvPr/>
+      </p:nvGrpSpPr>
+      <p:grpSpPr>
+        <a:xfrm>
+          <a:off x="0" y="0"/>
+          <a:ext cx="0" cy="0"/>
+          <a:chOff x="0" y="0"/>
+          <a:chExt cx="0" cy="0"/>
+        </a:xfrm>
+      </p:grpSpPr>
+      <p:sp>
+        <p:nvSpPr>
+          <p:cNvPr id="2" name="Espaço Reservado para Imagem de Slide 1"/>
+          <p:cNvSpPr>
+            <a:spLocks noGrp="1" noRot="1" noChangeAspect="1"/>
+          </p:cNvSpPr>
+          <p:nvPr>
+            <p:ph type="sldImg"/>
+          </p:nvPr>
+        </p:nvSpPr>
+        <p:spPr/>
+      </p:sp>
+      <p:sp>
+        <p:nvSpPr>
+          <p:cNvPr id="3" name="Espaço Reservado para Anotações 2"/>
+          <p:cNvSpPr>
+            <a:spLocks noGrp="1"/>
+          </p:cNvSpPr>
+          <p:nvPr>
+            <p:ph type="body" idx="1"/>
+          </p:nvPr>
+        </p:nvSpPr>
+        <p:spPr/>
+        <p:txBody>
+          <a:bodyPr>
+            <a:normAutofit/>
+          </a:bodyPr>
+          <a:lstStyle/>
+          <a:p>
+            <a:endParaRPr lang="pt-BR" dirty="0" smtClean="0"/>
+          </a:p>
+        </p:txBody>
+      </p:sp>
+      <p:sp>
+        <p:nvSpPr>
+          <p:cNvPr id="4" name="Espaço Reservado para Número de Slide 3"/>
+          <p:cNvSpPr>
+            <a:spLocks noGrp="1"/>
+          </p:cNvSpPr>
+          <p:nvPr>
+            <p:ph type="sldNum" sz="quarter" idx="10"/>
+          </p:nvPr>
+        </p:nvSpPr>
+        <p:spPr/>
+        <p:txBody>
+          <a:bodyPr/>
+          <a:lstStyle/>
+          <a:p>
+            <a:fld id="{72B91EDC-0C87-4192-8AD8-36C87AC108D0}" type="slidenum">
+              <a:rPr lang="pt-BR" smtClean="0"/>
+              <a:pPr/>
+              <a:t>37</a:t>
+            </a:fld>
+            <a:endParaRPr lang="pt-BR"/>
+          </a:p>
+        </p:txBody>
+      </p:sp>
+    </p:spTree>
+  </p:cSld>
+  <p:clrMapOvr>
+    <a:masterClrMapping/>
+  </p:clrMapOvr>
+</p:notes>
+</file>
+
+<file path=ppt/notesSlides/notesSlide37.xml><?xml version="1.0" encoding="utf-8"?>
+<p:notes xmlns:a="http://schemas.openxmlformats.org/drawingml/2006/main" xmlns:r="http://schemas.openxmlformats.org/officeDocument/2006/relationships" xmlns:p="http://schemas.openxmlformats.org/presentationml/2006/main">
+  <p:cSld>
+    <p:spTree>
+      <p:nvGrpSpPr>
+        <p:cNvPr id="1" name=""/>
+        <p:cNvGrpSpPr/>
+        <p:nvPr/>
+      </p:nvGrpSpPr>
+      <p:grpSpPr>
+        <a:xfrm>
+          <a:off x="0" y="0"/>
+          <a:ext cx="0" cy="0"/>
+          <a:chOff x="0" y="0"/>
+          <a:chExt cx="0" cy="0"/>
+        </a:xfrm>
+      </p:grpSpPr>
+      <p:sp>
+        <p:nvSpPr>
+          <p:cNvPr id="2" name="Espaço Reservado para Imagem de Slide 1"/>
+          <p:cNvSpPr>
+            <a:spLocks noGrp="1" noRot="1" noChangeAspect="1"/>
+          </p:cNvSpPr>
+          <p:nvPr>
+            <p:ph type="sldImg"/>
+          </p:nvPr>
+        </p:nvSpPr>
+        <p:spPr/>
+      </p:sp>
+      <p:sp>
+        <p:nvSpPr>
+          <p:cNvPr id="3" name="Espaço Reservado para Anotações 2"/>
+          <p:cNvSpPr>
+            <a:spLocks noGrp="1"/>
+          </p:cNvSpPr>
+          <p:nvPr>
+            <p:ph type="body" idx="1"/>
+          </p:nvPr>
+        </p:nvSpPr>
+        <p:spPr/>
+        <p:txBody>
+          <a:bodyPr>
+            <a:normAutofit/>
+          </a:bodyPr>
+          <a:lstStyle/>
+          <a:p>
+            <a:endParaRPr lang="pt-BR" dirty="0" smtClean="0"/>
+          </a:p>
+        </p:txBody>
+      </p:sp>
+      <p:sp>
+        <p:nvSpPr>
+          <p:cNvPr id="4" name="Espaço Reservado para Número de Slide 3"/>
+          <p:cNvSpPr>
+            <a:spLocks noGrp="1"/>
+          </p:cNvSpPr>
+          <p:nvPr>
+            <p:ph type="sldNum" sz="quarter" idx="10"/>
+          </p:nvPr>
+        </p:nvSpPr>
+        <p:spPr/>
+        <p:txBody>
+          <a:bodyPr/>
+          <a:lstStyle/>
+          <a:p>
+            <a:fld id="{72B91EDC-0C87-4192-8AD8-36C87AC108D0}" type="slidenum">
+              <a:rPr lang="pt-BR" smtClean="0"/>
+              <a:pPr/>
+              <a:t>38</a:t>
+            </a:fld>
+            <a:endParaRPr lang="pt-BR"/>
+          </a:p>
+        </p:txBody>
+      </p:sp>
+    </p:spTree>
+  </p:cSld>
+  <p:clrMapOvr>
+    <a:masterClrMapping/>
+  </p:clrMapOvr>
+</p:notes>
+</file>
+
+<file path=ppt/notesSlides/notesSlide38.xml><?xml version="1.0" encoding="utf-8"?>
+<p:notes xmlns:a="http://schemas.openxmlformats.org/drawingml/2006/main" xmlns:r="http://schemas.openxmlformats.org/officeDocument/2006/relationships" xmlns:p="http://schemas.openxmlformats.org/presentationml/2006/main">
+  <p:cSld>
+    <p:spTree>
+      <p:nvGrpSpPr>
+        <p:cNvPr id="1" name=""/>
+        <p:cNvGrpSpPr/>
+        <p:nvPr/>
+      </p:nvGrpSpPr>
+      <p:grpSpPr>
+        <a:xfrm>
+          <a:off x="0" y="0"/>
+          <a:ext cx="0" cy="0"/>
+          <a:chOff x="0" y="0"/>
+          <a:chExt cx="0" cy="0"/>
+        </a:xfrm>
+      </p:grpSpPr>
+      <p:sp>
+        <p:nvSpPr>
+          <p:cNvPr id="2" name="Espaço Reservado para Imagem de Slide 1"/>
+          <p:cNvSpPr>
+            <a:spLocks noGrp="1" noRot="1" noChangeAspect="1"/>
+          </p:cNvSpPr>
+          <p:nvPr>
+            <p:ph type="sldImg"/>
+          </p:nvPr>
+        </p:nvSpPr>
+        <p:spPr/>
+      </p:sp>
+      <p:sp>
+        <p:nvSpPr>
+          <p:cNvPr id="3" name="Espaço Reservado para Anotações 2"/>
+          <p:cNvSpPr>
+            <a:spLocks noGrp="1"/>
+          </p:cNvSpPr>
+          <p:nvPr>
+            <p:ph type="body" idx="1"/>
+          </p:nvPr>
+        </p:nvSpPr>
+        <p:spPr/>
+        <p:txBody>
+          <a:bodyPr>
+            <a:normAutofit/>
+          </a:bodyPr>
+          <a:lstStyle/>
+          <a:p>
+            <a:endParaRPr lang="pt-BR" dirty="0" smtClean="0"/>
+          </a:p>
+        </p:txBody>
+      </p:sp>
+      <p:sp>
+        <p:nvSpPr>
+          <p:cNvPr id="4" name="Espaço Reservado para Número de Slide 3"/>
+          <p:cNvSpPr>
+            <a:spLocks noGrp="1"/>
+          </p:cNvSpPr>
+          <p:nvPr>
+            <p:ph type="sldNum" sz="quarter" idx="10"/>
+          </p:nvPr>
+        </p:nvSpPr>
+        <p:spPr/>
+        <p:txBody>
+          <a:bodyPr/>
+          <a:lstStyle/>
+          <a:p>
+            <a:fld id="{72B91EDC-0C87-4192-8AD8-36C87AC108D0}" type="slidenum">
+              <a:rPr lang="pt-BR" smtClean="0"/>
+              <a:pPr/>
+              <a:t>39</a:t>
+            </a:fld>
+            <a:endParaRPr lang="pt-BR"/>
+          </a:p>
+        </p:txBody>
+      </p:sp>
+    </p:spTree>
+  </p:cSld>
+  <p:clrMapOvr>
+    <a:masterClrMapping/>
+  </p:clrMapOvr>
+</p:notes>
+</file>
+
+<file path=ppt/notesSlides/notesSlide39.xml><?xml version="1.0" encoding="utf-8"?>
+<p:notes xmlns:a="http://schemas.openxmlformats.org/drawingml/2006/main" xmlns:r="http://schemas.openxmlformats.org/officeDocument/2006/relationships" xmlns:p="http://schemas.openxmlformats.org/presentationml/2006/main">
+  <p:cSld>
+    <p:spTree>
+      <p:nvGrpSpPr>
+        <p:cNvPr id="1" name=""/>
+        <p:cNvGrpSpPr/>
+        <p:nvPr/>
+      </p:nvGrpSpPr>
+      <p:grpSpPr>
+        <a:xfrm>
+          <a:off x="0" y="0"/>
+          <a:ext cx="0" cy="0"/>
+          <a:chOff x="0" y="0"/>
+          <a:chExt cx="0" cy="0"/>
+        </a:xfrm>
+      </p:grpSpPr>
+      <p:sp>
+        <p:nvSpPr>
+          <p:cNvPr id="2" name="Espaço Reservado para Imagem de Slide 1"/>
+          <p:cNvSpPr>
+            <a:spLocks noGrp="1" noRot="1" noChangeAspect="1"/>
+          </p:cNvSpPr>
+          <p:nvPr>
+            <p:ph type="sldImg"/>
+          </p:nvPr>
+        </p:nvSpPr>
+        <p:spPr/>
+      </p:sp>
+      <p:sp>
+        <p:nvSpPr>
+          <p:cNvPr id="3" name="Espaço Reservado para Anotações 2"/>
+          <p:cNvSpPr>
+            <a:spLocks noGrp="1"/>
+          </p:cNvSpPr>
+          <p:nvPr>
+            <p:ph type="body" idx="1"/>
+          </p:nvPr>
+        </p:nvSpPr>
+        <p:spPr/>
+        <p:txBody>
+          <a:bodyPr>
+            <a:normAutofit/>
+          </a:bodyPr>
+          <a:lstStyle/>
+          <a:p>
+            <a:endParaRPr lang="pt-BR" dirty="0" smtClean="0"/>
+          </a:p>
+        </p:txBody>
+      </p:sp>
+      <p:sp>
+        <p:nvSpPr>
+          <p:cNvPr id="4" name="Espaço Reservado para Número de Slide 3"/>
+          <p:cNvSpPr>
+            <a:spLocks noGrp="1"/>
+          </p:cNvSpPr>
+          <p:nvPr>
+            <p:ph type="sldNum" sz="quarter" idx="10"/>
+          </p:nvPr>
+        </p:nvSpPr>
+        <p:spPr/>
+        <p:txBody>
+          <a:bodyPr/>
+          <a:lstStyle/>
+          <a:p>
+            <a:fld id="{72B91EDC-0C87-4192-8AD8-36C87AC108D0}" type="slidenum">
+              <a:rPr lang="pt-BR" smtClean="0"/>
+              <a:pPr/>
+              <a:t>40</a:t>
+            </a:fld>
+            <a:endParaRPr lang="pt-BR"/>
+          </a:p>
+        </p:txBody>
+      </p:sp>
+    </p:spTree>
+  </p:cSld>
+  <p:clrMapOvr>
+    <a:masterClrMapping/>
+  </p:clrMapOvr>
+</p:notes>
+</file>
+
 <file path=ppt/notesSlides/notesSlide4.xml><?xml version="1.0" encoding="utf-8"?>
 <p:notes xmlns:a="http://schemas.openxmlformats.org/drawingml/2006/main" xmlns:r="http://schemas.openxmlformats.org/officeDocument/2006/relationships" xmlns:p="http://schemas.openxmlformats.org/presentationml/2006/main">
   <p:cSld>
@@ -2526,6 +3281,662 @@
               <a:rPr lang="pt-BR" smtClean="0"/>
               <a:pPr/>
               <a:t>5</a:t>
+            </a:fld>
+            <a:endParaRPr lang="pt-BR"/>
+          </a:p>
+        </p:txBody>
+      </p:sp>
+    </p:spTree>
+  </p:cSld>
+  <p:clrMapOvr>
+    <a:masterClrMapping/>
+  </p:clrMapOvr>
+</p:notes>
+</file>
+
+<file path=ppt/notesSlides/notesSlide40.xml><?xml version="1.0" encoding="utf-8"?>
+<p:notes xmlns:a="http://schemas.openxmlformats.org/drawingml/2006/main" xmlns:r="http://schemas.openxmlformats.org/officeDocument/2006/relationships" xmlns:p="http://schemas.openxmlformats.org/presentationml/2006/main">
+  <p:cSld>
+    <p:spTree>
+      <p:nvGrpSpPr>
+        <p:cNvPr id="1" name=""/>
+        <p:cNvGrpSpPr/>
+        <p:nvPr/>
+      </p:nvGrpSpPr>
+      <p:grpSpPr>
+        <a:xfrm>
+          <a:off x="0" y="0"/>
+          <a:ext cx="0" cy="0"/>
+          <a:chOff x="0" y="0"/>
+          <a:chExt cx="0" cy="0"/>
+        </a:xfrm>
+      </p:grpSpPr>
+      <p:sp>
+        <p:nvSpPr>
+          <p:cNvPr id="2" name="Espaço Reservado para Imagem de Slide 1"/>
+          <p:cNvSpPr>
+            <a:spLocks noGrp="1" noRot="1" noChangeAspect="1"/>
+          </p:cNvSpPr>
+          <p:nvPr>
+            <p:ph type="sldImg"/>
+          </p:nvPr>
+        </p:nvSpPr>
+        <p:spPr/>
+      </p:sp>
+      <p:sp>
+        <p:nvSpPr>
+          <p:cNvPr id="3" name="Espaço Reservado para Anotações 2"/>
+          <p:cNvSpPr>
+            <a:spLocks noGrp="1"/>
+          </p:cNvSpPr>
+          <p:nvPr>
+            <p:ph type="body" idx="1"/>
+          </p:nvPr>
+        </p:nvSpPr>
+        <p:spPr/>
+        <p:txBody>
+          <a:bodyPr>
+            <a:normAutofit/>
+          </a:bodyPr>
+          <a:lstStyle/>
+          <a:p>
+            <a:endParaRPr lang="pt-BR" dirty="0" smtClean="0"/>
+          </a:p>
+        </p:txBody>
+      </p:sp>
+      <p:sp>
+        <p:nvSpPr>
+          <p:cNvPr id="4" name="Espaço Reservado para Número de Slide 3"/>
+          <p:cNvSpPr>
+            <a:spLocks noGrp="1"/>
+          </p:cNvSpPr>
+          <p:nvPr>
+            <p:ph type="sldNum" sz="quarter" idx="10"/>
+          </p:nvPr>
+        </p:nvSpPr>
+        <p:spPr/>
+        <p:txBody>
+          <a:bodyPr/>
+          <a:lstStyle/>
+          <a:p>
+            <a:fld id="{72B91EDC-0C87-4192-8AD8-36C87AC108D0}" type="slidenum">
+              <a:rPr lang="pt-BR" smtClean="0"/>
+              <a:pPr/>
+              <a:t>41</a:t>
+            </a:fld>
+            <a:endParaRPr lang="pt-BR"/>
+          </a:p>
+        </p:txBody>
+      </p:sp>
+    </p:spTree>
+  </p:cSld>
+  <p:clrMapOvr>
+    <a:masterClrMapping/>
+  </p:clrMapOvr>
+</p:notes>
+</file>
+
+<file path=ppt/notesSlides/notesSlide41.xml><?xml version="1.0" encoding="utf-8"?>
+<p:notes xmlns:a="http://schemas.openxmlformats.org/drawingml/2006/main" xmlns:r="http://schemas.openxmlformats.org/officeDocument/2006/relationships" xmlns:p="http://schemas.openxmlformats.org/presentationml/2006/main">
+  <p:cSld>
+    <p:spTree>
+      <p:nvGrpSpPr>
+        <p:cNvPr id="1" name=""/>
+        <p:cNvGrpSpPr/>
+        <p:nvPr/>
+      </p:nvGrpSpPr>
+      <p:grpSpPr>
+        <a:xfrm>
+          <a:off x="0" y="0"/>
+          <a:ext cx="0" cy="0"/>
+          <a:chOff x="0" y="0"/>
+          <a:chExt cx="0" cy="0"/>
+        </a:xfrm>
+      </p:grpSpPr>
+      <p:sp>
+        <p:nvSpPr>
+          <p:cNvPr id="2" name="Espaço Reservado para Imagem de Slide 1"/>
+          <p:cNvSpPr>
+            <a:spLocks noGrp="1" noRot="1" noChangeAspect="1"/>
+          </p:cNvSpPr>
+          <p:nvPr>
+            <p:ph type="sldImg"/>
+          </p:nvPr>
+        </p:nvSpPr>
+        <p:spPr/>
+      </p:sp>
+      <p:sp>
+        <p:nvSpPr>
+          <p:cNvPr id="3" name="Espaço Reservado para Anotações 2"/>
+          <p:cNvSpPr>
+            <a:spLocks noGrp="1"/>
+          </p:cNvSpPr>
+          <p:nvPr>
+            <p:ph type="body" idx="1"/>
+          </p:nvPr>
+        </p:nvSpPr>
+        <p:spPr/>
+        <p:txBody>
+          <a:bodyPr>
+            <a:normAutofit/>
+          </a:bodyPr>
+          <a:lstStyle/>
+          <a:p>
+            <a:endParaRPr lang="pt-BR" dirty="0" smtClean="0"/>
+          </a:p>
+        </p:txBody>
+      </p:sp>
+      <p:sp>
+        <p:nvSpPr>
+          <p:cNvPr id="4" name="Espaço Reservado para Número de Slide 3"/>
+          <p:cNvSpPr>
+            <a:spLocks noGrp="1"/>
+          </p:cNvSpPr>
+          <p:nvPr>
+            <p:ph type="sldNum" sz="quarter" idx="10"/>
+          </p:nvPr>
+        </p:nvSpPr>
+        <p:spPr/>
+        <p:txBody>
+          <a:bodyPr/>
+          <a:lstStyle/>
+          <a:p>
+            <a:fld id="{72B91EDC-0C87-4192-8AD8-36C87AC108D0}" type="slidenum">
+              <a:rPr lang="pt-BR" smtClean="0"/>
+              <a:pPr/>
+              <a:t>42</a:t>
+            </a:fld>
+            <a:endParaRPr lang="pt-BR"/>
+          </a:p>
+        </p:txBody>
+      </p:sp>
+    </p:spTree>
+  </p:cSld>
+  <p:clrMapOvr>
+    <a:masterClrMapping/>
+  </p:clrMapOvr>
+</p:notes>
+</file>
+
+<file path=ppt/notesSlides/notesSlide42.xml><?xml version="1.0" encoding="utf-8"?>
+<p:notes xmlns:a="http://schemas.openxmlformats.org/drawingml/2006/main" xmlns:r="http://schemas.openxmlformats.org/officeDocument/2006/relationships" xmlns:p="http://schemas.openxmlformats.org/presentationml/2006/main">
+  <p:cSld>
+    <p:spTree>
+      <p:nvGrpSpPr>
+        <p:cNvPr id="1" name=""/>
+        <p:cNvGrpSpPr/>
+        <p:nvPr/>
+      </p:nvGrpSpPr>
+      <p:grpSpPr>
+        <a:xfrm>
+          <a:off x="0" y="0"/>
+          <a:ext cx="0" cy="0"/>
+          <a:chOff x="0" y="0"/>
+          <a:chExt cx="0" cy="0"/>
+        </a:xfrm>
+      </p:grpSpPr>
+      <p:sp>
+        <p:nvSpPr>
+          <p:cNvPr id="2" name="Espaço Reservado para Imagem de Slide 1"/>
+          <p:cNvSpPr>
+            <a:spLocks noGrp="1" noRot="1" noChangeAspect="1"/>
+          </p:cNvSpPr>
+          <p:nvPr>
+            <p:ph type="sldImg"/>
+          </p:nvPr>
+        </p:nvSpPr>
+        <p:spPr/>
+      </p:sp>
+      <p:sp>
+        <p:nvSpPr>
+          <p:cNvPr id="3" name="Espaço Reservado para Anotações 2"/>
+          <p:cNvSpPr>
+            <a:spLocks noGrp="1"/>
+          </p:cNvSpPr>
+          <p:nvPr>
+            <p:ph type="body" idx="1"/>
+          </p:nvPr>
+        </p:nvSpPr>
+        <p:spPr/>
+        <p:txBody>
+          <a:bodyPr>
+            <a:normAutofit/>
+          </a:bodyPr>
+          <a:lstStyle/>
+          <a:p>
+            <a:endParaRPr lang="pt-BR" dirty="0" smtClean="0"/>
+          </a:p>
+        </p:txBody>
+      </p:sp>
+      <p:sp>
+        <p:nvSpPr>
+          <p:cNvPr id="4" name="Espaço Reservado para Número de Slide 3"/>
+          <p:cNvSpPr>
+            <a:spLocks noGrp="1"/>
+          </p:cNvSpPr>
+          <p:nvPr>
+            <p:ph type="sldNum" sz="quarter" idx="10"/>
+          </p:nvPr>
+        </p:nvSpPr>
+        <p:spPr/>
+        <p:txBody>
+          <a:bodyPr/>
+          <a:lstStyle/>
+          <a:p>
+            <a:fld id="{72B91EDC-0C87-4192-8AD8-36C87AC108D0}" type="slidenum">
+              <a:rPr lang="pt-BR" smtClean="0"/>
+              <a:pPr/>
+              <a:t>43</a:t>
+            </a:fld>
+            <a:endParaRPr lang="pt-BR"/>
+          </a:p>
+        </p:txBody>
+      </p:sp>
+    </p:spTree>
+  </p:cSld>
+  <p:clrMapOvr>
+    <a:masterClrMapping/>
+  </p:clrMapOvr>
+</p:notes>
+</file>
+
+<file path=ppt/notesSlides/notesSlide43.xml><?xml version="1.0" encoding="utf-8"?>
+<p:notes xmlns:a="http://schemas.openxmlformats.org/drawingml/2006/main" xmlns:r="http://schemas.openxmlformats.org/officeDocument/2006/relationships" xmlns:p="http://schemas.openxmlformats.org/presentationml/2006/main">
+  <p:cSld>
+    <p:spTree>
+      <p:nvGrpSpPr>
+        <p:cNvPr id="1" name=""/>
+        <p:cNvGrpSpPr/>
+        <p:nvPr/>
+      </p:nvGrpSpPr>
+      <p:grpSpPr>
+        <a:xfrm>
+          <a:off x="0" y="0"/>
+          <a:ext cx="0" cy="0"/>
+          <a:chOff x="0" y="0"/>
+          <a:chExt cx="0" cy="0"/>
+        </a:xfrm>
+      </p:grpSpPr>
+      <p:sp>
+        <p:nvSpPr>
+          <p:cNvPr id="2" name="Espaço Reservado para Imagem de Slide 1"/>
+          <p:cNvSpPr>
+            <a:spLocks noGrp="1" noRot="1" noChangeAspect="1"/>
+          </p:cNvSpPr>
+          <p:nvPr>
+            <p:ph type="sldImg"/>
+          </p:nvPr>
+        </p:nvSpPr>
+        <p:spPr/>
+      </p:sp>
+      <p:sp>
+        <p:nvSpPr>
+          <p:cNvPr id="3" name="Espaço Reservado para Anotações 2"/>
+          <p:cNvSpPr>
+            <a:spLocks noGrp="1"/>
+          </p:cNvSpPr>
+          <p:nvPr>
+            <p:ph type="body" idx="1"/>
+          </p:nvPr>
+        </p:nvSpPr>
+        <p:spPr/>
+        <p:txBody>
+          <a:bodyPr>
+            <a:normAutofit/>
+          </a:bodyPr>
+          <a:lstStyle/>
+          <a:p>
+            <a:endParaRPr lang="pt-BR" dirty="0" smtClean="0"/>
+          </a:p>
+        </p:txBody>
+      </p:sp>
+      <p:sp>
+        <p:nvSpPr>
+          <p:cNvPr id="4" name="Espaço Reservado para Número de Slide 3"/>
+          <p:cNvSpPr>
+            <a:spLocks noGrp="1"/>
+          </p:cNvSpPr>
+          <p:nvPr>
+            <p:ph type="sldNum" sz="quarter" idx="10"/>
+          </p:nvPr>
+        </p:nvSpPr>
+        <p:spPr/>
+        <p:txBody>
+          <a:bodyPr/>
+          <a:lstStyle/>
+          <a:p>
+            <a:fld id="{72B91EDC-0C87-4192-8AD8-36C87AC108D0}" type="slidenum">
+              <a:rPr lang="pt-BR" smtClean="0"/>
+              <a:pPr/>
+              <a:t>44</a:t>
+            </a:fld>
+            <a:endParaRPr lang="pt-BR"/>
+          </a:p>
+        </p:txBody>
+      </p:sp>
+    </p:spTree>
+  </p:cSld>
+  <p:clrMapOvr>
+    <a:masterClrMapping/>
+  </p:clrMapOvr>
+</p:notes>
+</file>
+
+<file path=ppt/notesSlides/notesSlide44.xml><?xml version="1.0" encoding="utf-8"?>
+<p:notes xmlns:a="http://schemas.openxmlformats.org/drawingml/2006/main" xmlns:r="http://schemas.openxmlformats.org/officeDocument/2006/relationships" xmlns:p="http://schemas.openxmlformats.org/presentationml/2006/main">
+  <p:cSld>
+    <p:spTree>
+      <p:nvGrpSpPr>
+        <p:cNvPr id="1" name=""/>
+        <p:cNvGrpSpPr/>
+        <p:nvPr/>
+      </p:nvGrpSpPr>
+      <p:grpSpPr>
+        <a:xfrm>
+          <a:off x="0" y="0"/>
+          <a:ext cx="0" cy="0"/>
+          <a:chOff x="0" y="0"/>
+          <a:chExt cx="0" cy="0"/>
+        </a:xfrm>
+      </p:grpSpPr>
+      <p:sp>
+        <p:nvSpPr>
+          <p:cNvPr id="2" name="Espaço Reservado para Imagem de Slide 1"/>
+          <p:cNvSpPr>
+            <a:spLocks noGrp="1" noRot="1" noChangeAspect="1"/>
+          </p:cNvSpPr>
+          <p:nvPr>
+            <p:ph type="sldImg"/>
+          </p:nvPr>
+        </p:nvSpPr>
+        <p:spPr/>
+      </p:sp>
+      <p:sp>
+        <p:nvSpPr>
+          <p:cNvPr id="3" name="Espaço Reservado para Anotações 2"/>
+          <p:cNvSpPr>
+            <a:spLocks noGrp="1"/>
+          </p:cNvSpPr>
+          <p:nvPr>
+            <p:ph type="body" idx="1"/>
+          </p:nvPr>
+        </p:nvSpPr>
+        <p:spPr/>
+        <p:txBody>
+          <a:bodyPr>
+            <a:normAutofit/>
+          </a:bodyPr>
+          <a:lstStyle/>
+          <a:p>
+            <a:endParaRPr lang="pt-BR" dirty="0" smtClean="0"/>
+          </a:p>
+        </p:txBody>
+      </p:sp>
+      <p:sp>
+        <p:nvSpPr>
+          <p:cNvPr id="4" name="Espaço Reservado para Número de Slide 3"/>
+          <p:cNvSpPr>
+            <a:spLocks noGrp="1"/>
+          </p:cNvSpPr>
+          <p:nvPr>
+            <p:ph type="sldNum" sz="quarter" idx="10"/>
+          </p:nvPr>
+        </p:nvSpPr>
+        <p:spPr/>
+        <p:txBody>
+          <a:bodyPr/>
+          <a:lstStyle/>
+          <a:p>
+            <a:fld id="{72B91EDC-0C87-4192-8AD8-36C87AC108D0}" type="slidenum">
+              <a:rPr lang="pt-BR" smtClean="0"/>
+              <a:pPr/>
+              <a:t>45</a:t>
+            </a:fld>
+            <a:endParaRPr lang="pt-BR"/>
+          </a:p>
+        </p:txBody>
+      </p:sp>
+    </p:spTree>
+  </p:cSld>
+  <p:clrMapOvr>
+    <a:masterClrMapping/>
+  </p:clrMapOvr>
+</p:notes>
+</file>
+
+<file path=ppt/notesSlides/notesSlide45.xml><?xml version="1.0" encoding="utf-8"?>
+<p:notes xmlns:a="http://schemas.openxmlformats.org/drawingml/2006/main" xmlns:r="http://schemas.openxmlformats.org/officeDocument/2006/relationships" xmlns:p="http://schemas.openxmlformats.org/presentationml/2006/main">
+  <p:cSld>
+    <p:spTree>
+      <p:nvGrpSpPr>
+        <p:cNvPr id="1" name=""/>
+        <p:cNvGrpSpPr/>
+        <p:nvPr/>
+      </p:nvGrpSpPr>
+      <p:grpSpPr>
+        <a:xfrm>
+          <a:off x="0" y="0"/>
+          <a:ext cx="0" cy="0"/>
+          <a:chOff x="0" y="0"/>
+          <a:chExt cx="0" cy="0"/>
+        </a:xfrm>
+      </p:grpSpPr>
+      <p:sp>
+        <p:nvSpPr>
+          <p:cNvPr id="2" name="Espaço Reservado para Imagem de Slide 1"/>
+          <p:cNvSpPr>
+            <a:spLocks noGrp="1" noRot="1" noChangeAspect="1"/>
+          </p:cNvSpPr>
+          <p:nvPr>
+            <p:ph type="sldImg"/>
+          </p:nvPr>
+        </p:nvSpPr>
+        <p:spPr/>
+      </p:sp>
+      <p:sp>
+        <p:nvSpPr>
+          <p:cNvPr id="3" name="Espaço Reservado para Anotações 2"/>
+          <p:cNvSpPr>
+            <a:spLocks noGrp="1"/>
+          </p:cNvSpPr>
+          <p:nvPr>
+            <p:ph type="body" idx="1"/>
+          </p:nvPr>
+        </p:nvSpPr>
+        <p:spPr/>
+        <p:txBody>
+          <a:bodyPr>
+            <a:normAutofit/>
+          </a:bodyPr>
+          <a:lstStyle/>
+          <a:p>
+            <a:endParaRPr lang="pt-BR" dirty="0" smtClean="0"/>
+          </a:p>
+        </p:txBody>
+      </p:sp>
+      <p:sp>
+        <p:nvSpPr>
+          <p:cNvPr id="4" name="Espaço Reservado para Número de Slide 3"/>
+          <p:cNvSpPr>
+            <a:spLocks noGrp="1"/>
+          </p:cNvSpPr>
+          <p:nvPr>
+            <p:ph type="sldNum" sz="quarter" idx="10"/>
+          </p:nvPr>
+        </p:nvSpPr>
+        <p:spPr/>
+        <p:txBody>
+          <a:bodyPr/>
+          <a:lstStyle/>
+          <a:p>
+            <a:fld id="{72B91EDC-0C87-4192-8AD8-36C87AC108D0}" type="slidenum">
+              <a:rPr lang="pt-BR" smtClean="0"/>
+              <a:pPr/>
+              <a:t>46</a:t>
+            </a:fld>
+            <a:endParaRPr lang="pt-BR"/>
+          </a:p>
+        </p:txBody>
+      </p:sp>
+    </p:spTree>
+  </p:cSld>
+  <p:clrMapOvr>
+    <a:masterClrMapping/>
+  </p:clrMapOvr>
+</p:notes>
+</file>
+
+<file path=ppt/notesSlides/notesSlide46.xml><?xml version="1.0" encoding="utf-8"?>
+<p:notes xmlns:a="http://schemas.openxmlformats.org/drawingml/2006/main" xmlns:r="http://schemas.openxmlformats.org/officeDocument/2006/relationships" xmlns:p="http://schemas.openxmlformats.org/presentationml/2006/main">
+  <p:cSld>
+    <p:spTree>
+      <p:nvGrpSpPr>
+        <p:cNvPr id="1" name=""/>
+        <p:cNvGrpSpPr/>
+        <p:nvPr/>
+      </p:nvGrpSpPr>
+      <p:grpSpPr>
+        <a:xfrm>
+          <a:off x="0" y="0"/>
+          <a:ext cx="0" cy="0"/>
+          <a:chOff x="0" y="0"/>
+          <a:chExt cx="0" cy="0"/>
+        </a:xfrm>
+      </p:grpSpPr>
+      <p:sp>
+        <p:nvSpPr>
+          <p:cNvPr id="2" name="Espaço Reservado para Imagem de Slide 1"/>
+          <p:cNvSpPr>
+            <a:spLocks noGrp="1" noRot="1" noChangeAspect="1"/>
+          </p:cNvSpPr>
+          <p:nvPr>
+            <p:ph type="sldImg"/>
+          </p:nvPr>
+        </p:nvSpPr>
+        <p:spPr/>
+      </p:sp>
+      <p:sp>
+        <p:nvSpPr>
+          <p:cNvPr id="3" name="Espaço Reservado para Anotações 2"/>
+          <p:cNvSpPr>
+            <a:spLocks noGrp="1"/>
+          </p:cNvSpPr>
+          <p:nvPr>
+            <p:ph type="body" idx="1"/>
+          </p:nvPr>
+        </p:nvSpPr>
+        <p:spPr/>
+        <p:txBody>
+          <a:bodyPr>
+            <a:normAutofit/>
+          </a:bodyPr>
+          <a:lstStyle/>
+          <a:p>
+            <a:endParaRPr lang="pt-BR" dirty="0" smtClean="0"/>
+          </a:p>
+        </p:txBody>
+      </p:sp>
+      <p:sp>
+        <p:nvSpPr>
+          <p:cNvPr id="4" name="Espaço Reservado para Número de Slide 3"/>
+          <p:cNvSpPr>
+            <a:spLocks noGrp="1"/>
+          </p:cNvSpPr>
+          <p:nvPr>
+            <p:ph type="sldNum" sz="quarter" idx="10"/>
+          </p:nvPr>
+        </p:nvSpPr>
+        <p:spPr/>
+        <p:txBody>
+          <a:bodyPr/>
+          <a:lstStyle/>
+          <a:p>
+            <a:fld id="{72B91EDC-0C87-4192-8AD8-36C87AC108D0}" type="slidenum">
+              <a:rPr lang="pt-BR" smtClean="0"/>
+              <a:pPr/>
+              <a:t>47</a:t>
+            </a:fld>
+            <a:endParaRPr lang="pt-BR"/>
+          </a:p>
+        </p:txBody>
+      </p:sp>
+    </p:spTree>
+  </p:cSld>
+  <p:clrMapOvr>
+    <a:masterClrMapping/>
+  </p:clrMapOvr>
+</p:notes>
+</file>
+
+<file path=ppt/notesSlides/notesSlide47.xml><?xml version="1.0" encoding="utf-8"?>
+<p:notes xmlns:a="http://schemas.openxmlformats.org/drawingml/2006/main" xmlns:r="http://schemas.openxmlformats.org/officeDocument/2006/relationships" xmlns:p="http://schemas.openxmlformats.org/presentationml/2006/main">
+  <p:cSld>
+    <p:spTree>
+      <p:nvGrpSpPr>
+        <p:cNvPr id="1" name=""/>
+        <p:cNvGrpSpPr/>
+        <p:nvPr/>
+      </p:nvGrpSpPr>
+      <p:grpSpPr>
+        <a:xfrm>
+          <a:off x="0" y="0"/>
+          <a:ext cx="0" cy="0"/>
+          <a:chOff x="0" y="0"/>
+          <a:chExt cx="0" cy="0"/>
+        </a:xfrm>
+      </p:grpSpPr>
+      <p:sp>
+        <p:nvSpPr>
+          <p:cNvPr id="2" name="Espaço Reservado para Imagem de Slide 1"/>
+          <p:cNvSpPr>
+            <a:spLocks noGrp="1" noRot="1" noChangeAspect="1"/>
+          </p:cNvSpPr>
+          <p:nvPr>
+            <p:ph type="sldImg"/>
+          </p:nvPr>
+        </p:nvSpPr>
+        <p:spPr/>
+      </p:sp>
+      <p:sp>
+        <p:nvSpPr>
+          <p:cNvPr id="3" name="Espaço Reservado para Anotações 2"/>
+          <p:cNvSpPr>
+            <a:spLocks noGrp="1"/>
+          </p:cNvSpPr>
+          <p:nvPr>
+            <p:ph type="body" idx="1"/>
+          </p:nvPr>
+        </p:nvSpPr>
+        <p:spPr/>
+        <p:txBody>
+          <a:bodyPr>
+            <a:normAutofit/>
+          </a:bodyPr>
+          <a:lstStyle/>
+          <a:p>
+            <a:endParaRPr lang="pt-BR" dirty="0" smtClean="0"/>
+          </a:p>
+        </p:txBody>
+      </p:sp>
+      <p:sp>
+        <p:nvSpPr>
+          <p:cNvPr id="4" name="Espaço Reservado para Número de Slide 3"/>
+          <p:cNvSpPr>
+            <a:spLocks noGrp="1"/>
+          </p:cNvSpPr>
+          <p:nvPr>
+            <p:ph type="sldNum" sz="quarter" idx="10"/>
+          </p:nvPr>
+        </p:nvSpPr>
+        <p:spPr/>
+        <p:txBody>
+          <a:bodyPr/>
+          <a:lstStyle/>
+          <a:p>
+            <a:fld id="{72B91EDC-0C87-4192-8AD8-36C87AC108D0}" type="slidenum">
+              <a:rPr lang="pt-BR" smtClean="0"/>
+              <a:pPr/>
+              <a:t>48</a:t>
             </a:fld>
             <a:endParaRPr lang="pt-BR"/>
           </a:p>
@@ -3198,7 +4609,7 @@
             <a:fld id="{2E700DB3-DBF0-4086-B675-117E7A9610B8}" type="datetimeFigureOut">
               <a:rPr lang="pt-BR" smtClean="0"/>
               <a:pPr/>
-              <a:t>07/03/2014</a:t>
+              <a:t>09/03/2014</a:t>
             </a:fld>
             <a:endParaRPr lang="pt-BR"/>
           </a:p>
@@ -3423,7 +4834,7 @@
             <a:fld id="{2E700DB3-DBF0-4086-B675-117E7A9610B8}" type="datetimeFigureOut">
               <a:rPr lang="pt-BR" smtClean="0"/>
               <a:pPr/>
-              <a:t>07/03/2014</a:t>
+              <a:t>09/03/2014</a:t>
             </a:fld>
             <a:endParaRPr lang="pt-BR"/>
           </a:p>
@@ -3705,7 +5116,7 @@
             <a:fld id="{2E700DB3-DBF0-4086-B675-117E7A9610B8}" type="datetimeFigureOut">
               <a:rPr lang="pt-BR" smtClean="0"/>
               <a:pPr/>
-              <a:t>07/03/2014</a:t>
+              <a:t>09/03/2014</a:t>
             </a:fld>
             <a:endParaRPr lang="pt-BR"/>
           </a:p>
@@ -3886,7 +5297,7 @@
             <a:fld id="{2E700DB3-DBF0-4086-B675-117E7A9610B8}" type="datetimeFigureOut">
               <a:rPr lang="pt-BR" smtClean="0"/>
               <a:pPr/>
-              <a:t>07/03/2014</a:t>
+              <a:t>09/03/2014</a:t>
             </a:fld>
             <a:endParaRPr lang="pt-BR"/>
           </a:p>
@@ -4246,7 +5657,7 @@
             <a:fld id="{2E700DB3-DBF0-4086-B675-117E7A9610B8}" type="datetimeFigureOut">
               <a:rPr lang="pt-BR" smtClean="0"/>
               <a:pPr/>
-              <a:t>07/03/2014</a:t>
+              <a:t>09/03/2014</a:t>
             </a:fld>
             <a:endParaRPr lang="pt-BR"/>
           </a:p>
@@ -4535,7 +5946,7 @@
             <a:fld id="{2E700DB3-DBF0-4086-B675-117E7A9610B8}" type="datetimeFigureOut">
               <a:rPr lang="pt-BR" smtClean="0"/>
               <a:pPr/>
-              <a:t>07/03/2014</a:t>
+              <a:t>09/03/2014</a:t>
             </a:fld>
             <a:endParaRPr lang="pt-BR"/>
           </a:p>
@@ -4959,7 +6370,7 @@
             <a:fld id="{2E700DB3-DBF0-4086-B675-117E7A9610B8}" type="datetimeFigureOut">
               <a:rPr lang="pt-BR" smtClean="0"/>
               <a:pPr/>
-              <a:t>07/03/2014</a:t>
+              <a:t>09/03/2014</a:t>
             </a:fld>
             <a:endParaRPr lang="pt-BR"/>
           </a:p>
@@ -5076,7 +6487,7 @@
             <a:fld id="{2E700DB3-DBF0-4086-B675-117E7A9610B8}" type="datetimeFigureOut">
               <a:rPr lang="pt-BR" smtClean="0"/>
               <a:pPr/>
-              <a:t>07/03/2014</a:t>
+              <a:t>09/03/2014</a:t>
             </a:fld>
             <a:endParaRPr lang="pt-BR"/>
           </a:p>
@@ -5168,7 +6579,7 @@
             <a:fld id="{2E700DB3-DBF0-4086-B675-117E7A9610B8}" type="datetimeFigureOut">
               <a:rPr lang="pt-BR" smtClean="0"/>
               <a:pPr/>
-              <a:t>07/03/2014</a:t>
+              <a:t>09/03/2014</a:t>
             </a:fld>
             <a:endParaRPr lang="pt-BR"/>
           </a:p>
@@ -5448,7 +6859,7 @@
             <a:fld id="{2E700DB3-DBF0-4086-B675-117E7A9610B8}" type="datetimeFigureOut">
               <a:rPr lang="pt-BR" smtClean="0"/>
               <a:pPr/>
-              <a:t>07/03/2014</a:t>
+              <a:t>09/03/2014</a:t>
             </a:fld>
             <a:endParaRPr lang="pt-BR"/>
           </a:p>
@@ -5816,7 +7227,7 @@
             <a:fld id="{2E700DB3-DBF0-4086-B675-117E7A9610B8}" type="datetimeFigureOut">
               <a:rPr lang="pt-BR" smtClean="0"/>
               <a:pPr/>
-              <a:t>07/03/2014</a:t>
+              <a:t>09/03/2014</a:t>
             </a:fld>
             <a:endParaRPr lang="pt-BR"/>
           </a:p>
@@ -6255,7 +7666,7 @@
             <a:fld id="{2E700DB3-DBF0-4086-B675-117E7A9610B8}" type="datetimeFigureOut">
               <a:rPr lang="pt-BR" smtClean="0"/>
               <a:pPr/>
-              <a:t>07/03/2014</a:t>
+              <a:t>09/03/2014</a:t>
             </a:fld>
             <a:endParaRPr lang="pt-BR"/>
           </a:p>
@@ -8285,13 +9696,8 @@
             <a:pPr lvl="3"/>
             <a:r>
               <a:rPr lang="pt-BR" dirty="0" smtClean="0"/>
-              <a:t>Valor de um </a:t>
-            </a:r>
-            <a:r>
-              <a:rPr lang="pt-BR" dirty="0" smtClean="0"/>
-              <a:t>String ou caractere</a:t>
-            </a:r>
-            <a:endParaRPr lang="pt-BR" dirty="0" smtClean="0"/>
+              <a:t>Valor de um String ou caractere</a:t>
+            </a:r>
           </a:p>
           <a:p>
             <a:pPr lvl="3"/>
@@ -8602,13 +10008,8 @@
             <a:pPr lvl="1"/>
             <a:r>
               <a:rPr lang="pt-BR" dirty="0" smtClean="0"/>
-              <a:t>Literais </a:t>
-            </a:r>
-            <a:r>
-              <a:rPr lang="pt-BR" dirty="0" smtClean="0"/>
-              <a:t>Float e Double</a:t>
-            </a:r>
-            <a:endParaRPr lang="pt-BR" dirty="0" smtClean="0"/>
+              <a:t>Literais Float e Double</a:t>
+            </a:r>
           </a:p>
         </p:txBody>
       </p:sp>
@@ -8843,13 +10244,8 @@
             <a:pPr lvl="1"/>
             <a:r>
               <a:rPr lang="pt-BR" dirty="0" smtClean="0"/>
-              <a:t>Literais </a:t>
-            </a:r>
-            <a:r>
-              <a:rPr lang="pt-BR" dirty="0" smtClean="0"/>
-              <a:t>Caractere</a:t>
-            </a:r>
-            <a:endParaRPr lang="pt-BR" dirty="0" smtClean="0"/>
+              <a:t>Literais Caractere</a:t>
+            </a:r>
           </a:p>
         </p:txBody>
       </p:sp>
@@ -8968,7 +10364,6 @@
               <a:rPr lang="pt-BR" dirty="0" smtClean="0"/>
               <a:t>Separadores</a:t>
             </a:r>
-            <a:endParaRPr lang="pt-BR" dirty="0" smtClean="0"/>
           </a:p>
         </p:txBody>
       </p:sp>
@@ -9171,7 +10566,7 @@
           <a:p>
             <a:r>
               <a:rPr lang="pt-BR" dirty="0" smtClean="0"/>
-              <a:t>Orientação a Objetos</a:t>
+              <a:t>Linguagem Java</a:t>
             </a:r>
             <a:endParaRPr lang="pt-BR" dirty="0"/>
           </a:p>
@@ -9194,7 +10589,82 @@
           </a:bodyPr>
           <a:lstStyle/>
           <a:p>
+            <a:r>
+              <a:rPr lang="pt-BR" dirty="0" smtClean="0"/>
+              <a:t>Tipos</a:t>
+            </a:r>
+          </a:p>
+          <a:p>
+            <a:pPr lvl="1"/>
+            <a:r>
+              <a:rPr lang="pt-BR" dirty="0" smtClean="0"/>
+              <a:t>Primitivos</a:t>
+            </a:r>
+          </a:p>
+          <a:p>
+            <a:pPr lvl="2"/>
+            <a:r>
+              <a:rPr lang="pt-BR" dirty="0" err="1" smtClean="0"/>
+              <a:t>boolean</a:t>
+            </a:r>
+            <a:r>
+              <a:rPr lang="pt-BR" dirty="0" smtClean="0"/>
+              <a:t>, </a:t>
+            </a:r>
+          </a:p>
+          <a:p>
+            <a:pPr lvl="2"/>
+            <a:r>
+              <a:rPr lang="pt-BR" dirty="0" err="1" smtClean="0"/>
+              <a:t>int</a:t>
+            </a:r>
+            <a:r>
+              <a:rPr lang="pt-BR" dirty="0" smtClean="0"/>
+              <a:t>, byte, short, </a:t>
+            </a:r>
+            <a:r>
+              <a:rPr lang="pt-BR" dirty="0" err="1" smtClean="0"/>
+              <a:t>long</a:t>
+            </a:r>
+            <a:r>
+              <a:rPr lang="pt-BR" dirty="0" smtClean="0"/>
+              <a:t>, </a:t>
+            </a:r>
+            <a:r>
+              <a:rPr lang="pt-BR" dirty="0" err="1" smtClean="0"/>
+              <a:t>char</a:t>
+            </a:r>
             <a:endParaRPr lang="pt-BR" dirty="0" smtClean="0"/>
+          </a:p>
+          <a:p>
+            <a:pPr lvl="2"/>
+            <a:r>
+              <a:rPr lang="pt-BR" dirty="0" smtClean="0"/>
+              <a:t>Float, </a:t>
+            </a:r>
+            <a:r>
+              <a:rPr lang="pt-BR" dirty="0" err="1" smtClean="0"/>
+              <a:t>double</a:t>
+            </a:r>
+            <a:endParaRPr lang="pt-BR" dirty="0" smtClean="0"/>
+          </a:p>
+          <a:p>
+            <a:pPr lvl="1"/>
+            <a:r>
+              <a:rPr lang="pt-BR" dirty="0" smtClean="0"/>
+              <a:t>Referência (Objetos)</a:t>
+            </a:r>
+          </a:p>
+          <a:p>
+            <a:pPr lvl="1"/>
+            <a:r>
+              <a:rPr lang="pt-BR" dirty="0" err="1" smtClean="0"/>
+              <a:t>null</a:t>
+            </a:r>
+            <a:r>
+              <a:rPr lang="pt-BR" dirty="0" smtClean="0"/>
+              <a:t> (nulo)</a:t>
+            </a:r>
           </a:p>
         </p:txBody>
       </p:sp>
@@ -9247,7 +10717,7 @@
           <a:p>
             <a:r>
               <a:rPr lang="pt-BR" dirty="0" smtClean="0"/>
-              <a:t>Tratamento de Exceções</a:t>
+              <a:t>Linguagem Java</a:t>
             </a:r>
             <a:endParaRPr lang="pt-BR" dirty="0"/>
           </a:p>
@@ -9270,10 +10740,45 @@
           </a:bodyPr>
           <a:lstStyle/>
           <a:p>
-            <a:endParaRPr lang="pt-BR" dirty="0" smtClean="0"/>
-          </a:p>
-        </p:txBody>
-      </p:sp>
+            <a:r>
+              <a:rPr lang="pt-BR" dirty="0" smtClean="0"/>
+              <a:t>Tipos Numéricos Integrais</a:t>
+            </a:r>
+          </a:p>
+        </p:txBody>
+      </p:sp>
+      <p:pic>
+        <p:nvPicPr>
+          <p:cNvPr id="4098" name="Picture 2"/>
+          <p:cNvPicPr>
+            <a:picLocks noChangeAspect="1" noChangeArrowheads="1"/>
+          </p:cNvPicPr>
+          <p:nvPr/>
+        </p:nvPicPr>
+        <p:blipFill>
+          <a:blip r:embed="rId3" cstate="print"/>
+          <a:srcRect/>
+          <a:stretch>
+            <a:fillRect/>
+          </a:stretch>
+        </p:blipFill>
+        <p:spPr bwMode="auto">
+          <a:xfrm>
+            <a:off x="323528" y="2780928"/>
+            <a:ext cx="8510539" cy="2417044"/>
+          </a:xfrm>
+          <a:prstGeom prst="rect">
+            <a:avLst/>
+          </a:prstGeom>
+          <a:noFill/>
+          <a:ln w="9525">
+            <a:noFill/>
+            <a:miter lim="800000"/>
+            <a:headEnd/>
+            <a:tailEnd/>
+          </a:ln>
+        </p:spPr>
+      </p:pic>
     </p:spTree>
   </p:cSld>
   <p:clrMapOvr>
@@ -9323,15 +10828,7 @@
           <a:p>
             <a:r>
               <a:rPr lang="pt-BR" dirty="0" smtClean="0"/>
-              <a:t>Java </a:t>
-            </a:r>
-            <a:r>
-              <a:rPr lang="pt-BR" dirty="0" err="1" smtClean="0"/>
-              <a:t>Collection</a:t>
-            </a:r>
-            <a:r>
-              <a:rPr lang="pt-BR" dirty="0" smtClean="0"/>
-              <a:t> Framework</a:t>
+              <a:t>Linguagem Java</a:t>
             </a:r>
             <a:endParaRPr lang="pt-BR" dirty="0"/>
           </a:p>
@@ -9354,10 +10851,77 @@
           </a:bodyPr>
           <a:lstStyle/>
           <a:p>
-            <a:endParaRPr lang="pt-BR" dirty="0" smtClean="0"/>
-          </a:p>
-        </p:txBody>
-      </p:sp>
+            <a:r>
+              <a:rPr lang="pt-BR" dirty="0" smtClean="0"/>
+              <a:t>Estruturas de Controle</a:t>
+            </a:r>
+          </a:p>
+        </p:txBody>
+      </p:sp>
+      <p:pic>
+        <p:nvPicPr>
+          <p:cNvPr id="5123" name="Picture 3"/>
+          <p:cNvPicPr>
+            <a:picLocks noChangeAspect="1" noChangeArrowheads="1"/>
+          </p:cNvPicPr>
+          <p:nvPr/>
+        </p:nvPicPr>
+        <p:blipFill>
+          <a:blip r:embed="rId3" cstate="print"/>
+          <a:srcRect/>
+          <a:stretch>
+            <a:fillRect/>
+          </a:stretch>
+        </p:blipFill>
+        <p:spPr bwMode="auto">
+          <a:xfrm>
+            <a:off x="467544" y="2636912"/>
+            <a:ext cx="4237712" cy="2880320"/>
+          </a:xfrm>
+          <a:prstGeom prst="rect">
+            <a:avLst/>
+          </a:prstGeom>
+          <a:noFill/>
+          <a:ln w="9525">
+            <a:noFill/>
+            <a:miter lim="800000"/>
+            <a:headEnd/>
+            <a:tailEnd/>
+          </a:ln>
+        </p:spPr>
+      </p:pic>
+      <p:pic>
+        <p:nvPicPr>
+          <p:cNvPr id="5124" name="Picture 4"/>
+          <p:cNvPicPr>
+            <a:picLocks noChangeAspect="1" noChangeArrowheads="1"/>
+          </p:cNvPicPr>
+          <p:nvPr/>
+        </p:nvPicPr>
+        <p:blipFill>
+          <a:blip r:embed="rId4" cstate="print"/>
+          <a:srcRect/>
+          <a:stretch>
+            <a:fillRect/>
+          </a:stretch>
+        </p:blipFill>
+        <p:spPr bwMode="auto">
+          <a:xfrm>
+            <a:off x="5049813" y="1484784"/>
+            <a:ext cx="4094187" cy="5170807"/>
+          </a:xfrm>
+          <a:prstGeom prst="rect">
+            <a:avLst/>
+          </a:prstGeom>
+          <a:noFill/>
+          <a:ln w="9525">
+            <a:noFill/>
+            <a:miter lim="800000"/>
+            <a:headEnd/>
+            <a:tailEnd/>
+          </a:ln>
+        </p:spPr>
+      </p:pic>
     </p:spTree>
   </p:cSld>
   <p:clrMapOvr>
@@ -9565,7 +11129,7 @@
           <a:p>
             <a:r>
               <a:rPr lang="pt-BR" dirty="0" smtClean="0"/>
-              <a:t>Java IO</a:t>
+              <a:t>Linguagem Java</a:t>
             </a:r>
             <a:endParaRPr lang="pt-BR" dirty="0"/>
           </a:p>
@@ -9588,10 +11152,77 @@
           </a:bodyPr>
           <a:lstStyle/>
           <a:p>
-            <a:endParaRPr lang="pt-BR" dirty="0" smtClean="0"/>
-          </a:p>
-        </p:txBody>
-      </p:sp>
+            <a:r>
+              <a:rPr lang="pt-BR" dirty="0" smtClean="0"/>
+              <a:t>Estruturas de Controle</a:t>
+            </a:r>
+          </a:p>
+        </p:txBody>
+      </p:sp>
+      <p:pic>
+        <p:nvPicPr>
+          <p:cNvPr id="6146" name="Picture 2"/>
+          <p:cNvPicPr>
+            <a:picLocks noChangeAspect="1" noChangeArrowheads="1"/>
+          </p:cNvPicPr>
+          <p:nvPr/>
+        </p:nvPicPr>
+        <p:blipFill>
+          <a:blip r:embed="rId3" cstate="print"/>
+          <a:srcRect/>
+          <a:stretch>
+            <a:fillRect/>
+          </a:stretch>
+        </p:blipFill>
+        <p:spPr bwMode="auto">
+          <a:xfrm>
+            <a:off x="5796136" y="1916832"/>
+            <a:ext cx="2787749" cy="4525790"/>
+          </a:xfrm>
+          <a:prstGeom prst="rect">
+            <a:avLst/>
+          </a:prstGeom>
+          <a:noFill/>
+          <a:ln w="9525">
+            <a:noFill/>
+            <a:miter lim="800000"/>
+            <a:headEnd/>
+            <a:tailEnd/>
+          </a:ln>
+        </p:spPr>
+      </p:pic>
+      <p:pic>
+        <p:nvPicPr>
+          <p:cNvPr id="6147" name="Picture 3"/>
+          <p:cNvPicPr>
+            <a:picLocks noChangeAspect="1" noChangeArrowheads="1"/>
+          </p:cNvPicPr>
+          <p:nvPr/>
+        </p:nvPicPr>
+        <p:blipFill>
+          <a:blip r:embed="rId4" cstate="print"/>
+          <a:srcRect/>
+          <a:stretch>
+            <a:fillRect/>
+          </a:stretch>
+        </p:blipFill>
+        <p:spPr bwMode="auto">
+          <a:xfrm>
+            <a:off x="179511" y="2492896"/>
+            <a:ext cx="5578725" cy="1440160"/>
+          </a:xfrm>
+          <a:prstGeom prst="rect">
+            <a:avLst/>
+          </a:prstGeom>
+          <a:noFill/>
+          <a:ln w="9525">
+            <a:noFill/>
+            <a:miter lim="800000"/>
+            <a:headEnd/>
+            <a:tailEnd/>
+          </a:ln>
+        </p:spPr>
+      </p:pic>
     </p:spTree>
   </p:cSld>
   <p:clrMapOvr>
@@ -9641,7 +11272,7 @@
           <a:p>
             <a:r>
               <a:rPr lang="pt-BR" dirty="0" smtClean="0"/>
-              <a:t>Banco de Dados</a:t>
+              <a:t>Linguagem Java</a:t>
             </a:r>
             <a:endParaRPr lang="pt-BR" dirty="0"/>
           </a:p>
@@ -9664,10 +11295,1317 @@
           </a:bodyPr>
           <a:lstStyle/>
           <a:p>
+            <a:r>
+              <a:rPr lang="pt-BR" dirty="0" smtClean="0"/>
+              <a:t>Array de Tipos Primitivos</a:t>
+            </a:r>
+          </a:p>
+        </p:txBody>
+      </p:sp>
+      <p:pic>
+        <p:nvPicPr>
+          <p:cNvPr id="7171" name="Picture 3"/>
+          <p:cNvPicPr>
+            <a:picLocks noChangeAspect="1" noChangeArrowheads="1"/>
+          </p:cNvPicPr>
+          <p:nvPr/>
+        </p:nvPicPr>
+        <p:blipFill>
+          <a:blip r:embed="rId3" cstate="print"/>
+          <a:srcRect/>
+          <a:stretch>
+            <a:fillRect/>
+          </a:stretch>
+        </p:blipFill>
+        <p:spPr bwMode="auto">
+          <a:xfrm>
+            <a:off x="548736" y="2719388"/>
+            <a:ext cx="7701275" cy="3445916"/>
+          </a:xfrm>
+          <a:prstGeom prst="rect">
+            <a:avLst/>
+          </a:prstGeom>
+          <a:noFill/>
+          <a:ln w="9525">
+            <a:noFill/>
+            <a:miter lim="800000"/>
+            <a:headEnd/>
+            <a:tailEnd/>
+          </a:ln>
+        </p:spPr>
+      </p:pic>
+    </p:spTree>
+  </p:cSld>
+  <p:clrMapOvr>
+    <a:masterClrMapping/>
+  </p:clrMapOvr>
+  <p:timing>
+    <p:tnLst>
+      <p:par>
+        <p:cTn id="1" dur="indefinite" restart="never" nodeType="tmRoot"/>
+      </p:par>
+    </p:tnLst>
+  </p:timing>
+</p:sld>
+</file>
+
+<file path=ppt/slides/slide32.xml><?xml version="1.0" encoding="utf-8"?>
+<p:sld xmlns:a="http://schemas.openxmlformats.org/drawingml/2006/main" xmlns:r="http://schemas.openxmlformats.org/officeDocument/2006/relationships" xmlns:p="http://schemas.openxmlformats.org/presentationml/2006/main">
+  <p:cSld>
+    <p:spTree>
+      <p:nvGrpSpPr>
+        <p:cNvPr id="1" name=""/>
+        <p:cNvGrpSpPr/>
+        <p:nvPr/>
+      </p:nvGrpSpPr>
+      <p:grpSpPr>
+        <a:xfrm>
+          <a:off x="0" y="0"/>
+          <a:ext cx="0" cy="0"/>
+          <a:chOff x="0" y="0"/>
+          <a:chExt cx="0" cy="0"/>
+        </a:xfrm>
+      </p:grpSpPr>
+      <p:sp>
+        <p:nvSpPr>
+          <p:cNvPr id="2" name="Título 1"/>
+          <p:cNvSpPr>
+            <a:spLocks noGrp="1"/>
+          </p:cNvSpPr>
+          <p:nvPr>
+            <p:ph type="title"/>
+          </p:nvPr>
+        </p:nvSpPr>
+        <p:spPr/>
+        <p:txBody>
+          <a:bodyPr/>
+          <a:lstStyle/>
+          <a:p>
+            <a:r>
+              <a:rPr lang="pt-BR" dirty="0" smtClean="0"/>
+              <a:t>Linguagem Java</a:t>
+            </a:r>
+            <a:endParaRPr lang="pt-BR" dirty="0"/>
+          </a:p>
+        </p:txBody>
+      </p:sp>
+      <p:sp>
+        <p:nvSpPr>
+          <p:cNvPr id="3" name="Espaço Reservado para Conteúdo 2"/>
+          <p:cNvSpPr>
+            <a:spLocks noGrp="1"/>
+          </p:cNvSpPr>
+          <p:nvPr>
+            <p:ph idx="1"/>
+          </p:nvPr>
+        </p:nvSpPr>
+        <p:spPr/>
+        <p:txBody>
+          <a:bodyPr>
+            <a:normAutofit/>
+          </a:bodyPr>
+          <a:lstStyle/>
+          <a:p>
+            <a:r>
+              <a:rPr lang="pt-BR" dirty="0" smtClean="0"/>
+              <a:t>Estruturas de Repetição</a:t>
+            </a:r>
+          </a:p>
+        </p:txBody>
+      </p:sp>
+      <p:pic>
+        <p:nvPicPr>
+          <p:cNvPr id="8194" name="Picture 2"/>
+          <p:cNvPicPr>
+            <a:picLocks noChangeAspect="1" noChangeArrowheads="1"/>
+          </p:cNvPicPr>
+          <p:nvPr/>
+        </p:nvPicPr>
+        <p:blipFill>
+          <a:blip r:embed="rId3" cstate="print"/>
+          <a:srcRect/>
+          <a:stretch>
+            <a:fillRect/>
+          </a:stretch>
+        </p:blipFill>
+        <p:spPr bwMode="auto">
+          <a:xfrm>
+            <a:off x="0" y="2348881"/>
+            <a:ext cx="4586910" cy="3744416"/>
+          </a:xfrm>
+          <a:prstGeom prst="rect">
+            <a:avLst/>
+          </a:prstGeom>
+          <a:noFill/>
+          <a:ln w="9525">
+            <a:noFill/>
+            <a:miter lim="800000"/>
+            <a:headEnd/>
+            <a:tailEnd/>
+          </a:ln>
+        </p:spPr>
+      </p:pic>
+      <p:pic>
+        <p:nvPicPr>
+          <p:cNvPr id="8195" name="Picture 3"/>
+          <p:cNvPicPr>
+            <a:picLocks noChangeAspect="1" noChangeArrowheads="1"/>
+          </p:cNvPicPr>
+          <p:nvPr/>
+        </p:nvPicPr>
+        <p:blipFill>
+          <a:blip r:embed="rId4" cstate="print"/>
+          <a:srcRect/>
+          <a:stretch>
+            <a:fillRect/>
+          </a:stretch>
+        </p:blipFill>
+        <p:spPr bwMode="auto">
+          <a:xfrm>
+            <a:off x="5148064" y="1772816"/>
+            <a:ext cx="2664296" cy="783617"/>
+          </a:xfrm>
+          <a:prstGeom prst="rect">
+            <a:avLst/>
+          </a:prstGeom>
+          <a:noFill/>
+          <a:ln w="9525">
+            <a:noFill/>
+            <a:miter lim="800000"/>
+            <a:headEnd/>
+            <a:tailEnd/>
+          </a:ln>
+        </p:spPr>
+      </p:pic>
+      <p:pic>
+        <p:nvPicPr>
+          <p:cNvPr id="8196" name="Picture 4"/>
+          <p:cNvPicPr>
+            <a:picLocks noChangeAspect="1" noChangeArrowheads="1"/>
+          </p:cNvPicPr>
+          <p:nvPr/>
+        </p:nvPicPr>
+        <p:blipFill>
+          <a:blip r:embed="rId5" cstate="print"/>
+          <a:srcRect/>
+          <a:stretch>
+            <a:fillRect/>
+          </a:stretch>
+        </p:blipFill>
+        <p:spPr bwMode="auto">
+          <a:xfrm>
+            <a:off x="5220072" y="2420888"/>
+            <a:ext cx="2376264" cy="555040"/>
+          </a:xfrm>
+          <a:prstGeom prst="rect">
+            <a:avLst/>
+          </a:prstGeom>
+          <a:noFill/>
+          <a:ln w="9525">
+            <a:noFill/>
+            <a:miter lim="800000"/>
+            <a:headEnd/>
+            <a:tailEnd/>
+          </a:ln>
+        </p:spPr>
+      </p:pic>
+      <p:pic>
+        <p:nvPicPr>
+          <p:cNvPr id="8197" name="Picture 5"/>
+          <p:cNvPicPr>
+            <a:picLocks noChangeAspect="1" noChangeArrowheads="1"/>
+          </p:cNvPicPr>
+          <p:nvPr/>
+        </p:nvPicPr>
+        <p:blipFill>
+          <a:blip r:embed="rId6" cstate="print"/>
+          <a:srcRect/>
+          <a:stretch>
+            <a:fillRect/>
+          </a:stretch>
+        </p:blipFill>
+        <p:spPr bwMode="auto">
+          <a:xfrm>
+            <a:off x="5292080" y="2924944"/>
+            <a:ext cx="2232248" cy="1073524"/>
+          </a:xfrm>
+          <a:prstGeom prst="rect">
+            <a:avLst/>
+          </a:prstGeom>
+          <a:noFill/>
+          <a:ln w="9525">
+            <a:noFill/>
+            <a:miter lim="800000"/>
+            <a:headEnd/>
+            <a:tailEnd/>
+          </a:ln>
+        </p:spPr>
+      </p:pic>
+      <p:pic>
+        <p:nvPicPr>
+          <p:cNvPr id="8198" name="Picture 6"/>
+          <p:cNvPicPr>
+            <a:picLocks noChangeAspect="1" noChangeArrowheads="1"/>
+          </p:cNvPicPr>
+          <p:nvPr/>
+        </p:nvPicPr>
+        <p:blipFill>
+          <a:blip r:embed="rId7" cstate="print"/>
+          <a:srcRect/>
+          <a:stretch>
+            <a:fillRect/>
+          </a:stretch>
+        </p:blipFill>
+        <p:spPr bwMode="auto">
+          <a:xfrm>
+            <a:off x="4352547" y="4509120"/>
+            <a:ext cx="4723382" cy="2088232"/>
+          </a:xfrm>
+          <a:prstGeom prst="rect">
+            <a:avLst/>
+          </a:prstGeom>
+          <a:noFill/>
+          <a:ln w="9525">
+            <a:noFill/>
+            <a:miter lim="800000"/>
+            <a:headEnd/>
+            <a:tailEnd/>
+          </a:ln>
+        </p:spPr>
+      </p:pic>
+    </p:spTree>
+  </p:cSld>
+  <p:clrMapOvr>
+    <a:masterClrMapping/>
+  </p:clrMapOvr>
+  <p:timing>
+    <p:tnLst>
+      <p:par>
+        <p:cTn id="1" dur="indefinite" restart="never" nodeType="tmRoot"/>
+      </p:par>
+    </p:tnLst>
+  </p:timing>
+</p:sld>
+</file>
+
+<file path=ppt/slides/slide33.xml><?xml version="1.0" encoding="utf-8"?>
+<p:sld xmlns:a="http://schemas.openxmlformats.org/drawingml/2006/main" xmlns:r="http://schemas.openxmlformats.org/officeDocument/2006/relationships" xmlns:p="http://schemas.openxmlformats.org/presentationml/2006/main">
+  <p:cSld>
+    <p:spTree>
+      <p:nvGrpSpPr>
+        <p:cNvPr id="1" name=""/>
+        <p:cNvGrpSpPr/>
+        <p:nvPr/>
+      </p:nvGrpSpPr>
+      <p:grpSpPr>
+        <a:xfrm>
+          <a:off x="0" y="0"/>
+          <a:ext cx="0" cy="0"/>
+          <a:chOff x="0" y="0"/>
+          <a:chExt cx="0" cy="0"/>
+        </a:xfrm>
+      </p:grpSpPr>
+      <p:sp>
+        <p:nvSpPr>
+          <p:cNvPr id="2" name="Título 1"/>
+          <p:cNvSpPr>
+            <a:spLocks noGrp="1"/>
+          </p:cNvSpPr>
+          <p:nvPr>
+            <p:ph type="title"/>
+          </p:nvPr>
+        </p:nvSpPr>
+        <p:spPr/>
+        <p:txBody>
+          <a:bodyPr/>
+          <a:lstStyle/>
+          <a:p>
+            <a:r>
+              <a:rPr lang="pt-BR" dirty="0" smtClean="0"/>
+              <a:t>Lista de Exercício 01</a:t>
+            </a:r>
+            <a:endParaRPr lang="pt-BR" dirty="0"/>
+          </a:p>
+        </p:txBody>
+      </p:sp>
+      <p:sp>
+        <p:nvSpPr>
+          <p:cNvPr id="3" name="Espaço Reservado para Conteúdo 2"/>
+          <p:cNvSpPr>
+            <a:spLocks noGrp="1"/>
+          </p:cNvSpPr>
+          <p:nvPr>
+            <p:ph idx="1"/>
+          </p:nvPr>
+        </p:nvSpPr>
+        <p:spPr/>
+        <p:txBody>
+          <a:bodyPr>
+            <a:normAutofit fontScale="92500" lnSpcReduction="20000"/>
+          </a:bodyPr>
+          <a:lstStyle/>
+          <a:p>
+            <a:pPr marL="633222" indent="-514350">
+              <a:buFont typeface="+mj-lt"/>
+              <a:buAutoNum type="arabicPeriod"/>
+            </a:pPr>
+            <a:r>
+              <a:rPr lang="pt-BR" dirty="0" smtClean="0"/>
+              <a:t>Construa um programa que leia do console 3 números inteiros, e imprima </a:t>
+            </a:r>
+            <a:r>
+              <a:rPr lang="pt-BR" dirty="0" smtClean="0"/>
+              <a:t>o </a:t>
+            </a:r>
+            <a:r>
+              <a:rPr lang="pt-BR" dirty="0" smtClean="0"/>
+              <a:t>resultado em ordem crescente.</a:t>
+            </a:r>
+          </a:p>
+          <a:p>
+            <a:pPr marL="633222" indent="-514350">
+              <a:buFont typeface="+mj-lt"/>
+              <a:buAutoNum type="arabicPeriod"/>
+            </a:pPr>
+            <a:r>
+              <a:rPr lang="pt-BR" dirty="0" smtClean="0"/>
+              <a:t>Construa um programa que leia a partir do console a idade de uma pessoa expressa em anos, meses e dias e imprima no console a idade expressa apenas em dias.</a:t>
+            </a:r>
+          </a:p>
+          <a:p>
+            <a:pPr marL="633222" indent="-514350">
+              <a:buFont typeface="+mj-lt"/>
+              <a:buAutoNum type="arabicPeriod"/>
+            </a:pPr>
+            <a:r>
+              <a:rPr lang="pt-BR" dirty="0" smtClean="0"/>
+              <a:t>Construa um programa que leia a partir do console as 3 notas de um aluno e calcule a média final deste aluno, considerando média aritmética simples.</a:t>
+            </a:r>
+          </a:p>
+          <a:p>
+            <a:pPr marL="633222" indent="-514350">
+              <a:buFont typeface="+mj-lt"/>
+              <a:buAutoNum type="arabicPeriod"/>
+            </a:pPr>
             <a:endParaRPr lang="pt-BR" dirty="0" smtClean="0"/>
           </a:p>
-        </p:txBody>
-      </p:sp>
+          <a:p>
+            <a:pPr marL="633222" indent="-514350">
+              <a:buFont typeface="+mj-lt"/>
+              <a:buAutoNum type="arabicPeriod"/>
+            </a:pPr>
+            <a:endParaRPr lang="pt-BR" dirty="0" smtClean="0"/>
+          </a:p>
+          <a:p>
+            <a:endParaRPr lang="pt-BR" dirty="0" smtClean="0"/>
+          </a:p>
+        </p:txBody>
+      </p:sp>
+    </p:spTree>
+  </p:cSld>
+  <p:clrMapOvr>
+    <a:masterClrMapping/>
+  </p:clrMapOvr>
+  <p:timing>
+    <p:tnLst>
+      <p:par>
+        <p:cTn id="1" dur="indefinite" restart="never" nodeType="tmRoot"/>
+      </p:par>
+    </p:tnLst>
+  </p:timing>
+</p:sld>
+</file>
+
+<file path=ppt/slides/slide34.xml><?xml version="1.0" encoding="utf-8"?>
+<p:sld xmlns:a="http://schemas.openxmlformats.org/drawingml/2006/main" xmlns:r="http://schemas.openxmlformats.org/officeDocument/2006/relationships" xmlns:p="http://schemas.openxmlformats.org/presentationml/2006/main">
+  <p:cSld>
+    <p:spTree>
+      <p:nvGrpSpPr>
+        <p:cNvPr id="1" name=""/>
+        <p:cNvGrpSpPr/>
+        <p:nvPr/>
+      </p:nvGrpSpPr>
+      <p:grpSpPr>
+        <a:xfrm>
+          <a:off x="0" y="0"/>
+          <a:ext cx="0" cy="0"/>
+          <a:chOff x="0" y="0"/>
+          <a:chExt cx="0" cy="0"/>
+        </a:xfrm>
+      </p:grpSpPr>
+      <p:sp>
+        <p:nvSpPr>
+          <p:cNvPr id="2" name="Título 1"/>
+          <p:cNvSpPr>
+            <a:spLocks noGrp="1"/>
+          </p:cNvSpPr>
+          <p:nvPr>
+            <p:ph type="title"/>
+          </p:nvPr>
+        </p:nvSpPr>
+        <p:spPr/>
+        <p:txBody>
+          <a:bodyPr/>
+          <a:lstStyle/>
+          <a:p>
+            <a:r>
+              <a:rPr lang="pt-BR" dirty="0" smtClean="0"/>
+              <a:t>Lista de Exercício 01</a:t>
+            </a:r>
+            <a:endParaRPr lang="pt-BR" dirty="0"/>
+          </a:p>
+        </p:txBody>
+      </p:sp>
+      <p:sp>
+        <p:nvSpPr>
+          <p:cNvPr id="3" name="Espaço Reservado para Conteúdo 2"/>
+          <p:cNvSpPr>
+            <a:spLocks noGrp="1"/>
+          </p:cNvSpPr>
+          <p:nvPr>
+            <p:ph idx="1"/>
+          </p:nvPr>
+        </p:nvSpPr>
+        <p:spPr/>
+        <p:txBody>
+          <a:bodyPr>
+            <a:normAutofit fontScale="70000" lnSpcReduction="20000"/>
+          </a:bodyPr>
+          <a:lstStyle/>
+          <a:p>
+            <a:pPr marL="633222" indent="-514350">
+              <a:buFont typeface="+mj-lt"/>
+              <a:buAutoNum type="arabicPeriod" startAt="4"/>
+            </a:pPr>
+            <a:r>
+              <a:rPr lang="pt-BR" dirty="0" smtClean="0"/>
+              <a:t>Construa um programa que leia a partir do console as 3 notas de um aluno e calcule a média final deste aluno. Considerar que a média é ponderada e que o peso das notas são 2,3 e 5, respectivamente</a:t>
+            </a:r>
+            <a:r>
+              <a:rPr lang="pt-BR" dirty="0" smtClean="0"/>
+              <a:t>.</a:t>
+            </a:r>
+          </a:p>
+          <a:p>
+            <a:pPr marL="633222" indent="-514350">
+              <a:buFont typeface="+mj-lt"/>
+              <a:buAutoNum type="arabicPeriod" startAt="4"/>
+            </a:pPr>
+            <a:r>
+              <a:rPr lang="pt-BR" dirty="0" smtClean="0"/>
+              <a:t>O custo ao consumidor de um carro novo é a soma do custo de fábrica </a:t>
+            </a:r>
+            <a:r>
+              <a:rPr lang="pt-BR" dirty="0" smtClean="0"/>
+              <a:t>somados a </a:t>
+            </a:r>
+            <a:r>
+              <a:rPr lang="pt-BR" dirty="0" smtClean="0"/>
+              <a:t>percentagem do distribuidor e dos impostos (aplicados ao custo de fábrica). Supondo que a percentagem do distribuidor seja de </a:t>
+            </a:r>
+            <a:r>
+              <a:rPr lang="pt-BR" dirty="0" smtClean="0"/>
+              <a:t>1,8</a:t>
+            </a:r>
+            <a:r>
+              <a:rPr lang="pt-BR" dirty="0" smtClean="0"/>
+              <a:t>% e os impostos de 45%, escrever um </a:t>
+            </a:r>
+            <a:r>
+              <a:rPr lang="pt-BR" dirty="0" smtClean="0"/>
+              <a:t>programa </a:t>
+            </a:r>
+            <a:r>
+              <a:rPr lang="pt-BR" dirty="0" smtClean="0"/>
+              <a:t>que leia </a:t>
+            </a:r>
+            <a:r>
+              <a:rPr lang="pt-BR" dirty="0" smtClean="0"/>
+              <a:t>do console o </a:t>
+            </a:r>
+            <a:r>
+              <a:rPr lang="pt-BR" dirty="0" smtClean="0"/>
+              <a:t>custo de fábrica de um carro e </a:t>
+            </a:r>
+            <a:r>
+              <a:rPr lang="pt-BR" dirty="0" smtClean="0"/>
+              <a:t>imprima o custo final</a:t>
+            </a:r>
+          </a:p>
+          <a:p>
+            <a:pPr marL="633222" indent="-514350">
+              <a:buFont typeface="+mj-lt"/>
+              <a:buAutoNum type="arabicPeriod" startAt="4"/>
+            </a:pPr>
+            <a:r>
+              <a:rPr lang="pt-BR" dirty="0" smtClean="0"/>
+              <a:t>Construa um programa que calcule </a:t>
+            </a:r>
+            <a:r>
+              <a:rPr lang="pt-BR" dirty="0" smtClean="0"/>
+              <a:t>a média aritmética das 3 notas de um aluno e mostre, além do valor da média, uma mensagem de "Aprovado", caso a média seja igual ou superior a 6, ou </a:t>
+            </a:r>
+            <a:r>
+              <a:rPr lang="pt-BR" dirty="0" smtClean="0"/>
+              <a:t>a mensagem </a:t>
+            </a:r>
+            <a:r>
+              <a:rPr lang="pt-BR" dirty="0" smtClean="0"/>
+              <a:t>"reprovado", caso contrário</a:t>
+            </a:r>
+            <a:r>
+              <a:rPr lang="pt-BR" dirty="0" smtClean="0"/>
+              <a:t>. Ao invés de ler as notas do console, sorteie (randomicamente) valores inteiros de 1 a 10</a:t>
+            </a:r>
+            <a:endParaRPr lang="pt-BR" dirty="0" smtClean="0"/>
+          </a:p>
+        </p:txBody>
+      </p:sp>
+    </p:spTree>
+  </p:cSld>
+  <p:clrMapOvr>
+    <a:masterClrMapping/>
+  </p:clrMapOvr>
+  <p:timing>
+    <p:tnLst>
+      <p:par>
+        <p:cTn id="1" dur="indefinite" restart="never" nodeType="tmRoot"/>
+      </p:par>
+    </p:tnLst>
+  </p:timing>
+</p:sld>
+</file>
+
+<file path=ppt/slides/slide35.xml><?xml version="1.0" encoding="utf-8"?>
+<p:sld xmlns:a="http://schemas.openxmlformats.org/drawingml/2006/main" xmlns:r="http://schemas.openxmlformats.org/officeDocument/2006/relationships" xmlns:p="http://schemas.openxmlformats.org/presentationml/2006/main">
+  <p:cSld>
+    <p:spTree>
+      <p:nvGrpSpPr>
+        <p:cNvPr id="1" name=""/>
+        <p:cNvGrpSpPr/>
+        <p:nvPr/>
+      </p:nvGrpSpPr>
+      <p:grpSpPr>
+        <a:xfrm>
+          <a:off x="0" y="0"/>
+          <a:ext cx="0" cy="0"/>
+          <a:chOff x="0" y="0"/>
+          <a:chExt cx="0" cy="0"/>
+        </a:xfrm>
+      </p:grpSpPr>
+      <p:sp>
+        <p:nvSpPr>
+          <p:cNvPr id="2" name="Título 1"/>
+          <p:cNvSpPr>
+            <a:spLocks noGrp="1"/>
+          </p:cNvSpPr>
+          <p:nvPr>
+            <p:ph type="title"/>
+          </p:nvPr>
+        </p:nvSpPr>
+        <p:spPr/>
+        <p:txBody>
+          <a:bodyPr/>
+          <a:lstStyle/>
+          <a:p>
+            <a:r>
+              <a:rPr lang="pt-BR" dirty="0" smtClean="0"/>
+              <a:t>Lista de Exercício 01</a:t>
+            </a:r>
+            <a:endParaRPr lang="pt-BR" dirty="0"/>
+          </a:p>
+        </p:txBody>
+      </p:sp>
+      <p:sp>
+        <p:nvSpPr>
+          <p:cNvPr id="3" name="Espaço Reservado para Conteúdo 2"/>
+          <p:cNvSpPr>
+            <a:spLocks noGrp="1"/>
+          </p:cNvSpPr>
+          <p:nvPr>
+            <p:ph idx="1"/>
+          </p:nvPr>
+        </p:nvSpPr>
+        <p:spPr/>
+        <p:txBody>
+          <a:bodyPr>
+            <a:normAutofit fontScale="92500" lnSpcReduction="20000"/>
+          </a:bodyPr>
+          <a:lstStyle/>
+          <a:p>
+            <a:pPr marL="633222" indent="-514350">
+              <a:buFont typeface="+mj-lt"/>
+              <a:buAutoNum type="arabicPeriod" startAt="7"/>
+            </a:pPr>
+            <a:r>
+              <a:rPr lang="pt-BR" dirty="0" smtClean="0"/>
+              <a:t>Elaborar um </a:t>
+            </a:r>
+            <a:r>
+              <a:rPr lang="pt-BR" dirty="0" smtClean="0"/>
+              <a:t>programa </a:t>
+            </a:r>
+            <a:r>
+              <a:rPr lang="pt-BR" dirty="0" smtClean="0"/>
+              <a:t>que lê 2 </a:t>
+            </a:r>
+            <a:r>
+              <a:rPr lang="pt-BR" dirty="0" smtClean="0"/>
+              <a:t>números e imprime a </a:t>
+            </a:r>
+            <a:r>
+              <a:rPr lang="pt-BR" dirty="0" smtClean="0"/>
+              <a:t>mensagem: "São múltiplos" ou "Não são </a:t>
+            </a:r>
+            <a:r>
+              <a:rPr lang="pt-BR" dirty="0" smtClean="0"/>
+              <a:t>múltiplos“</a:t>
+            </a:r>
+          </a:p>
+          <a:p>
+            <a:pPr marL="633222" indent="-514350">
+              <a:buFont typeface="+mj-lt"/>
+              <a:buAutoNum type="arabicPeriod" startAt="7"/>
+            </a:pPr>
+            <a:r>
+              <a:rPr lang="pt-BR" dirty="0" smtClean="0"/>
+              <a:t>Elabore um </a:t>
+            </a:r>
+            <a:r>
+              <a:rPr lang="pt-BR" dirty="0" smtClean="0"/>
+              <a:t>programa </a:t>
+            </a:r>
+            <a:r>
+              <a:rPr lang="pt-BR" dirty="0" smtClean="0"/>
+              <a:t>que dada a idade de um nadador classifica-o em uma das </a:t>
+            </a:r>
+            <a:r>
+              <a:rPr lang="pt-BR" dirty="0" smtClean="0"/>
+              <a:t>seguintes categorias</a:t>
+            </a:r>
+            <a:r>
+              <a:rPr lang="pt-BR" dirty="0" smtClean="0"/>
+              <a:t>:</a:t>
+            </a:r>
+          </a:p>
+          <a:p>
+            <a:pPr marL="925830" lvl="1" indent="-514350"/>
+            <a:r>
+              <a:rPr lang="pt-BR" dirty="0" smtClean="0"/>
+              <a:t>Infantil A = 5-7 anos</a:t>
+            </a:r>
+          </a:p>
+          <a:p>
+            <a:pPr marL="925830" lvl="1" indent="-514350"/>
+            <a:r>
+              <a:rPr lang="pt-BR" dirty="0" smtClean="0"/>
+              <a:t>Infantil B = 8-10 anos</a:t>
+            </a:r>
+          </a:p>
+          <a:p>
+            <a:pPr marL="925830" lvl="1" indent="-514350"/>
+            <a:r>
+              <a:rPr lang="pt-BR" dirty="0" smtClean="0"/>
+              <a:t>Juvenil A = 11-13 anos</a:t>
+            </a:r>
+          </a:p>
+          <a:p>
+            <a:pPr marL="925830" lvl="1" indent="-514350"/>
+            <a:r>
+              <a:rPr lang="pt-BR" dirty="0" smtClean="0"/>
+              <a:t>Juvenil B = 14-17 anos</a:t>
+            </a:r>
+          </a:p>
+          <a:p>
+            <a:pPr marL="925830" lvl="1" indent="-514350"/>
+            <a:r>
+              <a:rPr lang="pt-BR" dirty="0" smtClean="0"/>
+              <a:t>Adulto = maiores de 18 anos</a:t>
+            </a:r>
+            <a:endParaRPr lang="pt-BR" dirty="0" smtClean="0"/>
+          </a:p>
+        </p:txBody>
+      </p:sp>
+    </p:spTree>
+  </p:cSld>
+  <p:clrMapOvr>
+    <a:masterClrMapping/>
+  </p:clrMapOvr>
+  <p:timing>
+    <p:tnLst>
+      <p:par>
+        <p:cTn id="1" dur="indefinite" restart="never" nodeType="tmRoot"/>
+      </p:par>
+    </p:tnLst>
+  </p:timing>
+</p:sld>
+</file>
+
+<file path=ppt/slides/slide36.xml><?xml version="1.0" encoding="utf-8"?>
+<p:sld xmlns:a="http://schemas.openxmlformats.org/drawingml/2006/main" xmlns:r="http://schemas.openxmlformats.org/officeDocument/2006/relationships" xmlns:p="http://schemas.openxmlformats.org/presentationml/2006/main">
+  <p:cSld>
+    <p:spTree>
+      <p:nvGrpSpPr>
+        <p:cNvPr id="1" name=""/>
+        <p:cNvGrpSpPr/>
+        <p:nvPr/>
+      </p:nvGrpSpPr>
+      <p:grpSpPr>
+        <a:xfrm>
+          <a:off x="0" y="0"/>
+          <a:ext cx="0" cy="0"/>
+          <a:chOff x="0" y="0"/>
+          <a:chExt cx="0" cy="0"/>
+        </a:xfrm>
+      </p:grpSpPr>
+      <p:sp>
+        <p:nvSpPr>
+          <p:cNvPr id="2" name="Título 1"/>
+          <p:cNvSpPr>
+            <a:spLocks noGrp="1"/>
+          </p:cNvSpPr>
+          <p:nvPr>
+            <p:ph type="title"/>
+          </p:nvPr>
+        </p:nvSpPr>
+        <p:spPr/>
+        <p:txBody>
+          <a:bodyPr/>
+          <a:lstStyle/>
+          <a:p>
+            <a:r>
+              <a:rPr lang="pt-BR" dirty="0" smtClean="0"/>
+              <a:t>Lista de Exercício 01</a:t>
+            </a:r>
+            <a:endParaRPr lang="pt-BR" dirty="0"/>
+          </a:p>
+        </p:txBody>
+      </p:sp>
+      <p:sp>
+        <p:nvSpPr>
+          <p:cNvPr id="3" name="Espaço Reservado para Conteúdo 2"/>
+          <p:cNvSpPr>
+            <a:spLocks noGrp="1"/>
+          </p:cNvSpPr>
+          <p:nvPr>
+            <p:ph idx="1"/>
+          </p:nvPr>
+        </p:nvSpPr>
+        <p:spPr>
+          <a:xfrm>
+            <a:off x="457200" y="1775191"/>
+            <a:ext cx="8229600" cy="2517905"/>
+          </a:xfrm>
+        </p:spPr>
+        <p:txBody>
+          <a:bodyPr>
+            <a:normAutofit fontScale="85000" lnSpcReduction="20000"/>
+          </a:bodyPr>
+          <a:lstStyle/>
+          <a:p>
+            <a:pPr marL="633222" indent="-514350">
+              <a:buFont typeface="+mj-lt"/>
+              <a:buAutoNum type="arabicPeriod" startAt="7"/>
+            </a:pPr>
+            <a:r>
+              <a:rPr lang="pt-BR" dirty="0" smtClean="0"/>
+              <a:t>Um usuário deseja um algoritmo onde possa escolher que tipo de média deseja calcular a partir de 3 notas. Faça um </a:t>
+            </a:r>
+            <a:r>
+              <a:rPr lang="pt-BR" dirty="0" smtClean="0"/>
+              <a:t>programa </a:t>
+            </a:r>
+            <a:r>
+              <a:rPr lang="pt-BR" dirty="0" smtClean="0"/>
+              <a:t>que leia </a:t>
+            </a:r>
+            <a:r>
+              <a:rPr lang="pt-BR" dirty="0" smtClean="0"/>
+              <a:t>a partir do console as </a:t>
+            </a:r>
+            <a:r>
+              <a:rPr lang="pt-BR" dirty="0" smtClean="0"/>
+              <a:t>notas, a opção escolhida pelo usuário e calcule </a:t>
+            </a:r>
+            <a:r>
+              <a:rPr lang="pt-BR" dirty="0" smtClean="0"/>
+              <a:t>o resultado. Opções: (1) aritmética</a:t>
+            </a:r>
+            <a:r>
+              <a:rPr lang="pt-BR" dirty="0" smtClean="0"/>
+              <a:t>, </a:t>
+            </a:r>
+            <a:r>
+              <a:rPr lang="pt-BR" dirty="0" smtClean="0"/>
+              <a:t>(2) ponderada [valores da ponderação: 3,3,4 </a:t>
+            </a:r>
+            <a:r>
+              <a:rPr lang="pt-BR" dirty="0" smtClean="0"/>
+              <a:t>e harmônica</a:t>
+            </a:r>
+            <a:endParaRPr lang="pt-BR" dirty="0" smtClean="0"/>
+          </a:p>
+        </p:txBody>
+      </p:sp>
+      <p:pic>
+        <p:nvPicPr>
+          <p:cNvPr id="1027" name="Picture 3"/>
+          <p:cNvPicPr>
+            <a:picLocks noChangeAspect="1" noChangeArrowheads="1"/>
+          </p:cNvPicPr>
+          <p:nvPr/>
+        </p:nvPicPr>
+        <p:blipFill>
+          <a:blip r:embed="rId3" cstate="print"/>
+          <a:srcRect/>
+          <a:stretch>
+            <a:fillRect/>
+          </a:stretch>
+        </p:blipFill>
+        <p:spPr bwMode="auto">
+          <a:xfrm>
+            <a:off x="179512" y="4653136"/>
+            <a:ext cx="8784976" cy="1425500"/>
+          </a:xfrm>
+          <a:prstGeom prst="rect">
+            <a:avLst/>
+          </a:prstGeom>
+          <a:noFill/>
+          <a:ln w="9525">
+            <a:noFill/>
+            <a:miter lim="800000"/>
+            <a:headEnd/>
+            <a:tailEnd/>
+          </a:ln>
+        </p:spPr>
+      </p:pic>
+    </p:spTree>
+  </p:cSld>
+  <p:clrMapOvr>
+    <a:masterClrMapping/>
+  </p:clrMapOvr>
+  <p:timing>
+    <p:tnLst>
+      <p:par>
+        <p:cTn id="1" dur="indefinite" restart="never" nodeType="tmRoot"/>
+      </p:par>
+    </p:tnLst>
+  </p:timing>
+</p:sld>
+</file>
+
+<file path=ppt/slides/slide37.xml><?xml version="1.0" encoding="utf-8"?>
+<p:sld xmlns:a="http://schemas.openxmlformats.org/drawingml/2006/main" xmlns:r="http://schemas.openxmlformats.org/officeDocument/2006/relationships" xmlns:p="http://schemas.openxmlformats.org/presentationml/2006/main">
+  <p:cSld>
+    <p:spTree>
+      <p:nvGrpSpPr>
+        <p:cNvPr id="1" name=""/>
+        <p:cNvGrpSpPr/>
+        <p:nvPr/>
+      </p:nvGrpSpPr>
+      <p:grpSpPr>
+        <a:xfrm>
+          <a:off x="0" y="0"/>
+          <a:ext cx="0" cy="0"/>
+          <a:chOff x="0" y="0"/>
+          <a:chExt cx="0" cy="0"/>
+        </a:xfrm>
+      </p:grpSpPr>
+      <p:sp>
+        <p:nvSpPr>
+          <p:cNvPr id="2" name="Título 1"/>
+          <p:cNvSpPr>
+            <a:spLocks noGrp="1"/>
+          </p:cNvSpPr>
+          <p:nvPr>
+            <p:ph type="title"/>
+          </p:nvPr>
+        </p:nvSpPr>
+        <p:spPr/>
+        <p:txBody>
+          <a:bodyPr/>
+          <a:lstStyle/>
+          <a:p>
+            <a:r>
+              <a:rPr lang="pt-BR" dirty="0" smtClean="0"/>
+              <a:t>Lista de Exercício 01</a:t>
+            </a:r>
+            <a:endParaRPr lang="pt-BR" dirty="0"/>
+          </a:p>
+        </p:txBody>
+      </p:sp>
+      <p:sp>
+        <p:nvSpPr>
+          <p:cNvPr id="3" name="Espaço Reservado para Conteúdo 2"/>
+          <p:cNvSpPr>
+            <a:spLocks noGrp="1"/>
+          </p:cNvSpPr>
+          <p:nvPr>
+            <p:ph idx="1"/>
+          </p:nvPr>
+        </p:nvSpPr>
+        <p:spPr>
+          <a:xfrm>
+            <a:off x="457200" y="1775191"/>
+            <a:ext cx="8229600" cy="4750153"/>
+          </a:xfrm>
+        </p:spPr>
+        <p:txBody>
+          <a:bodyPr>
+            <a:normAutofit fontScale="70000" lnSpcReduction="20000"/>
+          </a:bodyPr>
+          <a:lstStyle/>
+          <a:p>
+            <a:pPr marL="633222" indent="-514350">
+              <a:buFont typeface="+mj-lt"/>
+              <a:buAutoNum type="arabicPeriod" startAt="8"/>
+            </a:pPr>
+            <a:r>
+              <a:rPr lang="pt-BR" dirty="0" smtClean="0"/>
+              <a:t>Construa um programa que imprime os números de 1 a 50 em ordem crescente e também em ordem decrescente</a:t>
+            </a:r>
+          </a:p>
+          <a:p>
+            <a:pPr marL="633222" indent="-514350">
+              <a:buFont typeface="+mj-lt"/>
+              <a:buAutoNum type="arabicPeriod" startAt="8"/>
+            </a:pPr>
+            <a:r>
+              <a:rPr lang="pt-BR" dirty="0" smtClean="0"/>
+              <a:t>Construa um programa que imprime </a:t>
+            </a:r>
+            <a:r>
+              <a:rPr lang="pt-BR" dirty="0" smtClean="0"/>
+              <a:t>apenas os números pares entre 1 </a:t>
+            </a:r>
+            <a:r>
+              <a:rPr lang="pt-BR" dirty="0" smtClean="0"/>
+              <a:t>a </a:t>
+            </a:r>
+            <a:r>
+              <a:rPr lang="pt-BR" dirty="0" smtClean="0"/>
+              <a:t>50</a:t>
+            </a:r>
+          </a:p>
+          <a:p>
+            <a:pPr marL="633222" indent="-514350">
+              <a:buFont typeface="+mj-lt"/>
+              <a:buAutoNum type="arabicPeriod" startAt="8"/>
+            </a:pPr>
+            <a:r>
+              <a:rPr lang="pt-BR" dirty="0" smtClean="0"/>
+              <a:t>Construa um programa que leia dois números inteiros, X e Y, e mostre o resultado de X elevado a potência Y</a:t>
+            </a:r>
+          </a:p>
+          <a:p>
+            <a:pPr marL="633222" indent="-514350">
+              <a:buFont typeface="+mj-lt"/>
+              <a:buAutoNum type="arabicPeriod" startAt="8"/>
+            </a:pPr>
+            <a:r>
+              <a:rPr lang="pt-BR" dirty="0" smtClean="0"/>
+              <a:t>Construa um programa que sorteie um número entre 1 e 20 e retorne o Fatorial do mesmo</a:t>
+            </a:r>
+          </a:p>
+          <a:p>
+            <a:pPr marL="633222" indent="-514350">
+              <a:buFont typeface="+mj-lt"/>
+              <a:buAutoNum type="arabicPeriod" startAt="8"/>
+            </a:pPr>
+            <a:r>
+              <a:rPr lang="pt-BR" dirty="0" smtClean="0"/>
+              <a:t>Elabore um programa que solicite que o usuário entre com dois números (inicial e final), e apresente o valor total da soma de todos os números do intervalo </a:t>
+            </a:r>
+            <a:r>
+              <a:rPr lang="pt-BR" dirty="0" smtClean="0"/>
+              <a:t>informado</a:t>
+            </a:r>
+          </a:p>
+          <a:p>
+            <a:pPr marL="633222" indent="-514350">
+              <a:buFont typeface="+mj-lt"/>
+              <a:buAutoNum type="arabicPeriod" startAt="8"/>
+            </a:pPr>
+            <a:r>
+              <a:rPr lang="pt-BR" dirty="0" smtClean="0"/>
+              <a:t>Construa um programa para ler do console um número e informar se o mesmo é “Primo”</a:t>
+            </a:r>
+          </a:p>
+          <a:p>
+            <a:pPr marL="633222" indent="-514350">
+              <a:buFont typeface="+mj-lt"/>
+              <a:buAutoNum type="arabicPeriod" startAt="8"/>
+            </a:pPr>
+            <a:r>
+              <a:rPr lang="pt-BR" dirty="0" smtClean="0"/>
+              <a:t>Escreva um </a:t>
+            </a:r>
+            <a:r>
+              <a:rPr lang="pt-BR" dirty="0" smtClean="0"/>
+              <a:t>programa </a:t>
+            </a:r>
+            <a:r>
+              <a:rPr lang="pt-BR" dirty="0" smtClean="0"/>
+              <a:t>que calcule o valor de H, sendo que ele é determinado pela série H = 1/1 + 3/2 + 5/3 + 7/4 + ... + 99/50</a:t>
+            </a:r>
+            <a:endParaRPr lang="pt-BR" dirty="0" smtClean="0"/>
+          </a:p>
+        </p:txBody>
+      </p:sp>
+    </p:spTree>
+  </p:cSld>
+  <p:clrMapOvr>
+    <a:masterClrMapping/>
+  </p:clrMapOvr>
+  <p:timing>
+    <p:tnLst>
+      <p:par>
+        <p:cTn id="1" dur="indefinite" restart="never" nodeType="tmRoot"/>
+      </p:par>
+    </p:tnLst>
+  </p:timing>
+</p:sld>
+</file>
+
+<file path=ppt/slides/slide38.xml><?xml version="1.0" encoding="utf-8"?>
+<p:sld xmlns:a="http://schemas.openxmlformats.org/drawingml/2006/main" xmlns:r="http://schemas.openxmlformats.org/officeDocument/2006/relationships" xmlns:p="http://schemas.openxmlformats.org/presentationml/2006/main">
+  <p:cSld>
+    <p:spTree>
+      <p:nvGrpSpPr>
+        <p:cNvPr id="1" name=""/>
+        <p:cNvGrpSpPr/>
+        <p:nvPr/>
+      </p:nvGrpSpPr>
+      <p:grpSpPr>
+        <a:xfrm>
+          <a:off x="0" y="0"/>
+          <a:ext cx="0" cy="0"/>
+          <a:chOff x="0" y="0"/>
+          <a:chExt cx="0" cy="0"/>
+        </a:xfrm>
+      </p:grpSpPr>
+      <p:sp>
+        <p:nvSpPr>
+          <p:cNvPr id="2" name="Título 1"/>
+          <p:cNvSpPr>
+            <a:spLocks noGrp="1"/>
+          </p:cNvSpPr>
+          <p:nvPr>
+            <p:ph type="title"/>
+          </p:nvPr>
+        </p:nvSpPr>
+        <p:spPr/>
+        <p:txBody>
+          <a:bodyPr/>
+          <a:lstStyle/>
+          <a:p>
+            <a:r>
+              <a:rPr lang="pt-BR" dirty="0" smtClean="0"/>
+              <a:t>Lista de Exercício 01</a:t>
+            </a:r>
+            <a:endParaRPr lang="pt-BR" dirty="0"/>
+          </a:p>
+        </p:txBody>
+      </p:sp>
+      <p:sp>
+        <p:nvSpPr>
+          <p:cNvPr id="3" name="Espaço Reservado para Conteúdo 2"/>
+          <p:cNvSpPr>
+            <a:spLocks noGrp="1"/>
+          </p:cNvSpPr>
+          <p:nvPr>
+            <p:ph idx="1"/>
+          </p:nvPr>
+        </p:nvSpPr>
+        <p:spPr>
+          <a:xfrm>
+            <a:off x="457200" y="1775191"/>
+            <a:ext cx="8229600" cy="3309993"/>
+          </a:xfrm>
+        </p:spPr>
+        <p:txBody>
+          <a:bodyPr>
+            <a:normAutofit fontScale="92500" lnSpcReduction="20000"/>
+          </a:bodyPr>
+          <a:lstStyle/>
+          <a:p>
+            <a:pPr marL="633222" indent="-514350">
+              <a:buFont typeface="+mj-lt"/>
+              <a:buAutoNum type="arabicPeriod" startAt="15"/>
+            </a:pPr>
+            <a:r>
+              <a:rPr lang="pt-BR" dirty="0" smtClean="0"/>
+              <a:t>Dado uma série infinita </a:t>
+            </a:r>
+            <a:r>
+              <a:rPr lang="pt-BR" dirty="0" smtClean="0"/>
+              <a:t>(fórmula abaixo), e calcule </a:t>
+            </a:r>
+            <a:r>
+              <a:rPr lang="pt-BR" dirty="0" smtClean="0"/>
+              <a:t>o valor da série até atingir a precisão de </a:t>
+            </a:r>
+            <a:r>
+              <a:rPr lang="pt-BR" dirty="0" smtClean="0"/>
+              <a:t>0,001. A precisão é alcançada quando a diferença entre uma iteração e outra é inferior a precisão desejada. Exiba o resultado da soma e a quantidade de iterações. Posteriormente aumenta a precisão para 0,000001 e compare o resultado</a:t>
+            </a:r>
+            <a:endParaRPr lang="pt-BR" dirty="0" smtClean="0"/>
+          </a:p>
+        </p:txBody>
+      </p:sp>
+      <p:pic>
+        <p:nvPicPr>
+          <p:cNvPr id="2050" name="Picture 2"/>
+          <p:cNvPicPr>
+            <a:picLocks noChangeAspect="1" noChangeArrowheads="1"/>
+          </p:cNvPicPr>
+          <p:nvPr/>
+        </p:nvPicPr>
+        <p:blipFill>
+          <a:blip r:embed="rId3" cstate="print"/>
+          <a:srcRect/>
+          <a:stretch>
+            <a:fillRect/>
+          </a:stretch>
+        </p:blipFill>
+        <p:spPr bwMode="auto">
+          <a:xfrm>
+            <a:off x="1835696" y="4941168"/>
+            <a:ext cx="5472608" cy="1242688"/>
+          </a:xfrm>
+          <a:prstGeom prst="rect">
+            <a:avLst/>
+          </a:prstGeom>
+          <a:noFill/>
+          <a:ln w="9525">
+            <a:noFill/>
+            <a:miter lim="800000"/>
+            <a:headEnd/>
+            <a:tailEnd/>
+          </a:ln>
+        </p:spPr>
+      </p:pic>
+    </p:spTree>
+  </p:cSld>
+  <p:clrMapOvr>
+    <a:masterClrMapping/>
+  </p:clrMapOvr>
+  <p:timing>
+    <p:tnLst>
+      <p:par>
+        <p:cTn id="1" dur="indefinite" restart="never" nodeType="tmRoot"/>
+      </p:par>
+    </p:tnLst>
+  </p:timing>
+</p:sld>
+</file>
+
+<file path=ppt/slides/slide39.xml><?xml version="1.0" encoding="utf-8"?>
+<p:sld xmlns:a="http://schemas.openxmlformats.org/drawingml/2006/main" xmlns:r="http://schemas.openxmlformats.org/officeDocument/2006/relationships" xmlns:p="http://schemas.openxmlformats.org/presentationml/2006/main">
+  <p:cSld>
+    <p:spTree>
+      <p:nvGrpSpPr>
+        <p:cNvPr id="1" name=""/>
+        <p:cNvGrpSpPr/>
+        <p:nvPr/>
+      </p:nvGrpSpPr>
+      <p:grpSpPr>
+        <a:xfrm>
+          <a:off x="0" y="0"/>
+          <a:ext cx="0" cy="0"/>
+          <a:chOff x="0" y="0"/>
+          <a:chExt cx="0" cy="0"/>
+        </a:xfrm>
+      </p:grpSpPr>
+      <p:sp>
+        <p:nvSpPr>
+          <p:cNvPr id="2" name="Título 1"/>
+          <p:cNvSpPr>
+            <a:spLocks noGrp="1"/>
+          </p:cNvSpPr>
+          <p:nvPr>
+            <p:ph type="title"/>
+          </p:nvPr>
+        </p:nvSpPr>
+        <p:spPr/>
+        <p:txBody>
+          <a:bodyPr/>
+          <a:lstStyle/>
+          <a:p>
+            <a:r>
+              <a:rPr lang="pt-BR" dirty="0" smtClean="0"/>
+              <a:t>Lista de Exercício 01</a:t>
+            </a:r>
+            <a:endParaRPr lang="pt-BR" dirty="0"/>
+          </a:p>
+        </p:txBody>
+      </p:sp>
+      <p:sp>
+        <p:nvSpPr>
+          <p:cNvPr id="3" name="Espaço Reservado para Conteúdo 2"/>
+          <p:cNvSpPr>
+            <a:spLocks noGrp="1"/>
+          </p:cNvSpPr>
+          <p:nvPr>
+            <p:ph idx="1"/>
+          </p:nvPr>
+        </p:nvSpPr>
+        <p:spPr>
+          <a:xfrm>
+            <a:off x="457200" y="1775191"/>
+            <a:ext cx="8229600" cy="2517905"/>
+          </a:xfrm>
+        </p:spPr>
+        <p:txBody>
+          <a:bodyPr>
+            <a:normAutofit/>
+          </a:bodyPr>
+          <a:lstStyle/>
+          <a:p>
+            <a:pPr marL="633222" indent="-514350">
+              <a:buFont typeface="+mj-lt"/>
+              <a:buAutoNum type="arabicPeriod" startAt="16"/>
+            </a:pPr>
+            <a:r>
+              <a:rPr lang="pt-BR" dirty="0" smtClean="0"/>
+              <a:t>Calcule o famoso número PI através da série infinita descoberta pelo grande matemático Leibniz. Calcule com precisão 0,01 e depois aumente a precisão para 0,0001</a:t>
+            </a:r>
+            <a:endParaRPr lang="pt-BR" dirty="0" smtClean="0"/>
+          </a:p>
+        </p:txBody>
+      </p:sp>
+      <p:pic>
+        <p:nvPicPr>
+          <p:cNvPr id="3074" name="Picture 2"/>
+          <p:cNvPicPr>
+            <a:picLocks noChangeAspect="1" noChangeArrowheads="1"/>
+          </p:cNvPicPr>
+          <p:nvPr/>
+        </p:nvPicPr>
+        <p:blipFill>
+          <a:blip r:embed="rId3" cstate="print"/>
+          <a:srcRect/>
+          <a:stretch>
+            <a:fillRect/>
+          </a:stretch>
+        </p:blipFill>
+        <p:spPr bwMode="auto">
+          <a:xfrm>
+            <a:off x="2195736" y="4293096"/>
+            <a:ext cx="4179373" cy="1224136"/>
+          </a:xfrm>
+          <a:prstGeom prst="rect">
+            <a:avLst/>
+          </a:prstGeom>
+          <a:noFill/>
+          <a:ln w="9525">
+            <a:noFill/>
+            <a:miter lim="800000"/>
+            <a:headEnd/>
+            <a:tailEnd/>
+          </a:ln>
+        </p:spPr>
+      </p:pic>
     </p:spTree>
   </p:cSld>
   <p:clrMapOvr>
@@ -9831,6 +12769,981 @@
               <a:rPr lang="pt-BR" dirty="0" smtClean="0"/>
               <a:t>Micro dispositivos, cartões, ...</a:t>
             </a:r>
+          </a:p>
+        </p:txBody>
+      </p:sp>
+    </p:spTree>
+  </p:cSld>
+  <p:clrMapOvr>
+    <a:masterClrMapping/>
+  </p:clrMapOvr>
+  <p:timing>
+    <p:tnLst>
+      <p:par>
+        <p:cTn id="1" dur="indefinite" restart="never" nodeType="tmRoot"/>
+      </p:par>
+    </p:tnLst>
+  </p:timing>
+</p:sld>
+</file>
+
+<file path=ppt/slides/slide40.xml><?xml version="1.0" encoding="utf-8"?>
+<p:sld xmlns:a="http://schemas.openxmlformats.org/drawingml/2006/main" xmlns:r="http://schemas.openxmlformats.org/officeDocument/2006/relationships" xmlns:p="http://schemas.openxmlformats.org/presentationml/2006/main">
+  <p:cSld>
+    <p:spTree>
+      <p:nvGrpSpPr>
+        <p:cNvPr id="1" name=""/>
+        <p:cNvGrpSpPr/>
+        <p:nvPr/>
+      </p:nvGrpSpPr>
+      <p:grpSpPr>
+        <a:xfrm>
+          <a:off x="0" y="0"/>
+          <a:ext cx="0" cy="0"/>
+          <a:chOff x="0" y="0"/>
+          <a:chExt cx="0" cy="0"/>
+        </a:xfrm>
+      </p:grpSpPr>
+      <p:sp>
+        <p:nvSpPr>
+          <p:cNvPr id="2" name="Título 1"/>
+          <p:cNvSpPr>
+            <a:spLocks noGrp="1"/>
+          </p:cNvSpPr>
+          <p:nvPr>
+            <p:ph type="title"/>
+          </p:nvPr>
+        </p:nvSpPr>
+        <p:spPr/>
+        <p:txBody>
+          <a:bodyPr/>
+          <a:lstStyle/>
+          <a:p>
+            <a:r>
+              <a:rPr lang="pt-BR" dirty="0" smtClean="0"/>
+              <a:t>Lista de Exercício 01</a:t>
+            </a:r>
+            <a:endParaRPr lang="pt-BR" dirty="0"/>
+          </a:p>
+        </p:txBody>
+      </p:sp>
+      <p:sp>
+        <p:nvSpPr>
+          <p:cNvPr id="3" name="Espaço Reservado para Conteúdo 2"/>
+          <p:cNvSpPr>
+            <a:spLocks noGrp="1"/>
+          </p:cNvSpPr>
+          <p:nvPr>
+            <p:ph idx="1"/>
+          </p:nvPr>
+        </p:nvSpPr>
+        <p:spPr>
+          <a:xfrm>
+            <a:off x="457200" y="1775191"/>
+            <a:ext cx="8229600" cy="4750153"/>
+          </a:xfrm>
+        </p:spPr>
+        <p:txBody>
+          <a:bodyPr>
+            <a:normAutofit fontScale="70000" lnSpcReduction="20000"/>
+          </a:bodyPr>
+          <a:lstStyle/>
+          <a:p>
+            <a:pPr marL="633222" indent="-514350">
+              <a:buFont typeface="+mj-lt"/>
+              <a:buAutoNum type="arabicPeriod" startAt="17"/>
+            </a:pPr>
+            <a:r>
+              <a:rPr lang="pt-BR" dirty="0" smtClean="0"/>
+              <a:t>Construa um programa para calcular o fatorial de um número inteiro positivo. Utilize um algoritmo </a:t>
+            </a:r>
+            <a:r>
+              <a:rPr lang="pt-BR" dirty="0" smtClean="0"/>
+              <a:t>recursivo</a:t>
+            </a:r>
+          </a:p>
+          <a:p>
+            <a:pPr marL="633222" indent="-514350">
+              <a:buFont typeface="+mj-lt"/>
+              <a:buAutoNum type="arabicPeriod" startAt="17"/>
+            </a:pPr>
+            <a:r>
+              <a:rPr lang="pt-BR" dirty="0" smtClean="0"/>
+              <a:t>Faça um programa que </a:t>
+            </a:r>
+            <a:r>
+              <a:rPr lang="pt-BR" dirty="0" err="1" smtClean="0"/>
+              <a:t>popule</a:t>
+            </a:r>
+            <a:r>
+              <a:rPr lang="pt-BR" dirty="0" smtClean="0"/>
+              <a:t> um </a:t>
+            </a:r>
+            <a:r>
+              <a:rPr lang="pt-BR" dirty="0" err="1" smtClean="0"/>
+              <a:t>array</a:t>
+            </a:r>
+            <a:r>
+              <a:rPr lang="pt-BR" dirty="0" smtClean="0"/>
+              <a:t> de 100 posições com valores aleatórios entre 1 e 100, pesquise um número (definido </a:t>
+            </a:r>
+            <a:r>
+              <a:rPr lang="pt-BR" dirty="0" smtClean="0"/>
+              <a:t>também aleatoriamente</a:t>
+            </a:r>
+            <a:r>
+              <a:rPr lang="pt-BR" dirty="0" smtClean="0"/>
+              <a:t>) dentro do </a:t>
+            </a:r>
+            <a:r>
+              <a:rPr lang="pt-BR" dirty="0" err="1" smtClean="0"/>
+              <a:t>array</a:t>
+            </a:r>
+            <a:r>
+              <a:rPr lang="pt-BR" dirty="0" smtClean="0"/>
+              <a:t> e </a:t>
+            </a:r>
+            <a:r>
+              <a:rPr lang="pt-BR" dirty="0" smtClean="0"/>
+              <a:t>caso encontre </a:t>
+            </a:r>
+            <a:r>
+              <a:rPr lang="pt-BR" dirty="0" smtClean="0"/>
+              <a:t>o número desejado, imprima a posição que o mesmo se encontra </a:t>
+            </a:r>
+            <a:r>
+              <a:rPr lang="pt-BR" dirty="0" smtClean="0"/>
+              <a:t>ou </a:t>
+            </a:r>
+            <a:r>
+              <a:rPr lang="pt-BR" dirty="0" smtClean="0"/>
+              <a:t>informe que o mesmo não existe. Exiba também o tempo de processamento em </a:t>
+            </a:r>
+            <a:r>
+              <a:rPr lang="pt-BR" dirty="0" smtClean="0"/>
+              <a:t>milissegundos</a:t>
+            </a:r>
+          </a:p>
+          <a:p>
+            <a:pPr marL="633222" indent="-514350">
+              <a:buFont typeface="+mj-lt"/>
+              <a:buAutoNum type="arabicPeriod" startAt="17"/>
+            </a:pPr>
+            <a:r>
+              <a:rPr lang="pt-BR" dirty="0" smtClean="0"/>
+              <a:t>Construa um programa que gerencie a tabela do campeonato brasileiro. A tabela deverá manter as seguintes informações: Nome do time, número de vitórias, empates e derrotas, gols prós, gols contras e a pontuação. Considere que uma vitória vale 3 pontos e um empate vale 1 ponto. Permita que o usuário acrescente jogos, informando o nome dos times e quantidade de gols de cada time na partida</a:t>
+            </a:r>
+            <a:endParaRPr lang="pt-BR" dirty="0" smtClean="0"/>
+          </a:p>
+        </p:txBody>
+      </p:sp>
+    </p:spTree>
+  </p:cSld>
+  <p:clrMapOvr>
+    <a:masterClrMapping/>
+  </p:clrMapOvr>
+  <p:timing>
+    <p:tnLst>
+      <p:par>
+        <p:cTn id="1" dur="indefinite" restart="never" nodeType="tmRoot"/>
+      </p:par>
+    </p:tnLst>
+  </p:timing>
+</p:sld>
+</file>
+
+<file path=ppt/slides/slide41.xml><?xml version="1.0" encoding="utf-8"?>
+<p:sld xmlns:a="http://schemas.openxmlformats.org/drawingml/2006/main" xmlns:r="http://schemas.openxmlformats.org/officeDocument/2006/relationships" xmlns:p="http://schemas.openxmlformats.org/presentationml/2006/main">
+  <p:cSld>
+    <p:spTree>
+      <p:nvGrpSpPr>
+        <p:cNvPr id="1" name=""/>
+        <p:cNvGrpSpPr/>
+        <p:nvPr/>
+      </p:nvGrpSpPr>
+      <p:grpSpPr>
+        <a:xfrm>
+          <a:off x="0" y="0"/>
+          <a:ext cx="0" cy="0"/>
+          <a:chOff x="0" y="0"/>
+          <a:chExt cx="0" cy="0"/>
+        </a:xfrm>
+      </p:grpSpPr>
+      <p:sp>
+        <p:nvSpPr>
+          <p:cNvPr id="2" name="Título 1"/>
+          <p:cNvSpPr>
+            <a:spLocks noGrp="1"/>
+          </p:cNvSpPr>
+          <p:nvPr>
+            <p:ph type="title"/>
+          </p:nvPr>
+        </p:nvSpPr>
+        <p:spPr/>
+        <p:txBody>
+          <a:bodyPr/>
+          <a:lstStyle/>
+          <a:p>
+            <a:r>
+              <a:rPr lang="pt-BR" dirty="0" smtClean="0"/>
+              <a:t>Lista de Exercício 01</a:t>
+            </a:r>
+            <a:endParaRPr lang="pt-BR" dirty="0"/>
+          </a:p>
+        </p:txBody>
+      </p:sp>
+      <p:sp>
+        <p:nvSpPr>
+          <p:cNvPr id="3" name="Espaço Reservado para Conteúdo 2"/>
+          <p:cNvSpPr>
+            <a:spLocks noGrp="1"/>
+          </p:cNvSpPr>
+          <p:nvPr>
+            <p:ph idx="1"/>
+          </p:nvPr>
+        </p:nvSpPr>
+        <p:spPr>
+          <a:xfrm>
+            <a:off x="457200" y="1775191"/>
+            <a:ext cx="8229600" cy="4750153"/>
+          </a:xfrm>
+        </p:spPr>
+        <p:txBody>
+          <a:bodyPr>
+            <a:normAutofit/>
+          </a:bodyPr>
+          <a:lstStyle/>
+          <a:p>
+            <a:pPr marL="633222" indent="-514350">
+              <a:buFont typeface="+mj-lt"/>
+              <a:buAutoNum type="arabicPeriod" startAt="20"/>
+            </a:pPr>
+            <a:r>
+              <a:rPr lang="pt-BR" dirty="0" smtClean="0"/>
+              <a:t>Construa um algoritmo para exibir os números da série de </a:t>
+            </a:r>
+            <a:r>
+              <a:rPr lang="pt-BR" dirty="0" smtClean="0"/>
+              <a:t>Fibonacci (fórmula abaixo)</a:t>
+            </a:r>
+            <a:endParaRPr lang="pt-BR" dirty="0" smtClean="0"/>
+          </a:p>
+        </p:txBody>
+      </p:sp>
+      <p:pic>
+        <p:nvPicPr>
+          <p:cNvPr id="4098" name="Picture 2"/>
+          <p:cNvPicPr>
+            <a:picLocks noChangeAspect="1" noChangeArrowheads="1"/>
+          </p:cNvPicPr>
+          <p:nvPr/>
+        </p:nvPicPr>
+        <p:blipFill>
+          <a:blip r:embed="rId3" cstate="print"/>
+          <a:srcRect/>
+          <a:stretch>
+            <a:fillRect/>
+          </a:stretch>
+        </p:blipFill>
+        <p:spPr bwMode="auto">
+          <a:xfrm>
+            <a:off x="1187624" y="3861048"/>
+            <a:ext cx="6315075" cy="1171575"/>
+          </a:xfrm>
+          <a:prstGeom prst="rect">
+            <a:avLst/>
+          </a:prstGeom>
+          <a:noFill/>
+          <a:ln w="9525">
+            <a:noFill/>
+            <a:miter lim="800000"/>
+            <a:headEnd/>
+            <a:tailEnd/>
+          </a:ln>
+        </p:spPr>
+      </p:pic>
+    </p:spTree>
+  </p:cSld>
+  <p:clrMapOvr>
+    <a:masterClrMapping/>
+  </p:clrMapOvr>
+  <p:timing>
+    <p:tnLst>
+      <p:par>
+        <p:cTn id="1" dur="indefinite" restart="never" nodeType="tmRoot"/>
+      </p:par>
+    </p:tnLst>
+  </p:timing>
+</p:sld>
+</file>
+
+<file path=ppt/slides/slide42.xml><?xml version="1.0" encoding="utf-8"?>
+<p:sld xmlns:a="http://schemas.openxmlformats.org/drawingml/2006/main" xmlns:r="http://schemas.openxmlformats.org/officeDocument/2006/relationships" xmlns:p="http://schemas.openxmlformats.org/presentationml/2006/main">
+  <p:cSld>
+    <p:spTree>
+      <p:nvGrpSpPr>
+        <p:cNvPr id="1" name=""/>
+        <p:cNvGrpSpPr/>
+        <p:nvPr/>
+      </p:nvGrpSpPr>
+      <p:grpSpPr>
+        <a:xfrm>
+          <a:off x="0" y="0"/>
+          <a:ext cx="0" cy="0"/>
+          <a:chOff x="0" y="0"/>
+          <a:chExt cx="0" cy="0"/>
+        </a:xfrm>
+      </p:grpSpPr>
+      <p:sp>
+        <p:nvSpPr>
+          <p:cNvPr id="2" name="Título 1"/>
+          <p:cNvSpPr>
+            <a:spLocks noGrp="1"/>
+          </p:cNvSpPr>
+          <p:nvPr>
+            <p:ph type="title"/>
+          </p:nvPr>
+        </p:nvSpPr>
+        <p:spPr/>
+        <p:txBody>
+          <a:bodyPr/>
+          <a:lstStyle/>
+          <a:p>
+            <a:r>
+              <a:rPr lang="pt-BR" dirty="0" smtClean="0"/>
+              <a:t>Orientação a Objetos</a:t>
+            </a:r>
+            <a:endParaRPr lang="pt-BR" dirty="0"/>
+          </a:p>
+        </p:txBody>
+      </p:sp>
+      <p:sp>
+        <p:nvSpPr>
+          <p:cNvPr id="3" name="Espaço Reservado para Conteúdo 2"/>
+          <p:cNvSpPr>
+            <a:spLocks noGrp="1"/>
+          </p:cNvSpPr>
+          <p:nvPr>
+            <p:ph idx="1"/>
+          </p:nvPr>
+        </p:nvSpPr>
+        <p:spPr/>
+        <p:txBody>
+          <a:bodyPr>
+            <a:normAutofit/>
+          </a:bodyPr>
+          <a:lstStyle/>
+          <a:p>
+            <a:r>
+              <a:rPr lang="pt-BR" dirty="0" smtClean="0"/>
+              <a:t>Paradigma de Modelagem OO</a:t>
+            </a:r>
+          </a:p>
+          <a:p>
+            <a:pPr lvl="1"/>
+            <a:r>
+              <a:rPr lang="pt-BR" dirty="0" smtClean="0"/>
+              <a:t>Modelagem mais próxima do </a:t>
+            </a:r>
+            <a:r>
+              <a:rPr lang="pt-BR" i="1" dirty="0" smtClean="0"/>
+              <a:t>“Mundo Real”</a:t>
+            </a:r>
+          </a:p>
+          <a:p>
+            <a:pPr lvl="2"/>
+            <a:r>
+              <a:rPr lang="pt-BR" i="1" dirty="0" smtClean="0"/>
+              <a:t>Mundo Real = Mundo que concebemos e compreendemos </a:t>
+            </a:r>
+            <a:endParaRPr lang="pt-BR" dirty="0" smtClean="0"/>
+          </a:p>
+          <a:p>
+            <a:pPr lvl="1"/>
+            <a:r>
+              <a:rPr lang="pt-BR" dirty="0" smtClean="0"/>
+              <a:t>Classe = </a:t>
+            </a:r>
+          </a:p>
+          <a:p>
+            <a:pPr lvl="2"/>
+            <a:r>
+              <a:rPr lang="pt-BR" dirty="0" smtClean="0"/>
+              <a:t>Ações + Características</a:t>
+            </a:r>
+          </a:p>
+          <a:p>
+            <a:pPr lvl="2"/>
+            <a:r>
+              <a:rPr lang="pt-BR" dirty="0" smtClean="0"/>
+              <a:t>Conjunto de elementos do mesmo Tipo</a:t>
+            </a:r>
+          </a:p>
+          <a:p>
+            <a:pPr lvl="1"/>
+            <a:r>
+              <a:rPr lang="pt-BR" dirty="0" smtClean="0"/>
+              <a:t>Objeto = Elemento concreto de uma classe</a:t>
+            </a:r>
+          </a:p>
+          <a:p>
+            <a:pPr lvl="1"/>
+            <a:r>
+              <a:rPr lang="pt-BR" dirty="0" smtClean="0"/>
+              <a:t>Programa = Ecossistema de objetos que interagem entre si com objetivo de realizar algo</a:t>
+            </a:r>
+          </a:p>
+          <a:p>
+            <a:pPr lvl="1"/>
+            <a:endParaRPr lang="pt-BR" dirty="0" smtClean="0"/>
+          </a:p>
+        </p:txBody>
+      </p:sp>
+    </p:spTree>
+  </p:cSld>
+  <p:clrMapOvr>
+    <a:masterClrMapping/>
+  </p:clrMapOvr>
+  <p:timing>
+    <p:tnLst>
+      <p:par>
+        <p:cTn id="1" dur="indefinite" restart="never" nodeType="tmRoot"/>
+      </p:par>
+    </p:tnLst>
+  </p:timing>
+</p:sld>
+</file>
+
+<file path=ppt/slides/slide43.xml><?xml version="1.0" encoding="utf-8"?>
+<p:sld xmlns:a="http://schemas.openxmlformats.org/drawingml/2006/main" xmlns:r="http://schemas.openxmlformats.org/officeDocument/2006/relationships" xmlns:p="http://schemas.openxmlformats.org/presentationml/2006/main">
+  <p:cSld>
+    <p:spTree>
+      <p:nvGrpSpPr>
+        <p:cNvPr id="1" name=""/>
+        <p:cNvGrpSpPr/>
+        <p:nvPr/>
+      </p:nvGrpSpPr>
+      <p:grpSpPr>
+        <a:xfrm>
+          <a:off x="0" y="0"/>
+          <a:ext cx="0" cy="0"/>
+          <a:chOff x="0" y="0"/>
+          <a:chExt cx="0" cy="0"/>
+        </a:xfrm>
+      </p:grpSpPr>
+      <p:sp>
+        <p:nvSpPr>
+          <p:cNvPr id="2" name="Título 1"/>
+          <p:cNvSpPr>
+            <a:spLocks noGrp="1"/>
+          </p:cNvSpPr>
+          <p:nvPr>
+            <p:ph type="title"/>
+          </p:nvPr>
+        </p:nvSpPr>
+        <p:spPr/>
+        <p:txBody>
+          <a:bodyPr/>
+          <a:lstStyle/>
+          <a:p>
+            <a:r>
+              <a:rPr lang="pt-BR" dirty="0" smtClean="0"/>
+              <a:t>Orientação a Objetos</a:t>
+            </a:r>
+            <a:endParaRPr lang="pt-BR" dirty="0"/>
+          </a:p>
+        </p:txBody>
+      </p:sp>
+      <p:sp>
+        <p:nvSpPr>
+          <p:cNvPr id="3" name="Espaço Reservado para Conteúdo 2"/>
+          <p:cNvSpPr>
+            <a:spLocks noGrp="1"/>
+          </p:cNvSpPr>
+          <p:nvPr>
+            <p:ph idx="1"/>
+          </p:nvPr>
+        </p:nvSpPr>
+        <p:spPr/>
+        <p:txBody>
+          <a:bodyPr>
+            <a:normAutofit/>
+          </a:bodyPr>
+          <a:lstStyle/>
+          <a:p>
+            <a:r>
+              <a:rPr lang="pt-BR" dirty="0" smtClean="0"/>
+              <a:t>Paradigma de Modelagem OO</a:t>
+            </a:r>
+          </a:p>
+          <a:p>
+            <a:pPr lvl="1"/>
+            <a:r>
+              <a:rPr lang="pt-BR" dirty="0" smtClean="0"/>
+              <a:t>Herança</a:t>
+            </a:r>
+          </a:p>
+          <a:p>
+            <a:pPr lvl="2"/>
+            <a:r>
+              <a:rPr lang="pt-BR" dirty="0" smtClean="0"/>
+              <a:t>Uma classe herda as características (métodos e atributos) da sua superclasse</a:t>
+            </a:r>
+          </a:p>
+          <a:p>
+            <a:pPr lvl="2"/>
+            <a:r>
+              <a:rPr lang="pt-BR" dirty="0" smtClean="0"/>
+              <a:t>Superclasse = </a:t>
+            </a:r>
+            <a:r>
+              <a:rPr lang="pt-BR" i="1" dirty="0" smtClean="0"/>
+              <a:t>Classe Mãe (ou Pai)</a:t>
+            </a:r>
+          </a:p>
+          <a:p>
+            <a:pPr lvl="2"/>
+            <a:r>
+              <a:rPr lang="pt-BR" dirty="0" smtClean="0"/>
+              <a:t>Subclasse =</a:t>
+            </a:r>
+            <a:r>
+              <a:rPr lang="pt-BR" i="1" dirty="0" smtClean="0"/>
+              <a:t> Classe Filha</a:t>
+            </a:r>
+            <a:endParaRPr lang="pt-BR" dirty="0" smtClean="0"/>
+          </a:p>
+          <a:p>
+            <a:pPr lvl="1"/>
+            <a:r>
+              <a:rPr lang="pt-BR" dirty="0" smtClean="0"/>
+              <a:t>Herança Múltipla</a:t>
+            </a:r>
+          </a:p>
+          <a:p>
+            <a:pPr lvl="2"/>
+            <a:r>
+              <a:rPr lang="pt-BR" dirty="0" smtClean="0"/>
+              <a:t>Uma classe pode herdar de mais de uma </a:t>
+            </a:r>
+          </a:p>
+          <a:p>
+            <a:pPr lvl="2"/>
+            <a:r>
+              <a:rPr lang="pt-BR" dirty="0" smtClean="0">
+                <a:solidFill>
+                  <a:srgbClr val="FF0000"/>
+                </a:solidFill>
+              </a:rPr>
+              <a:t>Java NÃO POSSUI Herança Múltipla</a:t>
+            </a:r>
+          </a:p>
+        </p:txBody>
+      </p:sp>
+    </p:spTree>
+  </p:cSld>
+  <p:clrMapOvr>
+    <a:masterClrMapping/>
+  </p:clrMapOvr>
+  <p:timing>
+    <p:tnLst>
+      <p:par>
+        <p:cTn id="1" dur="indefinite" restart="never" nodeType="tmRoot"/>
+      </p:par>
+    </p:tnLst>
+  </p:timing>
+</p:sld>
+</file>
+
+<file path=ppt/slides/slide44.xml><?xml version="1.0" encoding="utf-8"?>
+<p:sld xmlns:a="http://schemas.openxmlformats.org/drawingml/2006/main" xmlns:r="http://schemas.openxmlformats.org/officeDocument/2006/relationships" xmlns:p="http://schemas.openxmlformats.org/presentationml/2006/main">
+  <p:cSld>
+    <p:spTree>
+      <p:nvGrpSpPr>
+        <p:cNvPr id="1" name=""/>
+        <p:cNvGrpSpPr/>
+        <p:nvPr/>
+      </p:nvGrpSpPr>
+      <p:grpSpPr>
+        <a:xfrm>
+          <a:off x="0" y="0"/>
+          <a:ext cx="0" cy="0"/>
+          <a:chOff x="0" y="0"/>
+          <a:chExt cx="0" cy="0"/>
+        </a:xfrm>
+      </p:grpSpPr>
+      <p:sp>
+        <p:nvSpPr>
+          <p:cNvPr id="2" name="Título 1"/>
+          <p:cNvSpPr>
+            <a:spLocks noGrp="1"/>
+          </p:cNvSpPr>
+          <p:nvPr>
+            <p:ph type="title"/>
+          </p:nvPr>
+        </p:nvSpPr>
+        <p:spPr/>
+        <p:txBody>
+          <a:bodyPr/>
+          <a:lstStyle/>
+          <a:p>
+            <a:r>
+              <a:rPr lang="pt-BR" dirty="0" smtClean="0"/>
+              <a:t>Orientação a Objetos</a:t>
+            </a:r>
+            <a:endParaRPr lang="pt-BR" dirty="0"/>
+          </a:p>
+        </p:txBody>
+      </p:sp>
+      <p:sp>
+        <p:nvSpPr>
+          <p:cNvPr id="3" name="Espaço Reservado para Conteúdo 2"/>
+          <p:cNvSpPr>
+            <a:spLocks noGrp="1"/>
+          </p:cNvSpPr>
+          <p:nvPr>
+            <p:ph idx="1"/>
+          </p:nvPr>
+        </p:nvSpPr>
+        <p:spPr/>
+        <p:txBody>
+          <a:bodyPr>
+            <a:normAutofit/>
+          </a:bodyPr>
+          <a:lstStyle/>
+          <a:p>
+            <a:r>
+              <a:rPr lang="pt-BR" dirty="0" smtClean="0"/>
+              <a:t>Java</a:t>
+            </a:r>
+          </a:p>
+          <a:p>
+            <a:pPr lvl="1"/>
+            <a:r>
+              <a:rPr lang="pt-BR" dirty="0" smtClean="0"/>
+              <a:t>Classes, Interfaces, Anotações e </a:t>
+            </a:r>
+            <a:r>
+              <a:rPr lang="pt-BR" dirty="0" err="1" smtClean="0"/>
+              <a:t>Enums</a:t>
+            </a:r>
+            <a:endParaRPr lang="pt-BR" dirty="0" smtClean="0"/>
+          </a:p>
+          <a:p>
+            <a:pPr lvl="1"/>
+            <a:endParaRPr lang="pt-BR" dirty="0" smtClean="0"/>
+          </a:p>
+        </p:txBody>
+      </p:sp>
+    </p:spTree>
+  </p:cSld>
+  <p:clrMapOvr>
+    <a:masterClrMapping/>
+  </p:clrMapOvr>
+  <p:timing>
+    <p:tnLst>
+      <p:par>
+        <p:cTn id="1" dur="indefinite" restart="never" nodeType="tmRoot"/>
+      </p:par>
+    </p:tnLst>
+  </p:timing>
+</p:sld>
+</file>
+
+<file path=ppt/slides/slide45.xml><?xml version="1.0" encoding="utf-8"?>
+<p:sld xmlns:a="http://schemas.openxmlformats.org/drawingml/2006/main" xmlns:r="http://schemas.openxmlformats.org/officeDocument/2006/relationships" xmlns:p="http://schemas.openxmlformats.org/presentationml/2006/main">
+  <p:cSld>
+    <p:spTree>
+      <p:nvGrpSpPr>
+        <p:cNvPr id="1" name=""/>
+        <p:cNvGrpSpPr/>
+        <p:nvPr/>
+      </p:nvGrpSpPr>
+      <p:grpSpPr>
+        <a:xfrm>
+          <a:off x="0" y="0"/>
+          <a:ext cx="0" cy="0"/>
+          <a:chOff x="0" y="0"/>
+          <a:chExt cx="0" cy="0"/>
+        </a:xfrm>
+      </p:grpSpPr>
+      <p:sp>
+        <p:nvSpPr>
+          <p:cNvPr id="2" name="Título 1"/>
+          <p:cNvSpPr>
+            <a:spLocks noGrp="1"/>
+          </p:cNvSpPr>
+          <p:nvPr>
+            <p:ph type="title"/>
+          </p:nvPr>
+        </p:nvSpPr>
+        <p:spPr/>
+        <p:txBody>
+          <a:bodyPr/>
+          <a:lstStyle/>
+          <a:p>
+            <a:r>
+              <a:rPr lang="pt-BR" dirty="0" smtClean="0"/>
+              <a:t>Tratamento de Exceções</a:t>
+            </a:r>
+            <a:endParaRPr lang="pt-BR" dirty="0"/>
+          </a:p>
+        </p:txBody>
+      </p:sp>
+      <p:sp>
+        <p:nvSpPr>
+          <p:cNvPr id="3" name="Espaço Reservado para Conteúdo 2"/>
+          <p:cNvSpPr>
+            <a:spLocks noGrp="1"/>
+          </p:cNvSpPr>
+          <p:nvPr>
+            <p:ph idx="1"/>
+          </p:nvPr>
+        </p:nvSpPr>
+        <p:spPr/>
+        <p:txBody>
+          <a:bodyPr>
+            <a:normAutofit/>
+          </a:bodyPr>
+          <a:lstStyle/>
+          <a:p>
+            <a:endParaRPr lang="pt-BR" dirty="0" smtClean="0"/>
+          </a:p>
+        </p:txBody>
+      </p:sp>
+    </p:spTree>
+  </p:cSld>
+  <p:clrMapOvr>
+    <a:masterClrMapping/>
+  </p:clrMapOvr>
+  <p:timing>
+    <p:tnLst>
+      <p:par>
+        <p:cTn id="1" dur="indefinite" restart="never" nodeType="tmRoot"/>
+      </p:par>
+    </p:tnLst>
+  </p:timing>
+</p:sld>
+</file>
+
+<file path=ppt/slides/slide46.xml><?xml version="1.0" encoding="utf-8"?>
+<p:sld xmlns:a="http://schemas.openxmlformats.org/drawingml/2006/main" xmlns:r="http://schemas.openxmlformats.org/officeDocument/2006/relationships" xmlns:p="http://schemas.openxmlformats.org/presentationml/2006/main">
+  <p:cSld>
+    <p:spTree>
+      <p:nvGrpSpPr>
+        <p:cNvPr id="1" name=""/>
+        <p:cNvGrpSpPr/>
+        <p:nvPr/>
+      </p:nvGrpSpPr>
+      <p:grpSpPr>
+        <a:xfrm>
+          <a:off x="0" y="0"/>
+          <a:ext cx="0" cy="0"/>
+          <a:chOff x="0" y="0"/>
+          <a:chExt cx="0" cy="0"/>
+        </a:xfrm>
+      </p:grpSpPr>
+      <p:sp>
+        <p:nvSpPr>
+          <p:cNvPr id="2" name="Título 1"/>
+          <p:cNvSpPr>
+            <a:spLocks noGrp="1"/>
+          </p:cNvSpPr>
+          <p:nvPr>
+            <p:ph type="title"/>
+          </p:nvPr>
+        </p:nvSpPr>
+        <p:spPr/>
+        <p:txBody>
+          <a:bodyPr/>
+          <a:lstStyle/>
+          <a:p>
+            <a:r>
+              <a:rPr lang="pt-BR" dirty="0" smtClean="0"/>
+              <a:t>Java </a:t>
+            </a:r>
+            <a:r>
+              <a:rPr lang="pt-BR" dirty="0" err="1" smtClean="0"/>
+              <a:t>Collection</a:t>
+            </a:r>
+            <a:r>
+              <a:rPr lang="pt-BR" dirty="0" smtClean="0"/>
+              <a:t> Framework</a:t>
+            </a:r>
+            <a:endParaRPr lang="pt-BR" dirty="0"/>
+          </a:p>
+        </p:txBody>
+      </p:sp>
+      <p:sp>
+        <p:nvSpPr>
+          <p:cNvPr id="3" name="Espaço Reservado para Conteúdo 2"/>
+          <p:cNvSpPr>
+            <a:spLocks noGrp="1"/>
+          </p:cNvSpPr>
+          <p:nvPr>
+            <p:ph idx="1"/>
+          </p:nvPr>
+        </p:nvSpPr>
+        <p:spPr/>
+        <p:txBody>
+          <a:bodyPr>
+            <a:normAutofit/>
+          </a:bodyPr>
+          <a:lstStyle/>
+          <a:p>
+            <a:endParaRPr lang="pt-BR" dirty="0" smtClean="0"/>
+          </a:p>
+        </p:txBody>
+      </p:sp>
+    </p:spTree>
+  </p:cSld>
+  <p:clrMapOvr>
+    <a:masterClrMapping/>
+  </p:clrMapOvr>
+  <p:timing>
+    <p:tnLst>
+      <p:par>
+        <p:cTn id="1" dur="indefinite" restart="never" nodeType="tmRoot"/>
+      </p:par>
+    </p:tnLst>
+  </p:timing>
+</p:sld>
+</file>
+
+<file path=ppt/slides/slide47.xml><?xml version="1.0" encoding="utf-8"?>
+<p:sld xmlns:a="http://schemas.openxmlformats.org/drawingml/2006/main" xmlns:r="http://schemas.openxmlformats.org/officeDocument/2006/relationships" xmlns:p="http://schemas.openxmlformats.org/presentationml/2006/main">
+  <p:cSld>
+    <p:spTree>
+      <p:nvGrpSpPr>
+        <p:cNvPr id="1" name=""/>
+        <p:cNvGrpSpPr/>
+        <p:nvPr/>
+      </p:nvGrpSpPr>
+      <p:grpSpPr>
+        <a:xfrm>
+          <a:off x="0" y="0"/>
+          <a:ext cx="0" cy="0"/>
+          <a:chOff x="0" y="0"/>
+          <a:chExt cx="0" cy="0"/>
+        </a:xfrm>
+      </p:grpSpPr>
+      <p:sp>
+        <p:nvSpPr>
+          <p:cNvPr id="2" name="Título 1"/>
+          <p:cNvSpPr>
+            <a:spLocks noGrp="1"/>
+          </p:cNvSpPr>
+          <p:nvPr>
+            <p:ph type="title"/>
+          </p:nvPr>
+        </p:nvSpPr>
+        <p:spPr/>
+        <p:txBody>
+          <a:bodyPr/>
+          <a:lstStyle/>
+          <a:p>
+            <a:r>
+              <a:rPr lang="pt-BR" dirty="0" smtClean="0"/>
+              <a:t>Java IO</a:t>
+            </a:r>
+            <a:endParaRPr lang="pt-BR" dirty="0"/>
+          </a:p>
+        </p:txBody>
+      </p:sp>
+      <p:sp>
+        <p:nvSpPr>
+          <p:cNvPr id="3" name="Espaço Reservado para Conteúdo 2"/>
+          <p:cNvSpPr>
+            <a:spLocks noGrp="1"/>
+          </p:cNvSpPr>
+          <p:nvPr>
+            <p:ph idx="1"/>
+          </p:nvPr>
+        </p:nvSpPr>
+        <p:spPr/>
+        <p:txBody>
+          <a:bodyPr>
+            <a:normAutofit/>
+          </a:bodyPr>
+          <a:lstStyle/>
+          <a:p>
+            <a:endParaRPr lang="pt-BR" dirty="0" smtClean="0"/>
+          </a:p>
+        </p:txBody>
+      </p:sp>
+    </p:spTree>
+  </p:cSld>
+  <p:clrMapOvr>
+    <a:masterClrMapping/>
+  </p:clrMapOvr>
+  <p:timing>
+    <p:tnLst>
+      <p:par>
+        <p:cTn id="1" dur="indefinite" restart="never" nodeType="tmRoot"/>
+      </p:par>
+    </p:tnLst>
+  </p:timing>
+</p:sld>
+</file>
+
+<file path=ppt/slides/slide48.xml><?xml version="1.0" encoding="utf-8"?>
+<p:sld xmlns:a="http://schemas.openxmlformats.org/drawingml/2006/main" xmlns:r="http://schemas.openxmlformats.org/officeDocument/2006/relationships" xmlns:p="http://schemas.openxmlformats.org/presentationml/2006/main">
+  <p:cSld>
+    <p:spTree>
+      <p:nvGrpSpPr>
+        <p:cNvPr id="1" name=""/>
+        <p:cNvGrpSpPr/>
+        <p:nvPr/>
+      </p:nvGrpSpPr>
+      <p:grpSpPr>
+        <a:xfrm>
+          <a:off x="0" y="0"/>
+          <a:ext cx="0" cy="0"/>
+          <a:chOff x="0" y="0"/>
+          <a:chExt cx="0" cy="0"/>
+        </a:xfrm>
+      </p:grpSpPr>
+      <p:sp>
+        <p:nvSpPr>
+          <p:cNvPr id="2" name="Título 1"/>
+          <p:cNvSpPr>
+            <a:spLocks noGrp="1"/>
+          </p:cNvSpPr>
+          <p:nvPr>
+            <p:ph type="title"/>
+          </p:nvPr>
+        </p:nvSpPr>
+        <p:spPr/>
+        <p:txBody>
+          <a:bodyPr/>
+          <a:lstStyle/>
+          <a:p>
+            <a:r>
+              <a:rPr lang="pt-BR" dirty="0" smtClean="0"/>
+              <a:t>Banco de Dados</a:t>
+            </a:r>
+            <a:endParaRPr lang="pt-BR" dirty="0"/>
+          </a:p>
+        </p:txBody>
+      </p:sp>
+      <p:sp>
+        <p:nvSpPr>
+          <p:cNvPr id="3" name="Espaço Reservado para Conteúdo 2"/>
+          <p:cNvSpPr>
+            <a:spLocks noGrp="1"/>
+          </p:cNvSpPr>
+          <p:nvPr>
+            <p:ph idx="1"/>
+          </p:nvPr>
+        </p:nvSpPr>
+        <p:spPr/>
+        <p:txBody>
+          <a:bodyPr>
+            <a:normAutofit/>
+          </a:bodyPr>
+          <a:lstStyle/>
+          <a:p>
+            <a:endParaRPr lang="pt-BR" dirty="0" smtClean="0"/>
           </a:p>
         </p:txBody>
       </p:sp>

</xml_diff>

<commit_message>
Atualizacao PPT Fundamentos Java Basico
.
</commit_message>
<xml_diff>
--- a/Fundamentos/Fundamentos - Java Basico.pptx
+++ b/Fundamentos/Fundamentos - Java Basico.pptx
@@ -5,7 +5,7 @@
     <p:sldMasterId id="2147483792" r:id="rId1"/>
   </p:sldMasterIdLst>
   <p:notesMasterIdLst>
-    <p:notesMasterId r:id="rId50"/>
+    <p:notesMasterId r:id="rId43"/>
   </p:notesMasterIdLst>
   <p:sldIdLst>
     <p:sldId id="256" r:id="rId2"/>
@@ -49,13 +49,6 @@
     <p:sldId id="303" r:id="rId40"/>
     <p:sldId id="304" r:id="rId41"/>
     <p:sldId id="305" r:id="rId42"/>
-    <p:sldId id="273" r:id="rId43"/>
-    <p:sldId id="292" r:id="rId44"/>
-    <p:sldId id="291" r:id="rId45"/>
-    <p:sldId id="274" r:id="rId46"/>
-    <p:sldId id="275" r:id="rId47"/>
-    <p:sldId id="276" r:id="rId48"/>
-    <p:sldId id="277" r:id="rId49"/>
   </p:sldIdLst>
   <p:sldSz cx="9144000" cy="6858000" type="screen4x3"/>
   <p:notesSz cx="6858000" cy="9144000"/>
@@ -240,7 +233,7 @@
             <a:fld id="{0798B77A-D2B4-472A-BFF6-BFE225C3220A}" type="datetimeFigureOut">
               <a:rPr lang="pt-BR" smtClean="0"/>
               <a:pPr/>
-              <a:t>09/03/2014</a:t>
+              <a:t>10/03/2014</a:t>
             </a:fld>
             <a:endParaRPr lang="pt-BR"/>
           </a:p>
@@ -3376,580 +3369,6 @@
 </p:notes>
 </file>
 
-<file path=ppt/notesSlides/notesSlide41.xml><?xml version="1.0" encoding="utf-8"?>
-<p:notes xmlns:a="http://schemas.openxmlformats.org/drawingml/2006/main" xmlns:r="http://schemas.openxmlformats.org/officeDocument/2006/relationships" xmlns:p="http://schemas.openxmlformats.org/presentationml/2006/main">
-  <p:cSld>
-    <p:spTree>
-      <p:nvGrpSpPr>
-        <p:cNvPr id="1" name=""/>
-        <p:cNvGrpSpPr/>
-        <p:nvPr/>
-      </p:nvGrpSpPr>
-      <p:grpSpPr>
-        <a:xfrm>
-          <a:off x="0" y="0"/>
-          <a:ext cx="0" cy="0"/>
-          <a:chOff x="0" y="0"/>
-          <a:chExt cx="0" cy="0"/>
-        </a:xfrm>
-      </p:grpSpPr>
-      <p:sp>
-        <p:nvSpPr>
-          <p:cNvPr id="2" name="Espaço Reservado para Imagem de Slide 1"/>
-          <p:cNvSpPr>
-            <a:spLocks noGrp="1" noRot="1" noChangeAspect="1"/>
-          </p:cNvSpPr>
-          <p:nvPr>
-            <p:ph type="sldImg"/>
-          </p:nvPr>
-        </p:nvSpPr>
-        <p:spPr/>
-      </p:sp>
-      <p:sp>
-        <p:nvSpPr>
-          <p:cNvPr id="3" name="Espaço Reservado para Anotações 2"/>
-          <p:cNvSpPr>
-            <a:spLocks noGrp="1"/>
-          </p:cNvSpPr>
-          <p:nvPr>
-            <p:ph type="body" idx="1"/>
-          </p:nvPr>
-        </p:nvSpPr>
-        <p:spPr/>
-        <p:txBody>
-          <a:bodyPr>
-            <a:normAutofit/>
-          </a:bodyPr>
-          <a:lstStyle/>
-          <a:p>
-            <a:endParaRPr lang="pt-BR" dirty="0" smtClean="0"/>
-          </a:p>
-        </p:txBody>
-      </p:sp>
-      <p:sp>
-        <p:nvSpPr>
-          <p:cNvPr id="4" name="Espaço Reservado para Número de Slide 3"/>
-          <p:cNvSpPr>
-            <a:spLocks noGrp="1"/>
-          </p:cNvSpPr>
-          <p:nvPr>
-            <p:ph type="sldNum" sz="quarter" idx="10"/>
-          </p:nvPr>
-        </p:nvSpPr>
-        <p:spPr/>
-        <p:txBody>
-          <a:bodyPr/>
-          <a:lstStyle/>
-          <a:p>
-            <a:fld id="{72B91EDC-0C87-4192-8AD8-36C87AC108D0}" type="slidenum">
-              <a:rPr lang="pt-BR" smtClean="0"/>
-              <a:pPr/>
-              <a:t>42</a:t>
-            </a:fld>
-            <a:endParaRPr lang="pt-BR"/>
-          </a:p>
-        </p:txBody>
-      </p:sp>
-    </p:spTree>
-  </p:cSld>
-  <p:clrMapOvr>
-    <a:masterClrMapping/>
-  </p:clrMapOvr>
-</p:notes>
-</file>
-
-<file path=ppt/notesSlides/notesSlide42.xml><?xml version="1.0" encoding="utf-8"?>
-<p:notes xmlns:a="http://schemas.openxmlformats.org/drawingml/2006/main" xmlns:r="http://schemas.openxmlformats.org/officeDocument/2006/relationships" xmlns:p="http://schemas.openxmlformats.org/presentationml/2006/main">
-  <p:cSld>
-    <p:spTree>
-      <p:nvGrpSpPr>
-        <p:cNvPr id="1" name=""/>
-        <p:cNvGrpSpPr/>
-        <p:nvPr/>
-      </p:nvGrpSpPr>
-      <p:grpSpPr>
-        <a:xfrm>
-          <a:off x="0" y="0"/>
-          <a:ext cx="0" cy="0"/>
-          <a:chOff x="0" y="0"/>
-          <a:chExt cx="0" cy="0"/>
-        </a:xfrm>
-      </p:grpSpPr>
-      <p:sp>
-        <p:nvSpPr>
-          <p:cNvPr id="2" name="Espaço Reservado para Imagem de Slide 1"/>
-          <p:cNvSpPr>
-            <a:spLocks noGrp="1" noRot="1" noChangeAspect="1"/>
-          </p:cNvSpPr>
-          <p:nvPr>
-            <p:ph type="sldImg"/>
-          </p:nvPr>
-        </p:nvSpPr>
-        <p:spPr/>
-      </p:sp>
-      <p:sp>
-        <p:nvSpPr>
-          <p:cNvPr id="3" name="Espaço Reservado para Anotações 2"/>
-          <p:cNvSpPr>
-            <a:spLocks noGrp="1"/>
-          </p:cNvSpPr>
-          <p:nvPr>
-            <p:ph type="body" idx="1"/>
-          </p:nvPr>
-        </p:nvSpPr>
-        <p:spPr/>
-        <p:txBody>
-          <a:bodyPr>
-            <a:normAutofit/>
-          </a:bodyPr>
-          <a:lstStyle/>
-          <a:p>
-            <a:endParaRPr lang="pt-BR" dirty="0" smtClean="0"/>
-          </a:p>
-        </p:txBody>
-      </p:sp>
-      <p:sp>
-        <p:nvSpPr>
-          <p:cNvPr id="4" name="Espaço Reservado para Número de Slide 3"/>
-          <p:cNvSpPr>
-            <a:spLocks noGrp="1"/>
-          </p:cNvSpPr>
-          <p:nvPr>
-            <p:ph type="sldNum" sz="quarter" idx="10"/>
-          </p:nvPr>
-        </p:nvSpPr>
-        <p:spPr/>
-        <p:txBody>
-          <a:bodyPr/>
-          <a:lstStyle/>
-          <a:p>
-            <a:fld id="{72B91EDC-0C87-4192-8AD8-36C87AC108D0}" type="slidenum">
-              <a:rPr lang="pt-BR" smtClean="0"/>
-              <a:pPr/>
-              <a:t>43</a:t>
-            </a:fld>
-            <a:endParaRPr lang="pt-BR"/>
-          </a:p>
-        </p:txBody>
-      </p:sp>
-    </p:spTree>
-  </p:cSld>
-  <p:clrMapOvr>
-    <a:masterClrMapping/>
-  </p:clrMapOvr>
-</p:notes>
-</file>
-
-<file path=ppt/notesSlides/notesSlide43.xml><?xml version="1.0" encoding="utf-8"?>
-<p:notes xmlns:a="http://schemas.openxmlformats.org/drawingml/2006/main" xmlns:r="http://schemas.openxmlformats.org/officeDocument/2006/relationships" xmlns:p="http://schemas.openxmlformats.org/presentationml/2006/main">
-  <p:cSld>
-    <p:spTree>
-      <p:nvGrpSpPr>
-        <p:cNvPr id="1" name=""/>
-        <p:cNvGrpSpPr/>
-        <p:nvPr/>
-      </p:nvGrpSpPr>
-      <p:grpSpPr>
-        <a:xfrm>
-          <a:off x="0" y="0"/>
-          <a:ext cx="0" cy="0"/>
-          <a:chOff x="0" y="0"/>
-          <a:chExt cx="0" cy="0"/>
-        </a:xfrm>
-      </p:grpSpPr>
-      <p:sp>
-        <p:nvSpPr>
-          <p:cNvPr id="2" name="Espaço Reservado para Imagem de Slide 1"/>
-          <p:cNvSpPr>
-            <a:spLocks noGrp="1" noRot="1" noChangeAspect="1"/>
-          </p:cNvSpPr>
-          <p:nvPr>
-            <p:ph type="sldImg"/>
-          </p:nvPr>
-        </p:nvSpPr>
-        <p:spPr/>
-      </p:sp>
-      <p:sp>
-        <p:nvSpPr>
-          <p:cNvPr id="3" name="Espaço Reservado para Anotações 2"/>
-          <p:cNvSpPr>
-            <a:spLocks noGrp="1"/>
-          </p:cNvSpPr>
-          <p:nvPr>
-            <p:ph type="body" idx="1"/>
-          </p:nvPr>
-        </p:nvSpPr>
-        <p:spPr/>
-        <p:txBody>
-          <a:bodyPr>
-            <a:normAutofit/>
-          </a:bodyPr>
-          <a:lstStyle/>
-          <a:p>
-            <a:endParaRPr lang="pt-BR" dirty="0" smtClean="0"/>
-          </a:p>
-        </p:txBody>
-      </p:sp>
-      <p:sp>
-        <p:nvSpPr>
-          <p:cNvPr id="4" name="Espaço Reservado para Número de Slide 3"/>
-          <p:cNvSpPr>
-            <a:spLocks noGrp="1"/>
-          </p:cNvSpPr>
-          <p:nvPr>
-            <p:ph type="sldNum" sz="quarter" idx="10"/>
-          </p:nvPr>
-        </p:nvSpPr>
-        <p:spPr/>
-        <p:txBody>
-          <a:bodyPr/>
-          <a:lstStyle/>
-          <a:p>
-            <a:fld id="{72B91EDC-0C87-4192-8AD8-36C87AC108D0}" type="slidenum">
-              <a:rPr lang="pt-BR" smtClean="0"/>
-              <a:pPr/>
-              <a:t>44</a:t>
-            </a:fld>
-            <a:endParaRPr lang="pt-BR"/>
-          </a:p>
-        </p:txBody>
-      </p:sp>
-    </p:spTree>
-  </p:cSld>
-  <p:clrMapOvr>
-    <a:masterClrMapping/>
-  </p:clrMapOvr>
-</p:notes>
-</file>
-
-<file path=ppt/notesSlides/notesSlide44.xml><?xml version="1.0" encoding="utf-8"?>
-<p:notes xmlns:a="http://schemas.openxmlformats.org/drawingml/2006/main" xmlns:r="http://schemas.openxmlformats.org/officeDocument/2006/relationships" xmlns:p="http://schemas.openxmlformats.org/presentationml/2006/main">
-  <p:cSld>
-    <p:spTree>
-      <p:nvGrpSpPr>
-        <p:cNvPr id="1" name=""/>
-        <p:cNvGrpSpPr/>
-        <p:nvPr/>
-      </p:nvGrpSpPr>
-      <p:grpSpPr>
-        <a:xfrm>
-          <a:off x="0" y="0"/>
-          <a:ext cx="0" cy="0"/>
-          <a:chOff x="0" y="0"/>
-          <a:chExt cx="0" cy="0"/>
-        </a:xfrm>
-      </p:grpSpPr>
-      <p:sp>
-        <p:nvSpPr>
-          <p:cNvPr id="2" name="Espaço Reservado para Imagem de Slide 1"/>
-          <p:cNvSpPr>
-            <a:spLocks noGrp="1" noRot="1" noChangeAspect="1"/>
-          </p:cNvSpPr>
-          <p:nvPr>
-            <p:ph type="sldImg"/>
-          </p:nvPr>
-        </p:nvSpPr>
-        <p:spPr/>
-      </p:sp>
-      <p:sp>
-        <p:nvSpPr>
-          <p:cNvPr id="3" name="Espaço Reservado para Anotações 2"/>
-          <p:cNvSpPr>
-            <a:spLocks noGrp="1"/>
-          </p:cNvSpPr>
-          <p:nvPr>
-            <p:ph type="body" idx="1"/>
-          </p:nvPr>
-        </p:nvSpPr>
-        <p:spPr/>
-        <p:txBody>
-          <a:bodyPr>
-            <a:normAutofit/>
-          </a:bodyPr>
-          <a:lstStyle/>
-          <a:p>
-            <a:endParaRPr lang="pt-BR" dirty="0" smtClean="0"/>
-          </a:p>
-        </p:txBody>
-      </p:sp>
-      <p:sp>
-        <p:nvSpPr>
-          <p:cNvPr id="4" name="Espaço Reservado para Número de Slide 3"/>
-          <p:cNvSpPr>
-            <a:spLocks noGrp="1"/>
-          </p:cNvSpPr>
-          <p:nvPr>
-            <p:ph type="sldNum" sz="quarter" idx="10"/>
-          </p:nvPr>
-        </p:nvSpPr>
-        <p:spPr/>
-        <p:txBody>
-          <a:bodyPr/>
-          <a:lstStyle/>
-          <a:p>
-            <a:fld id="{72B91EDC-0C87-4192-8AD8-36C87AC108D0}" type="slidenum">
-              <a:rPr lang="pt-BR" smtClean="0"/>
-              <a:pPr/>
-              <a:t>45</a:t>
-            </a:fld>
-            <a:endParaRPr lang="pt-BR"/>
-          </a:p>
-        </p:txBody>
-      </p:sp>
-    </p:spTree>
-  </p:cSld>
-  <p:clrMapOvr>
-    <a:masterClrMapping/>
-  </p:clrMapOvr>
-</p:notes>
-</file>
-
-<file path=ppt/notesSlides/notesSlide45.xml><?xml version="1.0" encoding="utf-8"?>
-<p:notes xmlns:a="http://schemas.openxmlformats.org/drawingml/2006/main" xmlns:r="http://schemas.openxmlformats.org/officeDocument/2006/relationships" xmlns:p="http://schemas.openxmlformats.org/presentationml/2006/main">
-  <p:cSld>
-    <p:spTree>
-      <p:nvGrpSpPr>
-        <p:cNvPr id="1" name=""/>
-        <p:cNvGrpSpPr/>
-        <p:nvPr/>
-      </p:nvGrpSpPr>
-      <p:grpSpPr>
-        <a:xfrm>
-          <a:off x="0" y="0"/>
-          <a:ext cx="0" cy="0"/>
-          <a:chOff x="0" y="0"/>
-          <a:chExt cx="0" cy="0"/>
-        </a:xfrm>
-      </p:grpSpPr>
-      <p:sp>
-        <p:nvSpPr>
-          <p:cNvPr id="2" name="Espaço Reservado para Imagem de Slide 1"/>
-          <p:cNvSpPr>
-            <a:spLocks noGrp="1" noRot="1" noChangeAspect="1"/>
-          </p:cNvSpPr>
-          <p:nvPr>
-            <p:ph type="sldImg"/>
-          </p:nvPr>
-        </p:nvSpPr>
-        <p:spPr/>
-      </p:sp>
-      <p:sp>
-        <p:nvSpPr>
-          <p:cNvPr id="3" name="Espaço Reservado para Anotações 2"/>
-          <p:cNvSpPr>
-            <a:spLocks noGrp="1"/>
-          </p:cNvSpPr>
-          <p:nvPr>
-            <p:ph type="body" idx="1"/>
-          </p:nvPr>
-        </p:nvSpPr>
-        <p:spPr/>
-        <p:txBody>
-          <a:bodyPr>
-            <a:normAutofit/>
-          </a:bodyPr>
-          <a:lstStyle/>
-          <a:p>
-            <a:endParaRPr lang="pt-BR" dirty="0" smtClean="0"/>
-          </a:p>
-        </p:txBody>
-      </p:sp>
-      <p:sp>
-        <p:nvSpPr>
-          <p:cNvPr id="4" name="Espaço Reservado para Número de Slide 3"/>
-          <p:cNvSpPr>
-            <a:spLocks noGrp="1"/>
-          </p:cNvSpPr>
-          <p:nvPr>
-            <p:ph type="sldNum" sz="quarter" idx="10"/>
-          </p:nvPr>
-        </p:nvSpPr>
-        <p:spPr/>
-        <p:txBody>
-          <a:bodyPr/>
-          <a:lstStyle/>
-          <a:p>
-            <a:fld id="{72B91EDC-0C87-4192-8AD8-36C87AC108D0}" type="slidenum">
-              <a:rPr lang="pt-BR" smtClean="0"/>
-              <a:pPr/>
-              <a:t>46</a:t>
-            </a:fld>
-            <a:endParaRPr lang="pt-BR"/>
-          </a:p>
-        </p:txBody>
-      </p:sp>
-    </p:spTree>
-  </p:cSld>
-  <p:clrMapOvr>
-    <a:masterClrMapping/>
-  </p:clrMapOvr>
-</p:notes>
-</file>
-
-<file path=ppt/notesSlides/notesSlide46.xml><?xml version="1.0" encoding="utf-8"?>
-<p:notes xmlns:a="http://schemas.openxmlformats.org/drawingml/2006/main" xmlns:r="http://schemas.openxmlformats.org/officeDocument/2006/relationships" xmlns:p="http://schemas.openxmlformats.org/presentationml/2006/main">
-  <p:cSld>
-    <p:spTree>
-      <p:nvGrpSpPr>
-        <p:cNvPr id="1" name=""/>
-        <p:cNvGrpSpPr/>
-        <p:nvPr/>
-      </p:nvGrpSpPr>
-      <p:grpSpPr>
-        <a:xfrm>
-          <a:off x="0" y="0"/>
-          <a:ext cx="0" cy="0"/>
-          <a:chOff x="0" y="0"/>
-          <a:chExt cx="0" cy="0"/>
-        </a:xfrm>
-      </p:grpSpPr>
-      <p:sp>
-        <p:nvSpPr>
-          <p:cNvPr id="2" name="Espaço Reservado para Imagem de Slide 1"/>
-          <p:cNvSpPr>
-            <a:spLocks noGrp="1" noRot="1" noChangeAspect="1"/>
-          </p:cNvSpPr>
-          <p:nvPr>
-            <p:ph type="sldImg"/>
-          </p:nvPr>
-        </p:nvSpPr>
-        <p:spPr/>
-      </p:sp>
-      <p:sp>
-        <p:nvSpPr>
-          <p:cNvPr id="3" name="Espaço Reservado para Anotações 2"/>
-          <p:cNvSpPr>
-            <a:spLocks noGrp="1"/>
-          </p:cNvSpPr>
-          <p:nvPr>
-            <p:ph type="body" idx="1"/>
-          </p:nvPr>
-        </p:nvSpPr>
-        <p:spPr/>
-        <p:txBody>
-          <a:bodyPr>
-            <a:normAutofit/>
-          </a:bodyPr>
-          <a:lstStyle/>
-          <a:p>
-            <a:endParaRPr lang="pt-BR" dirty="0" smtClean="0"/>
-          </a:p>
-        </p:txBody>
-      </p:sp>
-      <p:sp>
-        <p:nvSpPr>
-          <p:cNvPr id="4" name="Espaço Reservado para Número de Slide 3"/>
-          <p:cNvSpPr>
-            <a:spLocks noGrp="1"/>
-          </p:cNvSpPr>
-          <p:nvPr>
-            <p:ph type="sldNum" sz="quarter" idx="10"/>
-          </p:nvPr>
-        </p:nvSpPr>
-        <p:spPr/>
-        <p:txBody>
-          <a:bodyPr/>
-          <a:lstStyle/>
-          <a:p>
-            <a:fld id="{72B91EDC-0C87-4192-8AD8-36C87AC108D0}" type="slidenum">
-              <a:rPr lang="pt-BR" smtClean="0"/>
-              <a:pPr/>
-              <a:t>47</a:t>
-            </a:fld>
-            <a:endParaRPr lang="pt-BR"/>
-          </a:p>
-        </p:txBody>
-      </p:sp>
-    </p:spTree>
-  </p:cSld>
-  <p:clrMapOvr>
-    <a:masterClrMapping/>
-  </p:clrMapOvr>
-</p:notes>
-</file>
-
-<file path=ppt/notesSlides/notesSlide47.xml><?xml version="1.0" encoding="utf-8"?>
-<p:notes xmlns:a="http://schemas.openxmlformats.org/drawingml/2006/main" xmlns:r="http://schemas.openxmlformats.org/officeDocument/2006/relationships" xmlns:p="http://schemas.openxmlformats.org/presentationml/2006/main">
-  <p:cSld>
-    <p:spTree>
-      <p:nvGrpSpPr>
-        <p:cNvPr id="1" name=""/>
-        <p:cNvGrpSpPr/>
-        <p:nvPr/>
-      </p:nvGrpSpPr>
-      <p:grpSpPr>
-        <a:xfrm>
-          <a:off x="0" y="0"/>
-          <a:ext cx="0" cy="0"/>
-          <a:chOff x="0" y="0"/>
-          <a:chExt cx="0" cy="0"/>
-        </a:xfrm>
-      </p:grpSpPr>
-      <p:sp>
-        <p:nvSpPr>
-          <p:cNvPr id="2" name="Espaço Reservado para Imagem de Slide 1"/>
-          <p:cNvSpPr>
-            <a:spLocks noGrp="1" noRot="1" noChangeAspect="1"/>
-          </p:cNvSpPr>
-          <p:nvPr>
-            <p:ph type="sldImg"/>
-          </p:nvPr>
-        </p:nvSpPr>
-        <p:spPr/>
-      </p:sp>
-      <p:sp>
-        <p:nvSpPr>
-          <p:cNvPr id="3" name="Espaço Reservado para Anotações 2"/>
-          <p:cNvSpPr>
-            <a:spLocks noGrp="1"/>
-          </p:cNvSpPr>
-          <p:nvPr>
-            <p:ph type="body" idx="1"/>
-          </p:nvPr>
-        </p:nvSpPr>
-        <p:spPr/>
-        <p:txBody>
-          <a:bodyPr>
-            <a:normAutofit/>
-          </a:bodyPr>
-          <a:lstStyle/>
-          <a:p>
-            <a:endParaRPr lang="pt-BR" dirty="0" smtClean="0"/>
-          </a:p>
-        </p:txBody>
-      </p:sp>
-      <p:sp>
-        <p:nvSpPr>
-          <p:cNvPr id="4" name="Espaço Reservado para Número de Slide 3"/>
-          <p:cNvSpPr>
-            <a:spLocks noGrp="1"/>
-          </p:cNvSpPr>
-          <p:nvPr>
-            <p:ph type="sldNum" sz="quarter" idx="10"/>
-          </p:nvPr>
-        </p:nvSpPr>
-        <p:spPr/>
-        <p:txBody>
-          <a:bodyPr/>
-          <a:lstStyle/>
-          <a:p>
-            <a:fld id="{72B91EDC-0C87-4192-8AD8-36C87AC108D0}" type="slidenum">
-              <a:rPr lang="pt-BR" smtClean="0"/>
-              <a:pPr/>
-              <a:t>48</a:t>
-            </a:fld>
-            <a:endParaRPr lang="pt-BR"/>
-          </a:p>
-        </p:txBody>
-      </p:sp>
-    </p:spTree>
-  </p:cSld>
-  <p:clrMapOvr>
-    <a:masterClrMapping/>
-  </p:clrMapOvr>
-</p:notes>
-</file>
-
 <file path=ppt/notesSlides/notesSlide5.xml><?xml version="1.0" encoding="utf-8"?>
 <p:notes xmlns:a="http://schemas.openxmlformats.org/drawingml/2006/main" xmlns:r="http://schemas.openxmlformats.org/officeDocument/2006/relationships" xmlns:p="http://schemas.openxmlformats.org/presentationml/2006/main">
   <p:cSld>
@@ -4609,7 +4028,7 @@
             <a:fld id="{2E700DB3-DBF0-4086-B675-117E7A9610B8}" type="datetimeFigureOut">
               <a:rPr lang="pt-BR" smtClean="0"/>
               <a:pPr/>
-              <a:t>09/03/2014</a:t>
+              <a:t>10/03/2014</a:t>
             </a:fld>
             <a:endParaRPr lang="pt-BR"/>
           </a:p>
@@ -4834,7 +4253,7 @@
             <a:fld id="{2E700DB3-DBF0-4086-B675-117E7A9610B8}" type="datetimeFigureOut">
               <a:rPr lang="pt-BR" smtClean="0"/>
               <a:pPr/>
-              <a:t>09/03/2014</a:t>
+              <a:t>10/03/2014</a:t>
             </a:fld>
             <a:endParaRPr lang="pt-BR"/>
           </a:p>
@@ -5116,7 +4535,7 @@
             <a:fld id="{2E700DB3-DBF0-4086-B675-117E7A9610B8}" type="datetimeFigureOut">
               <a:rPr lang="pt-BR" smtClean="0"/>
               <a:pPr/>
-              <a:t>09/03/2014</a:t>
+              <a:t>10/03/2014</a:t>
             </a:fld>
             <a:endParaRPr lang="pt-BR"/>
           </a:p>
@@ -5297,7 +4716,7 @@
             <a:fld id="{2E700DB3-DBF0-4086-B675-117E7A9610B8}" type="datetimeFigureOut">
               <a:rPr lang="pt-BR" smtClean="0"/>
               <a:pPr/>
-              <a:t>09/03/2014</a:t>
+              <a:t>10/03/2014</a:t>
             </a:fld>
             <a:endParaRPr lang="pt-BR"/>
           </a:p>
@@ -5657,7 +5076,7 @@
             <a:fld id="{2E700DB3-DBF0-4086-B675-117E7A9610B8}" type="datetimeFigureOut">
               <a:rPr lang="pt-BR" smtClean="0"/>
               <a:pPr/>
-              <a:t>09/03/2014</a:t>
+              <a:t>10/03/2014</a:t>
             </a:fld>
             <a:endParaRPr lang="pt-BR"/>
           </a:p>
@@ -5946,7 +5365,7 @@
             <a:fld id="{2E700DB3-DBF0-4086-B675-117E7A9610B8}" type="datetimeFigureOut">
               <a:rPr lang="pt-BR" smtClean="0"/>
               <a:pPr/>
-              <a:t>09/03/2014</a:t>
+              <a:t>10/03/2014</a:t>
             </a:fld>
             <a:endParaRPr lang="pt-BR"/>
           </a:p>
@@ -6370,7 +5789,7 @@
             <a:fld id="{2E700DB3-DBF0-4086-B675-117E7A9610B8}" type="datetimeFigureOut">
               <a:rPr lang="pt-BR" smtClean="0"/>
               <a:pPr/>
-              <a:t>09/03/2014</a:t>
+              <a:t>10/03/2014</a:t>
             </a:fld>
             <a:endParaRPr lang="pt-BR"/>
           </a:p>
@@ -6487,7 +5906,7 @@
             <a:fld id="{2E700DB3-DBF0-4086-B675-117E7A9610B8}" type="datetimeFigureOut">
               <a:rPr lang="pt-BR" smtClean="0"/>
               <a:pPr/>
-              <a:t>09/03/2014</a:t>
+              <a:t>10/03/2014</a:t>
             </a:fld>
             <a:endParaRPr lang="pt-BR"/>
           </a:p>
@@ -6579,7 +5998,7 @@
             <a:fld id="{2E700DB3-DBF0-4086-B675-117E7A9610B8}" type="datetimeFigureOut">
               <a:rPr lang="pt-BR" smtClean="0"/>
               <a:pPr/>
-              <a:t>09/03/2014</a:t>
+              <a:t>10/03/2014</a:t>
             </a:fld>
             <a:endParaRPr lang="pt-BR"/>
           </a:p>
@@ -6859,7 +6278,7 @@
             <a:fld id="{2E700DB3-DBF0-4086-B675-117E7A9610B8}" type="datetimeFigureOut">
               <a:rPr lang="pt-BR" smtClean="0"/>
               <a:pPr/>
-              <a:t>09/03/2014</a:t>
+              <a:t>10/03/2014</a:t>
             </a:fld>
             <a:endParaRPr lang="pt-BR"/>
           </a:p>
@@ -7227,7 +6646,7 @@
             <a:fld id="{2E700DB3-DBF0-4086-B675-117E7A9610B8}" type="datetimeFigureOut">
               <a:rPr lang="pt-BR" smtClean="0"/>
               <a:pPr/>
-              <a:t>09/03/2014</a:t>
+              <a:t>10/03/2014</a:t>
             </a:fld>
             <a:endParaRPr lang="pt-BR"/>
           </a:p>
@@ -7666,7 +7085,7 @@
             <a:fld id="{2E700DB3-DBF0-4086-B675-117E7A9610B8}" type="datetimeFigureOut">
               <a:rPr lang="pt-BR" smtClean="0"/>
               <a:pPr/>
-              <a:t>09/03/2014</a:t>
+              <a:t>10/03/2014</a:t>
             </a:fld>
             <a:endParaRPr lang="pt-BR"/>
           </a:p>
@@ -11651,15 +11070,7 @@
             </a:pPr>
             <a:r>
               <a:rPr lang="pt-BR" dirty="0" smtClean="0"/>
-              <a:t>Construa um programa que leia do console 3 números inteiros, e imprima </a:t>
-            </a:r>
-            <a:r>
-              <a:rPr lang="pt-BR" dirty="0" smtClean="0"/>
-              <a:t>o </a:t>
-            </a:r>
-            <a:r>
-              <a:rPr lang="pt-BR" dirty="0" smtClean="0"/>
-              <a:t>resultado em ordem crescente.</a:t>
+              <a:t>Construa um programa que leia do console 3 números inteiros, e imprima o resultado em ordem crescente.</a:t>
             </a:r>
           </a:p>
           <a:p>
@@ -11779,11 +11190,7 @@
             </a:pPr>
             <a:r>
               <a:rPr lang="pt-BR" dirty="0" smtClean="0"/>
-              <a:t>Construa um programa que leia a partir do console as 3 notas de um aluno e calcule a média final deste aluno. Considerar que a média é ponderada e que o peso das notas são 2,3 e 5, respectivamente</a:t>
-            </a:r>
-            <a:r>
-              <a:rPr lang="pt-BR" dirty="0" smtClean="0"/>
-              <a:t>.</a:t>
+              <a:t>Construa um programa que leia a partir do console as 3 notas de um aluno e calcule a média final deste aluno. Considerar que a média é ponderada e que o peso das notas são 2,3 e 5, respectivamente.</a:t>
             </a:r>
           </a:p>
           <a:p>
@@ -11793,43 +11200,7 @@
             </a:pPr>
             <a:r>
               <a:rPr lang="pt-BR" dirty="0" smtClean="0"/>
-              <a:t>O custo ao consumidor de um carro novo é a soma do custo de fábrica </a:t>
-            </a:r>
-            <a:r>
-              <a:rPr lang="pt-BR" dirty="0" smtClean="0"/>
-              <a:t>somados a </a:t>
-            </a:r>
-            <a:r>
-              <a:rPr lang="pt-BR" dirty="0" smtClean="0"/>
-              <a:t>percentagem do distribuidor e dos impostos (aplicados ao custo de fábrica). Supondo que a percentagem do distribuidor seja de </a:t>
-            </a:r>
-            <a:r>
-              <a:rPr lang="pt-BR" dirty="0" smtClean="0"/>
-              <a:t>1,8</a:t>
-            </a:r>
-            <a:r>
-              <a:rPr lang="pt-BR" dirty="0" smtClean="0"/>
-              <a:t>% e os impostos de 45%, escrever um </a:t>
-            </a:r>
-            <a:r>
-              <a:rPr lang="pt-BR" dirty="0" smtClean="0"/>
-              <a:t>programa </a:t>
-            </a:r>
-            <a:r>
-              <a:rPr lang="pt-BR" dirty="0" smtClean="0"/>
-              <a:t>que leia </a:t>
-            </a:r>
-            <a:r>
-              <a:rPr lang="pt-BR" dirty="0" smtClean="0"/>
-              <a:t>do console o </a:t>
-            </a:r>
-            <a:r>
-              <a:rPr lang="pt-BR" dirty="0" smtClean="0"/>
-              <a:t>custo de fábrica de um carro e </a:t>
-            </a:r>
-            <a:r>
-              <a:rPr lang="pt-BR" dirty="0" smtClean="0"/>
-              <a:t>imprima o custo final</a:t>
+              <a:t>O custo ao consumidor de um carro novo é a soma do custo de fábrica somados a percentagem do distribuidor e dos impostos (aplicados ao custo de fábrica). Supondo que a percentagem do distribuidor seja de 1,8% e os impostos de 45%, escrever um programa que leia do console o custo de fábrica de um carro e imprima o custo final</a:t>
             </a:r>
           </a:p>
           <a:p>
@@ -11839,25 +11210,8 @@
             </a:pPr>
             <a:r>
               <a:rPr lang="pt-BR" dirty="0" smtClean="0"/>
-              <a:t>Construa um programa que calcule </a:t>
-            </a:r>
-            <a:r>
-              <a:rPr lang="pt-BR" dirty="0" smtClean="0"/>
-              <a:t>a média aritmética das 3 notas de um aluno e mostre, além do valor da média, uma mensagem de "Aprovado", caso a média seja igual ou superior a 6, ou </a:t>
-            </a:r>
-            <a:r>
-              <a:rPr lang="pt-BR" dirty="0" smtClean="0"/>
-              <a:t>a mensagem </a:t>
-            </a:r>
-            <a:r>
-              <a:rPr lang="pt-BR" dirty="0" smtClean="0"/>
-              <a:t>"reprovado", caso contrário</a:t>
-            </a:r>
-            <a:r>
-              <a:rPr lang="pt-BR" dirty="0" smtClean="0"/>
-              <a:t>. Ao invés de ler as notas do console, sorteie (randomicamente) valores inteiros de 1 a 10</a:t>
-            </a:r>
-            <a:endParaRPr lang="pt-BR" dirty="0" smtClean="0"/>
+              <a:t>Construa um programa que calcule a média aritmética das 3 notas de um aluno e mostre, além do valor da média, uma mensagem de "Aprovado", caso a média seja igual ou superior a 6, ou a mensagem "reprovado", caso contrário. Ao invés de ler as notas do console, sorteie (randomicamente) valores inteiros de 1 a 10</a:t>
+            </a:r>
           </a:p>
         </p:txBody>
       </p:sp>
@@ -11939,27 +11293,7 @@
             </a:pPr>
             <a:r>
               <a:rPr lang="pt-BR" dirty="0" smtClean="0"/>
-              <a:t>Elaborar um </a:t>
-            </a:r>
-            <a:r>
-              <a:rPr lang="pt-BR" dirty="0" smtClean="0"/>
-              <a:t>programa </a:t>
-            </a:r>
-            <a:r>
-              <a:rPr lang="pt-BR" dirty="0" smtClean="0"/>
-              <a:t>que lê 2 </a:t>
-            </a:r>
-            <a:r>
-              <a:rPr lang="pt-BR" dirty="0" smtClean="0"/>
-              <a:t>números e imprime a </a:t>
-            </a:r>
-            <a:r>
-              <a:rPr lang="pt-BR" dirty="0" smtClean="0"/>
-              <a:t>mensagem: "São múltiplos" ou "Não são </a:t>
-            </a:r>
-            <a:r>
-              <a:rPr lang="pt-BR" dirty="0" smtClean="0"/>
-              <a:t>múltiplos“</a:t>
+              <a:t>Elaborar um programa que lê 2 números e imprime a mensagem: "São múltiplos" ou "Não são múltiplos“</a:t>
             </a:r>
           </a:p>
           <a:p>
@@ -11969,23 +11303,7 @@
             </a:pPr>
             <a:r>
               <a:rPr lang="pt-BR" dirty="0" smtClean="0"/>
-              <a:t>Elabore um </a:t>
-            </a:r>
-            <a:r>
-              <a:rPr lang="pt-BR" dirty="0" smtClean="0"/>
-              <a:t>programa </a:t>
-            </a:r>
-            <a:r>
-              <a:rPr lang="pt-BR" dirty="0" smtClean="0"/>
-              <a:t>que dada a idade de um nadador classifica-o em uma das </a:t>
-            </a:r>
-            <a:r>
-              <a:rPr lang="pt-BR" dirty="0" smtClean="0"/>
-              <a:t>seguintes categorias</a:t>
-            </a:r>
-            <a:r>
-              <a:rPr lang="pt-BR" dirty="0" smtClean="0"/>
-              <a:t>:</a:t>
+              <a:t>Elabore um programa que dada a idade de um nadador classifica-o em uma das seguintes categorias:</a:t>
             </a:r>
           </a:p>
           <a:p>
@@ -12022,7 +11340,6 @@
               <a:rPr lang="pt-BR" dirty="0" smtClean="0"/>
               <a:t>Adulto = maiores de 18 anos</a:t>
             </a:r>
-            <a:endParaRPr lang="pt-BR" dirty="0" smtClean="0"/>
           </a:p>
         </p:txBody>
       </p:sp>
@@ -12109,41 +11426,8 @@
             </a:pPr>
             <a:r>
               <a:rPr lang="pt-BR" dirty="0" smtClean="0"/>
-              <a:t>Um usuário deseja um algoritmo onde possa escolher que tipo de média deseja calcular a partir de 3 notas. Faça um </a:t>
-            </a:r>
-            <a:r>
-              <a:rPr lang="pt-BR" dirty="0" smtClean="0"/>
-              <a:t>programa </a:t>
-            </a:r>
-            <a:r>
-              <a:rPr lang="pt-BR" dirty="0" smtClean="0"/>
-              <a:t>que leia </a:t>
-            </a:r>
-            <a:r>
-              <a:rPr lang="pt-BR" dirty="0" smtClean="0"/>
-              <a:t>a partir do console as </a:t>
-            </a:r>
-            <a:r>
-              <a:rPr lang="pt-BR" dirty="0" smtClean="0"/>
-              <a:t>notas, a opção escolhida pelo usuário e calcule </a:t>
-            </a:r>
-            <a:r>
-              <a:rPr lang="pt-BR" dirty="0" smtClean="0"/>
-              <a:t>o resultado. Opções: (1) aritmética</a:t>
-            </a:r>
-            <a:r>
-              <a:rPr lang="pt-BR" dirty="0" smtClean="0"/>
-              <a:t>, </a:t>
-            </a:r>
-            <a:r>
-              <a:rPr lang="pt-BR" dirty="0" smtClean="0"/>
-              <a:t>(2) ponderada [valores da ponderação: 3,3,4 </a:t>
-            </a:r>
-            <a:r>
-              <a:rPr lang="pt-BR" dirty="0" smtClean="0"/>
-              <a:t>e harmônica</a:t>
-            </a:r>
-            <a:endParaRPr lang="pt-BR" dirty="0" smtClean="0"/>
+              <a:t>Um usuário deseja um algoritmo onde possa escolher que tipo de média deseja calcular a partir de 3 notas. Faça um programa que leia a partir do console as notas, a opção escolhida pelo usuário e calcule o resultado. Opções: (1) aritmética, (2) ponderada [valores da ponderação: 3,3,4 e harmônica</a:t>
+            </a:r>
           </a:p>
         </p:txBody>
       </p:sp>
@@ -12272,19 +11556,7 @@
             </a:pPr>
             <a:r>
               <a:rPr lang="pt-BR" dirty="0" smtClean="0"/>
-              <a:t>Construa um programa que imprime </a:t>
-            </a:r>
-            <a:r>
-              <a:rPr lang="pt-BR" dirty="0" smtClean="0"/>
-              <a:t>apenas os números pares entre 1 </a:t>
-            </a:r>
-            <a:r>
-              <a:rPr lang="pt-BR" dirty="0" smtClean="0"/>
-              <a:t>a </a:t>
-            </a:r>
-            <a:r>
-              <a:rPr lang="pt-BR" dirty="0" smtClean="0"/>
-              <a:t>50</a:t>
+              <a:t>Construa um programa que imprime apenas os números pares entre 1 a 50</a:t>
             </a:r>
           </a:p>
           <a:p>
@@ -12314,11 +11586,7 @@
             </a:pPr>
             <a:r>
               <a:rPr lang="pt-BR" dirty="0" smtClean="0"/>
-              <a:t>Elabore um programa que solicite que o usuário entre com dois números (inicial e final), e apresente o valor total da soma de todos os números do intervalo </a:t>
-            </a:r>
-            <a:r>
-              <a:rPr lang="pt-BR" dirty="0" smtClean="0"/>
-              <a:t>informado</a:t>
+              <a:t>Elabore um programa que solicite que o usuário entre com dois números (inicial e final), e apresente o valor total da soma de todos os números do intervalo informado</a:t>
             </a:r>
           </a:p>
           <a:p>
@@ -12338,17 +11606,8 @@
             </a:pPr>
             <a:r>
               <a:rPr lang="pt-BR" dirty="0" smtClean="0"/>
-              <a:t>Escreva um </a:t>
-            </a:r>
-            <a:r>
-              <a:rPr lang="pt-BR" dirty="0" smtClean="0"/>
-              <a:t>programa </a:t>
-            </a:r>
-            <a:r>
-              <a:rPr lang="pt-BR" dirty="0" smtClean="0"/>
-              <a:t>que calcule o valor de H, sendo que ele é determinado pela série H = 1/1 + 3/2 + 5/3 + 7/4 + ... + 99/50</a:t>
-            </a:r>
-            <a:endParaRPr lang="pt-BR" dirty="0" smtClean="0"/>
+              <a:t>Escreva um programa que calcule o valor de H, sendo que ele é determinado pela série H = 1/1 + 3/2 + 5/3 + 7/4 + ... + 99/50</a:t>
+            </a:r>
           </a:p>
         </p:txBody>
       </p:sp>
@@ -12435,21 +11694,8 @@
             </a:pPr>
             <a:r>
               <a:rPr lang="pt-BR" dirty="0" smtClean="0"/>
-              <a:t>Dado uma série infinita </a:t>
-            </a:r>
-            <a:r>
-              <a:rPr lang="pt-BR" dirty="0" smtClean="0"/>
-              <a:t>(fórmula abaixo), e calcule </a:t>
-            </a:r>
-            <a:r>
-              <a:rPr lang="pt-BR" dirty="0" smtClean="0"/>
-              <a:t>o valor da série até atingir a precisão de </a:t>
-            </a:r>
-            <a:r>
-              <a:rPr lang="pt-BR" dirty="0" smtClean="0"/>
-              <a:t>0,001. A precisão é alcançada quando a diferença entre uma iteração e outra é inferior a precisão desejada. Exiba o resultado da soma e a quantidade de iterações. Posteriormente aumenta a precisão para 0,000001 e compare o resultado</a:t>
-            </a:r>
-            <a:endParaRPr lang="pt-BR" dirty="0" smtClean="0"/>
+              <a:t>Dado uma série infinita (fórmula abaixo), e calcule o valor da série até atingir a precisão de 0,001. A precisão é alcançada quando a diferença entre uma iteração e outra é inferior a precisão desejada. Exiba o resultado da soma e a quantidade de iterações. Posteriormente aumenta a precisão para 0,000001 e compare o resultado</a:t>
+            </a:r>
           </a:p>
         </p:txBody>
       </p:sp>
@@ -12570,7 +11816,6 @@
               <a:rPr lang="pt-BR" dirty="0" smtClean="0"/>
               <a:t>Calcule o famoso número PI através da série infinita descoberta pelo grande matemático Leibniz. Calcule com precisão 0,01 e depois aumente a precisão para 0,0001</a:t>
             </a:r>
-            <a:endParaRPr lang="pt-BR" dirty="0" smtClean="0"/>
           </a:p>
         </p:txBody>
       </p:sp>
@@ -12855,11 +12100,7 @@
             </a:pPr>
             <a:r>
               <a:rPr lang="pt-BR" dirty="0" smtClean="0"/>
-              <a:t>Construa um programa para calcular o fatorial de um número inteiro positivo. Utilize um algoritmo </a:t>
-            </a:r>
-            <a:r>
-              <a:rPr lang="pt-BR" dirty="0" smtClean="0"/>
-              <a:t>recursivo</a:t>
+              <a:t>Construa um programa para calcular o fatorial de um número inteiro positivo. Utilize um algoritmo recursivo</a:t>
             </a:r>
           </a:p>
           <a:p>
@@ -12885,15 +12126,7 @@
             </a:r>
             <a:r>
               <a:rPr lang="pt-BR" dirty="0" smtClean="0"/>
-              <a:t> de 100 posições com valores aleatórios entre 1 e 100, pesquise um número (definido </a:t>
-            </a:r>
-            <a:r>
-              <a:rPr lang="pt-BR" dirty="0" smtClean="0"/>
-              <a:t>também aleatoriamente</a:t>
-            </a:r>
-            <a:r>
-              <a:rPr lang="pt-BR" dirty="0" smtClean="0"/>
-              <a:t>) dentro do </a:t>
+              <a:t> de 100 posições com valores aleatórios entre 1 e 100, pesquise um número (definido também aleatoriamente) dentro do </a:t>
             </a:r>
             <a:r>
               <a:rPr lang="pt-BR" dirty="0" err="1" smtClean="0"/>
@@ -12901,27 +12134,7 @@
             </a:r>
             <a:r>
               <a:rPr lang="pt-BR" dirty="0" smtClean="0"/>
-              <a:t> e </a:t>
-            </a:r>
-            <a:r>
-              <a:rPr lang="pt-BR" dirty="0" smtClean="0"/>
-              <a:t>caso encontre </a:t>
-            </a:r>
-            <a:r>
-              <a:rPr lang="pt-BR" dirty="0" smtClean="0"/>
-              <a:t>o número desejado, imprima a posição que o mesmo se encontra </a:t>
-            </a:r>
-            <a:r>
-              <a:rPr lang="pt-BR" dirty="0" smtClean="0"/>
-              <a:t>ou </a:t>
-            </a:r>
-            <a:r>
-              <a:rPr lang="pt-BR" dirty="0" smtClean="0"/>
-              <a:t>informe que o mesmo não existe. Exiba também o tempo de processamento em </a:t>
-            </a:r>
-            <a:r>
-              <a:rPr lang="pt-BR" dirty="0" smtClean="0"/>
-              <a:t>milissegundos</a:t>
+              <a:t> e caso encontre o número desejado, imprima a posição que o mesmo se encontra ou informe que o mesmo não existe. Exiba também o tempo de processamento em milissegundos</a:t>
             </a:r>
           </a:p>
           <a:p>
@@ -12933,7 +12146,6 @@
               <a:rPr lang="pt-BR" dirty="0" smtClean="0"/>
               <a:t>Construa um programa que gerencie a tabela do campeonato brasileiro. A tabela deverá manter as seguintes informações: Nome do time, número de vitórias, empates e derrotas, gols prós, gols contras e a pontuação. Considere que uma vitória vale 3 pontos e um empate vale 1 ponto. Permita que o usuário acrescente jogos, informando o nome dos times e quantidade de gols de cada time na partida</a:t>
             </a:r>
-            <a:endParaRPr lang="pt-BR" dirty="0" smtClean="0"/>
           </a:p>
         </p:txBody>
       </p:sp>
@@ -13020,13 +12232,8 @@
             </a:pPr>
             <a:r>
               <a:rPr lang="pt-BR" dirty="0" smtClean="0"/>
-              <a:t>Construa um algoritmo para exibir os números da série de </a:t>
-            </a:r>
-            <a:r>
-              <a:rPr lang="pt-BR" dirty="0" smtClean="0"/>
-              <a:t>Fibonacci (fórmula abaixo)</a:t>
-            </a:r>
-            <a:endParaRPr lang="pt-BR" dirty="0" smtClean="0"/>
+              <a:t>Construa um algoritmo para exibir os números da série de Fibonacci (fórmula abaixo)</a:t>
+            </a:r>
           </a:p>
         </p:txBody>
       </p:sp>
@@ -13062,691 +12269,6 @@
           </a:ln>
         </p:spPr>
       </p:pic>
-    </p:spTree>
-  </p:cSld>
-  <p:clrMapOvr>
-    <a:masterClrMapping/>
-  </p:clrMapOvr>
-  <p:timing>
-    <p:tnLst>
-      <p:par>
-        <p:cTn id="1" dur="indefinite" restart="never" nodeType="tmRoot"/>
-      </p:par>
-    </p:tnLst>
-  </p:timing>
-</p:sld>
-</file>
-
-<file path=ppt/slides/slide42.xml><?xml version="1.0" encoding="utf-8"?>
-<p:sld xmlns:a="http://schemas.openxmlformats.org/drawingml/2006/main" xmlns:r="http://schemas.openxmlformats.org/officeDocument/2006/relationships" xmlns:p="http://schemas.openxmlformats.org/presentationml/2006/main">
-  <p:cSld>
-    <p:spTree>
-      <p:nvGrpSpPr>
-        <p:cNvPr id="1" name=""/>
-        <p:cNvGrpSpPr/>
-        <p:nvPr/>
-      </p:nvGrpSpPr>
-      <p:grpSpPr>
-        <a:xfrm>
-          <a:off x="0" y="0"/>
-          <a:ext cx="0" cy="0"/>
-          <a:chOff x="0" y="0"/>
-          <a:chExt cx="0" cy="0"/>
-        </a:xfrm>
-      </p:grpSpPr>
-      <p:sp>
-        <p:nvSpPr>
-          <p:cNvPr id="2" name="Título 1"/>
-          <p:cNvSpPr>
-            <a:spLocks noGrp="1"/>
-          </p:cNvSpPr>
-          <p:nvPr>
-            <p:ph type="title"/>
-          </p:nvPr>
-        </p:nvSpPr>
-        <p:spPr/>
-        <p:txBody>
-          <a:bodyPr/>
-          <a:lstStyle/>
-          <a:p>
-            <a:r>
-              <a:rPr lang="pt-BR" dirty="0" smtClean="0"/>
-              <a:t>Orientação a Objetos</a:t>
-            </a:r>
-            <a:endParaRPr lang="pt-BR" dirty="0"/>
-          </a:p>
-        </p:txBody>
-      </p:sp>
-      <p:sp>
-        <p:nvSpPr>
-          <p:cNvPr id="3" name="Espaço Reservado para Conteúdo 2"/>
-          <p:cNvSpPr>
-            <a:spLocks noGrp="1"/>
-          </p:cNvSpPr>
-          <p:nvPr>
-            <p:ph idx="1"/>
-          </p:nvPr>
-        </p:nvSpPr>
-        <p:spPr/>
-        <p:txBody>
-          <a:bodyPr>
-            <a:normAutofit/>
-          </a:bodyPr>
-          <a:lstStyle/>
-          <a:p>
-            <a:r>
-              <a:rPr lang="pt-BR" dirty="0" smtClean="0"/>
-              <a:t>Paradigma de Modelagem OO</a:t>
-            </a:r>
-          </a:p>
-          <a:p>
-            <a:pPr lvl="1"/>
-            <a:r>
-              <a:rPr lang="pt-BR" dirty="0" smtClean="0"/>
-              <a:t>Modelagem mais próxima do </a:t>
-            </a:r>
-            <a:r>
-              <a:rPr lang="pt-BR" i="1" dirty="0" smtClean="0"/>
-              <a:t>“Mundo Real”</a:t>
-            </a:r>
-          </a:p>
-          <a:p>
-            <a:pPr lvl="2"/>
-            <a:r>
-              <a:rPr lang="pt-BR" i="1" dirty="0" smtClean="0"/>
-              <a:t>Mundo Real = Mundo que concebemos e compreendemos </a:t>
-            </a:r>
-            <a:endParaRPr lang="pt-BR" dirty="0" smtClean="0"/>
-          </a:p>
-          <a:p>
-            <a:pPr lvl="1"/>
-            <a:r>
-              <a:rPr lang="pt-BR" dirty="0" smtClean="0"/>
-              <a:t>Classe = </a:t>
-            </a:r>
-          </a:p>
-          <a:p>
-            <a:pPr lvl="2"/>
-            <a:r>
-              <a:rPr lang="pt-BR" dirty="0" smtClean="0"/>
-              <a:t>Ações + Características</a:t>
-            </a:r>
-          </a:p>
-          <a:p>
-            <a:pPr lvl="2"/>
-            <a:r>
-              <a:rPr lang="pt-BR" dirty="0" smtClean="0"/>
-              <a:t>Conjunto de elementos do mesmo Tipo</a:t>
-            </a:r>
-          </a:p>
-          <a:p>
-            <a:pPr lvl="1"/>
-            <a:r>
-              <a:rPr lang="pt-BR" dirty="0" smtClean="0"/>
-              <a:t>Objeto = Elemento concreto de uma classe</a:t>
-            </a:r>
-          </a:p>
-          <a:p>
-            <a:pPr lvl="1"/>
-            <a:r>
-              <a:rPr lang="pt-BR" dirty="0" smtClean="0"/>
-              <a:t>Programa = Ecossistema de objetos que interagem entre si com objetivo de realizar algo</a:t>
-            </a:r>
-          </a:p>
-          <a:p>
-            <a:pPr lvl="1"/>
-            <a:endParaRPr lang="pt-BR" dirty="0" smtClean="0"/>
-          </a:p>
-        </p:txBody>
-      </p:sp>
-    </p:spTree>
-  </p:cSld>
-  <p:clrMapOvr>
-    <a:masterClrMapping/>
-  </p:clrMapOvr>
-  <p:timing>
-    <p:tnLst>
-      <p:par>
-        <p:cTn id="1" dur="indefinite" restart="never" nodeType="tmRoot"/>
-      </p:par>
-    </p:tnLst>
-  </p:timing>
-</p:sld>
-</file>
-
-<file path=ppt/slides/slide43.xml><?xml version="1.0" encoding="utf-8"?>
-<p:sld xmlns:a="http://schemas.openxmlformats.org/drawingml/2006/main" xmlns:r="http://schemas.openxmlformats.org/officeDocument/2006/relationships" xmlns:p="http://schemas.openxmlformats.org/presentationml/2006/main">
-  <p:cSld>
-    <p:spTree>
-      <p:nvGrpSpPr>
-        <p:cNvPr id="1" name=""/>
-        <p:cNvGrpSpPr/>
-        <p:nvPr/>
-      </p:nvGrpSpPr>
-      <p:grpSpPr>
-        <a:xfrm>
-          <a:off x="0" y="0"/>
-          <a:ext cx="0" cy="0"/>
-          <a:chOff x="0" y="0"/>
-          <a:chExt cx="0" cy="0"/>
-        </a:xfrm>
-      </p:grpSpPr>
-      <p:sp>
-        <p:nvSpPr>
-          <p:cNvPr id="2" name="Título 1"/>
-          <p:cNvSpPr>
-            <a:spLocks noGrp="1"/>
-          </p:cNvSpPr>
-          <p:nvPr>
-            <p:ph type="title"/>
-          </p:nvPr>
-        </p:nvSpPr>
-        <p:spPr/>
-        <p:txBody>
-          <a:bodyPr/>
-          <a:lstStyle/>
-          <a:p>
-            <a:r>
-              <a:rPr lang="pt-BR" dirty="0" smtClean="0"/>
-              <a:t>Orientação a Objetos</a:t>
-            </a:r>
-            <a:endParaRPr lang="pt-BR" dirty="0"/>
-          </a:p>
-        </p:txBody>
-      </p:sp>
-      <p:sp>
-        <p:nvSpPr>
-          <p:cNvPr id="3" name="Espaço Reservado para Conteúdo 2"/>
-          <p:cNvSpPr>
-            <a:spLocks noGrp="1"/>
-          </p:cNvSpPr>
-          <p:nvPr>
-            <p:ph idx="1"/>
-          </p:nvPr>
-        </p:nvSpPr>
-        <p:spPr/>
-        <p:txBody>
-          <a:bodyPr>
-            <a:normAutofit/>
-          </a:bodyPr>
-          <a:lstStyle/>
-          <a:p>
-            <a:r>
-              <a:rPr lang="pt-BR" dirty="0" smtClean="0"/>
-              <a:t>Paradigma de Modelagem OO</a:t>
-            </a:r>
-          </a:p>
-          <a:p>
-            <a:pPr lvl="1"/>
-            <a:r>
-              <a:rPr lang="pt-BR" dirty="0" smtClean="0"/>
-              <a:t>Herança</a:t>
-            </a:r>
-          </a:p>
-          <a:p>
-            <a:pPr lvl="2"/>
-            <a:r>
-              <a:rPr lang="pt-BR" dirty="0" smtClean="0"/>
-              <a:t>Uma classe herda as características (métodos e atributos) da sua superclasse</a:t>
-            </a:r>
-          </a:p>
-          <a:p>
-            <a:pPr lvl="2"/>
-            <a:r>
-              <a:rPr lang="pt-BR" dirty="0" smtClean="0"/>
-              <a:t>Superclasse = </a:t>
-            </a:r>
-            <a:r>
-              <a:rPr lang="pt-BR" i="1" dirty="0" smtClean="0"/>
-              <a:t>Classe Mãe (ou Pai)</a:t>
-            </a:r>
-          </a:p>
-          <a:p>
-            <a:pPr lvl="2"/>
-            <a:r>
-              <a:rPr lang="pt-BR" dirty="0" smtClean="0"/>
-              <a:t>Subclasse =</a:t>
-            </a:r>
-            <a:r>
-              <a:rPr lang="pt-BR" i="1" dirty="0" smtClean="0"/>
-              <a:t> Classe Filha</a:t>
-            </a:r>
-            <a:endParaRPr lang="pt-BR" dirty="0" smtClean="0"/>
-          </a:p>
-          <a:p>
-            <a:pPr lvl="1"/>
-            <a:r>
-              <a:rPr lang="pt-BR" dirty="0" smtClean="0"/>
-              <a:t>Herança Múltipla</a:t>
-            </a:r>
-          </a:p>
-          <a:p>
-            <a:pPr lvl="2"/>
-            <a:r>
-              <a:rPr lang="pt-BR" dirty="0" smtClean="0"/>
-              <a:t>Uma classe pode herdar de mais de uma </a:t>
-            </a:r>
-          </a:p>
-          <a:p>
-            <a:pPr lvl="2"/>
-            <a:r>
-              <a:rPr lang="pt-BR" dirty="0" smtClean="0">
-                <a:solidFill>
-                  <a:srgbClr val="FF0000"/>
-                </a:solidFill>
-              </a:rPr>
-              <a:t>Java NÃO POSSUI Herança Múltipla</a:t>
-            </a:r>
-          </a:p>
-        </p:txBody>
-      </p:sp>
-    </p:spTree>
-  </p:cSld>
-  <p:clrMapOvr>
-    <a:masterClrMapping/>
-  </p:clrMapOvr>
-  <p:timing>
-    <p:tnLst>
-      <p:par>
-        <p:cTn id="1" dur="indefinite" restart="never" nodeType="tmRoot"/>
-      </p:par>
-    </p:tnLst>
-  </p:timing>
-</p:sld>
-</file>
-
-<file path=ppt/slides/slide44.xml><?xml version="1.0" encoding="utf-8"?>
-<p:sld xmlns:a="http://schemas.openxmlformats.org/drawingml/2006/main" xmlns:r="http://schemas.openxmlformats.org/officeDocument/2006/relationships" xmlns:p="http://schemas.openxmlformats.org/presentationml/2006/main">
-  <p:cSld>
-    <p:spTree>
-      <p:nvGrpSpPr>
-        <p:cNvPr id="1" name=""/>
-        <p:cNvGrpSpPr/>
-        <p:nvPr/>
-      </p:nvGrpSpPr>
-      <p:grpSpPr>
-        <a:xfrm>
-          <a:off x="0" y="0"/>
-          <a:ext cx="0" cy="0"/>
-          <a:chOff x="0" y="0"/>
-          <a:chExt cx="0" cy="0"/>
-        </a:xfrm>
-      </p:grpSpPr>
-      <p:sp>
-        <p:nvSpPr>
-          <p:cNvPr id="2" name="Título 1"/>
-          <p:cNvSpPr>
-            <a:spLocks noGrp="1"/>
-          </p:cNvSpPr>
-          <p:nvPr>
-            <p:ph type="title"/>
-          </p:nvPr>
-        </p:nvSpPr>
-        <p:spPr/>
-        <p:txBody>
-          <a:bodyPr/>
-          <a:lstStyle/>
-          <a:p>
-            <a:r>
-              <a:rPr lang="pt-BR" dirty="0" smtClean="0"/>
-              <a:t>Orientação a Objetos</a:t>
-            </a:r>
-            <a:endParaRPr lang="pt-BR" dirty="0"/>
-          </a:p>
-        </p:txBody>
-      </p:sp>
-      <p:sp>
-        <p:nvSpPr>
-          <p:cNvPr id="3" name="Espaço Reservado para Conteúdo 2"/>
-          <p:cNvSpPr>
-            <a:spLocks noGrp="1"/>
-          </p:cNvSpPr>
-          <p:nvPr>
-            <p:ph idx="1"/>
-          </p:nvPr>
-        </p:nvSpPr>
-        <p:spPr/>
-        <p:txBody>
-          <a:bodyPr>
-            <a:normAutofit/>
-          </a:bodyPr>
-          <a:lstStyle/>
-          <a:p>
-            <a:r>
-              <a:rPr lang="pt-BR" dirty="0" smtClean="0"/>
-              <a:t>Java</a:t>
-            </a:r>
-          </a:p>
-          <a:p>
-            <a:pPr lvl="1"/>
-            <a:r>
-              <a:rPr lang="pt-BR" dirty="0" smtClean="0"/>
-              <a:t>Classes, Interfaces, Anotações e </a:t>
-            </a:r>
-            <a:r>
-              <a:rPr lang="pt-BR" dirty="0" err="1" smtClean="0"/>
-              <a:t>Enums</a:t>
-            </a:r>
-            <a:endParaRPr lang="pt-BR" dirty="0" smtClean="0"/>
-          </a:p>
-          <a:p>
-            <a:pPr lvl="1"/>
-            <a:endParaRPr lang="pt-BR" dirty="0" smtClean="0"/>
-          </a:p>
-        </p:txBody>
-      </p:sp>
-    </p:spTree>
-  </p:cSld>
-  <p:clrMapOvr>
-    <a:masterClrMapping/>
-  </p:clrMapOvr>
-  <p:timing>
-    <p:tnLst>
-      <p:par>
-        <p:cTn id="1" dur="indefinite" restart="never" nodeType="tmRoot"/>
-      </p:par>
-    </p:tnLst>
-  </p:timing>
-</p:sld>
-</file>
-
-<file path=ppt/slides/slide45.xml><?xml version="1.0" encoding="utf-8"?>
-<p:sld xmlns:a="http://schemas.openxmlformats.org/drawingml/2006/main" xmlns:r="http://schemas.openxmlformats.org/officeDocument/2006/relationships" xmlns:p="http://schemas.openxmlformats.org/presentationml/2006/main">
-  <p:cSld>
-    <p:spTree>
-      <p:nvGrpSpPr>
-        <p:cNvPr id="1" name=""/>
-        <p:cNvGrpSpPr/>
-        <p:nvPr/>
-      </p:nvGrpSpPr>
-      <p:grpSpPr>
-        <a:xfrm>
-          <a:off x="0" y="0"/>
-          <a:ext cx="0" cy="0"/>
-          <a:chOff x="0" y="0"/>
-          <a:chExt cx="0" cy="0"/>
-        </a:xfrm>
-      </p:grpSpPr>
-      <p:sp>
-        <p:nvSpPr>
-          <p:cNvPr id="2" name="Título 1"/>
-          <p:cNvSpPr>
-            <a:spLocks noGrp="1"/>
-          </p:cNvSpPr>
-          <p:nvPr>
-            <p:ph type="title"/>
-          </p:nvPr>
-        </p:nvSpPr>
-        <p:spPr/>
-        <p:txBody>
-          <a:bodyPr/>
-          <a:lstStyle/>
-          <a:p>
-            <a:r>
-              <a:rPr lang="pt-BR" dirty="0" smtClean="0"/>
-              <a:t>Tratamento de Exceções</a:t>
-            </a:r>
-            <a:endParaRPr lang="pt-BR" dirty="0"/>
-          </a:p>
-        </p:txBody>
-      </p:sp>
-      <p:sp>
-        <p:nvSpPr>
-          <p:cNvPr id="3" name="Espaço Reservado para Conteúdo 2"/>
-          <p:cNvSpPr>
-            <a:spLocks noGrp="1"/>
-          </p:cNvSpPr>
-          <p:nvPr>
-            <p:ph idx="1"/>
-          </p:nvPr>
-        </p:nvSpPr>
-        <p:spPr/>
-        <p:txBody>
-          <a:bodyPr>
-            <a:normAutofit/>
-          </a:bodyPr>
-          <a:lstStyle/>
-          <a:p>
-            <a:endParaRPr lang="pt-BR" dirty="0" smtClean="0"/>
-          </a:p>
-        </p:txBody>
-      </p:sp>
-    </p:spTree>
-  </p:cSld>
-  <p:clrMapOvr>
-    <a:masterClrMapping/>
-  </p:clrMapOvr>
-  <p:timing>
-    <p:tnLst>
-      <p:par>
-        <p:cTn id="1" dur="indefinite" restart="never" nodeType="tmRoot"/>
-      </p:par>
-    </p:tnLst>
-  </p:timing>
-</p:sld>
-</file>
-
-<file path=ppt/slides/slide46.xml><?xml version="1.0" encoding="utf-8"?>
-<p:sld xmlns:a="http://schemas.openxmlformats.org/drawingml/2006/main" xmlns:r="http://schemas.openxmlformats.org/officeDocument/2006/relationships" xmlns:p="http://schemas.openxmlformats.org/presentationml/2006/main">
-  <p:cSld>
-    <p:spTree>
-      <p:nvGrpSpPr>
-        <p:cNvPr id="1" name=""/>
-        <p:cNvGrpSpPr/>
-        <p:nvPr/>
-      </p:nvGrpSpPr>
-      <p:grpSpPr>
-        <a:xfrm>
-          <a:off x="0" y="0"/>
-          <a:ext cx="0" cy="0"/>
-          <a:chOff x="0" y="0"/>
-          <a:chExt cx="0" cy="0"/>
-        </a:xfrm>
-      </p:grpSpPr>
-      <p:sp>
-        <p:nvSpPr>
-          <p:cNvPr id="2" name="Título 1"/>
-          <p:cNvSpPr>
-            <a:spLocks noGrp="1"/>
-          </p:cNvSpPr>
-          <p:nvPr>
-            <p:ph type="title"/>
-          </p:nvPr>
-        </p:nvSpPr>
-        <p:spPr/>
-        <p:txBody>
-          <a:bodyPr/>
-          <a:lstStyle/>
-          <a:p>
-            <a:r>
-              <a:rPr lang="pt-BR" dirty="0" smtClean="0"/>
-              <a:t>Java </a:t>
-            </a:r>
-            <a:r>
-              <a:rPr lang="pt-BR" dirty="0" err="1" smtClean="0"/>
-              <a:t>Collection</a:t>
-            </a:r>
-            <a:r>
-              <a:rPr lang="pt-BR" dirty="0" smtClean="0"/>
-              <a:t> Framework</a:t>
-            </a:r>
-            <a:endParaRPr lang="pt-BR" dirty="0"/>
-          </a:p>
-        </p:txBody>
-      </p:sp>
-      <p:sp>
-        <p:nvSpPr>
-          <p:cNvPr id="3" name="Espaço Reservado para Conteúdo 2"/>
-          <p:cNvSpPr>
-            <a:spLocks noGrp="1"/>
-          </p:cNvSpPr>
-          <p:nvPr>
-            <p:ph idx="1"/>
-          </p:nvPr>
-        </p:nvSpPr>
-        <p:spPr/>
-        <p:txBody>
-          <a:bodyPr>
-            <a:normAutofit/>
-          </a:bodyPr>
-          <a:lstStyle/>
-          <a:p>
-            <a:endParaRPr lang="pt-BR" dirty="0" smtClean="0"/>
-          </a:p>
-        </p:txBody>
-      </p:sp>
-    </p:spTree>
-  </p:cSld>
-  <p:clrMapOvr>
-    <a:masterClrMapping/>
-  </p:clrMapOvr>
-  <p:timing>
-    <p:tnLst>
-      <p:par>
-        <p:cTn id="1" dur="indefinite" restart="never" nodeType="tmRoot"/>
-      </p:par>
-    </p:tnLst>
-  </p:timing>
-</p:sld>
-</file>
-
-<file path=ppt/slides/slide47.xml><?xml version="1.0" encoding="utf-8"?>
-<p:sld xmlns:a="http://schemas.openxmlformats.org/drawingml/2006/main" xmlns:r="http://schemas.openxmlformats.org/officeDocument/2006/relationships" xmlns:p="http://schemas.openxmlformats.org/presentationml/2006/main">
-  <p:cSld>
-    <p:spTree>
-      <p:nvGrpSpPr>
-        <p:cNvPr id="1" name=""/>
-        <p:cNvGrpSpPr/>
-        <p:nvPr/>
-      </p:nvGrpSpPr>
-      <p:grpSpPr>
-        <a:xfrm>
-          <a:off x="0" y="0"/>
-          <a:ext cx="0" cy="0"/>
-          <a:chOff x="0" y="0"/>
-          <a:chExt cx="0" cy="0"/>
-        </a:xfrm>
-      </p:grpSpPr>
-      <p:sp>
-        <p:nvSpPr>
-          <p:cNvPr id="2" name="Título 1"/>
-          <p:cNvSpPr>
-            <a:spLocks noGrp="1"/>
-          </p:cNvSpPr>
-          <p:nvPr>
-            <p:ph type="title"/>
-          </p:nvPr>
-        </p:nvSpPr>
-        <p:spPr/>
-        <p:txBody>
-          <a:bodyPr/>
-          <a:lstStyle/>
-          <a:p>
-            <a:r>
-              <a:rPr lang="pt-BR" dirty="0" smtClean="0"/>
-              <a:t>Java IO</a:t>
-            </a:r>
-            <a:endParaRPr lang="pt-BR" dirty="0"/>
-          </a:p>
-        </p:txBody>
-      </p:sp>
-      <p:sp>
-        <p:nvSpPr>
-          <p:cNvPr id="3" name="Espaço Reservado para Conteúdo 2"/>
-          <p:cNvSpPr>
-            <a:spLocks noGrp="1"/>
-          </p:cNvSpPr>
-          <p:nvPr>
-            <p:ph idx="1"/>
-          </p:nvPr>
-        </p:nvSpPr>
-        <p:spPr/>
-        <p:txBody>
-          <a:bodyPr>
-            <a:normAutofit/>
-          </a:bodyPr>
-          <a:lstStyle/>
-          <a:p>
-            <a:endParaRPr lang="pt-BR" dirty="0" smtClean="0"/>
-          </a:p>
-        </p:txBody>
-      </p:sp>
-    </p:spTree>
-  </p:cSld>
-  <p:clrMapOvr>
-    <a:masterClrMapping/>
-  </p:clrMapOvr>
-  <p:timing>
-    <p:tnLst>
-      <p:par>
-        <p:cTn id="1" dur="indefinite" restart="never" nodeType="tmRoot"/>
-      </p:par>
-    </p:tnLst>
-  </p:timing>
-</p:sld>
-</file>
-
-<file path=ppt/slides/slide48.xml><?xml version="1.0" encoding="utf-8"?>
-<p:sld xmlns:a="http://schemas.openxmlformats.org/drawingml/2006/main" xmlns:r="http://schemas.openxmlformats.org/officeDocument/2006/relationships" xmlns:p="http://schemas.openxmlformats.org/presentationml/2006/main">
-  <p:cSld>
-    <p:spTree>
-      <p:nvGrpSpPr>
-        <p:cNvPr id="1" name=""/>
-        <p:cNvGrpSpPr/>
-        <p:nvPr/>
-      </p:nvGrpSpPr>
-      <p:grpSpPr>
-        <a:xfrm>
-          <a:off x="0" y="0"/>
-          <a:ext cx="0" cy="0"/>
-          <a:chOff x="0" y="0"/>
-          <a:chExt cx="0" cy="0"/>
-        </a:xfrm>
-      </p:grpSpPr>
-      <p:sp>
-        <p:nvSpPr>
-          <p:cNvPr id="2" name="Título 1"/>
-          <p:cNvSpPr>
-            <a:spLocks noGrp="1"/>
-          </p:cNvSpPr>
-          <p:nvPr>
-            <p:ph type="title"/>
-          </p:nvPr>
-        </p:nvSpPr>
-        <p:spPr/>
-        <p:txBody>
-          <a:bodyPr/>
-          <a:lstStyle/>
-          <a:p>
-            <a:r>
-              <a:rPr lang="pt-BR" dirty="0" smtClean="0"/>
-              <a:t>Banco de Dados</a:t>
-            </a:r>
-            <a:endParaRPr lang="pt-BR" dirty="0"/>
-          </a:p>
-        </p:txBody>
-      </p:sp>
-      <p:sp>
-        <p:nvSpPr>
-          <p:cNvPr id="3" name="Espaço Reservado para Conteúdo 2"/>
-          <p:cNvSpPr>
-            <a:spLocks noGrp="1"/>
-          </p:cNvSpPr>
-          <p:nvPr>
-            <p:ph idx="1"/>
-          </p:nvPr>
-        </p:nvSpPr>
-        <p:spPr/>
-        <p:txBody>
-          <a:bodyPr>
-            <a:normAutofit/>
-          </a:bodyPr>
-          <a:lstStyle/>
-          <a:p>
-            <a:endParaRPr lang="pt-BR" dirty="0" smtClean="0"/>
-          </a:p>
-        </p:txBody>
-      </p:sp>
     </p:spTree>
   </p:cSld>
   <p:clrMapOvr>

</xml_diff>